<commit_message>
Complete presentation... maybe last two slides could be improved a little bit
</commit_message>
<xml_diff>
--- a/Presentation.pptx
+++ b/Presentation.pptx
@@ -16,6 +16,7 @@
     <p:sldId id="264" r:id="rId10"/>
     <p:sldId id="265" r:id="rId11"/>
     <p:sldId id="266" r:id="rId12"/>
+    <p:sldId id="268" r:id="rId13"/>
   </p:sldIdLst>
   <p:sldSz cx="12192000" cy="6858000"/>
   <p:notesSz cx="6858000" cy="9144000"/>
@@ -114,6 +115,11 @@
       </a:defRPr>
     </a:lvl9pPr>
   </p:defaultTextStyle>
+  <p:extLst>
+    <p:ext uri="{EFAFB233-063F-42B5-8137-9DF3F51BA10A}">
+      <p15:sldGuideLst xmlns:p15="http://schemas.microsoft.com/office/powerpoint/2012/main"/>
+    </p:ext>
+  </p:extLst>
 </p:presentation>
 </file>
 
@@ -331,7 +337,7 @@
             <a:fld id="{B61BEF0D-F0BB-DE4B-95CE-6DB70DBA9567}" type="datetimeFigureOut">
               <a:rPr lang="en-US" dirty="0"/>
               <a:pPr/>
-              <a:t>3/2/21</a:t>
+              <a:t>3/3/21</a:t>
             </a:fld>
             <a:endParaRPr lang="en-US" dirty="0"/>
           </a:p>
@@ -619,7 +625,7 @@
             <a:fld id="{B61BEF0D-F0BB-DE4B-95CE-6DB70DBA9567}" type="datetimeFigureOut">
               <a:rPr lang="en-US" dirty="0"/>
               <a:pPr/>
-              <a:t>3/2/21</a:t>
+              <a:t>3/3/21</a:t>
             </a:fld>
             <a:endParaRPr lang="en-US" dirty="0"/>
           </a:p>
@@ -875,7 +881,7 @@
             <a:fld id="{B61BEF0D-F0BB-DE4B-95CE-6DB70DBA9567}" type="datetimeFigureOut">
               <a:rPr lang="en-US" dirty="0"/>
               <a:pPr/>
-              <a:t>3/2/21</a:t>
+              <a:t>3/3/21</a:t>
             </a:fld>
             <a:endParaRPr lang="en-US" dirty="0"/>
           </a:p>
@@ -1341,7 +1347,7 @@
             <a:fld id="{B61BEF0D-F0BB-DE4B-95CE-6DB70DBA9567}" type="datetimeFigureOut">
               <a:rPr lang="en-US" dirty="0"/>
               <a:pPr/>
-              <a:t>3/2/21</a:t>
+              <a:t>3/3/21</a:t>
             </a:fld>
             <a:endParaRPr lang="en-US" dirty="0"/>
           </a:p>
@@ -1518,7 +1524,7 @@
             <a:fld id="{B61BEF0D-F0BB-DE4B-95CE-6DB70DBA9567}" type="datetimeFigureOut">
               <a:rPr lang="en-US" dirty="0"/>
               <a:pPr/>
-              <a:t>3/2/21</a:t>
+              <a:t>3/3/21</a:t>
             </a:fld>
             <a:endParaRPr lang="en-US" dirty="0"/>
           </a:p>
@@ -2091,7 +2097,7 @@
             <a:fld id="{B61BEF0D-F0BB-DE4B-95CE-6DB70DBA9567}" type="datetimeFigureOut">
               <a:rPr lang="en-US" dirty="0"/>
               <a:pPr/>
-              <a:t>3/2/21</a:t>
+              <a:t>3/3/21</a:t>
             </a:fld>
             <a:endParaRPr lang="en-US" dirty="0"/>
           </a:p>
@@ -2420,7 +2426,7 @@
             <a:fld id="{B61BEF0D-F0BB-DE4B-95CE-6DB70DBA9567}" type="datetimeFigureOut">
               <a:rPr lang="en-US" dirty="0"/>
               <a:pPr/>
-              <a:t>3/2/21</a:t>
+              <a:t>3/3/21</a:t>
             </a:fld>
             <a:endParaRPr lang="en-US" dirty="0"/>
           </a:p>
@@ -2592,7 +2598,7 @@
             <a:fld id="{B61BEF0D-F0BB-DE4B-95CE-6DB70DBA9567}" type="datetimeFigureOut">
               <a:rPr lang="en-US" dirty="0"/>
               <a:pPr/>
-              <a:t>3/2/21</a:t>
+              <a:t>3/3/21</a:t>
             </a:fld>
             <a:endParaRPr lang="en-US" dirty="0"/>
           </a:p>
@@ -2769,7 +2775,7 @@
             <a:fld id="{B61BEF0D-F0BB-DE4B-95CE-6DB70DBA9567}" type="datetimeFigureOut">
               <a:rPr lang="en-US" dirty="0"/>
               <a:pPr/>
-              <a:t>3/2/21</a:t>
+              <a:t>3/3/21</a:t>
             </a:fld>
             <a:endParaRPr lang="en-US" dirty="0"/>
           </a:p>
@@ -2936,7 +2942,7 @@
             <a:fld id="{B61BEF0D-F0BB-DE4B-95CE-6DB70DBA9567}" type="datetimeFigureOut">
               <a:rPr lang="en-US" dirty="0"/>
               <a:pPr/>
-              <a:t>3/2/21</a:t>
+              <a:t>3/3/21</a:t>
             </a:fld>
             <a:endParaRPr lang="en-US" dirty="0"/>
           </a:p>
@@ -3190,7 +3196,7 @@
             <a:fld id="{B61BEF0D-F0BB-DE4B-95CE-6DB70DBA9567}" type="datetimeFigureOut">
               <a:rPr lang="en-US" dirty="0"/>
               <a:pPr/>
-              <a:t>3/2/21</a:t>
+              <a:t>3/3/21</a:t>
             </a:fld>
             <a:endParaRPr lang="en-US" dirty="0"/>
           </a:p>
@@ -3479,7 +3485,7 @@
             <a:fld id="{B61BEF0D-F0BB-DE4B-95CE-6DB70DBA9567}" type="datetimeFigureOut">
               <a:rPr lang="en-US" dirty="0"/>
               <a:pPr/>
-              <a:t>3/2/21</a:t>
+              <a:t>3/3/21</a:t>
             </a:fld>
             <a:endParaRPr lang="en-US" dirty="0"/>
           </a:p>
@@ -3906,7 +3912,7 @@
             <a:fld id="{B61BEF0D-F0BB-DE4B-95CE-6DB70DBA9567}" type="datetimeFigureOut">
               <a:rPr lang="en-US" dirty="0"/>
               <a:pPr/>
-              <a:t>3/2/21</a:t>
+              <a:t>3/3/21</a:t>
             </a:fld>
             <a:endParaRPr lang="en-US" dirty="0"/>
           </a:p>
@@ -4021,7 +4027,7 @@
             <a:fld id="{B61BEF0D-F0BB-DE4B-95CE-6DB70DBA9567}" type="datetimeFigureOut">
               <a:rPr lang="en-US" dirty="0"/>
               <a:pPr/>
-              <a:t>3/2/21</a:t>
+              <a:t>3/3/21</a:t>
             </a:fld>
             <a:endParaRPr lang="en-US" dirty="0"/>
           </a:p>
@@ -4113,7 +4119,7 @@
             <a:fld id="{B61BEF0D-F0BB-DE4B-95CE-6DB70DBA9567}" type="datetimeFigureOut">
               <a:rPr lang="en-US" dirty="0"/>
               <a:pPr/>
-              <a:t>3/2/21</a:t>
+              <a:t>3/3/21</a:t>
             </a:fld>
             <a:endParaRPr lang="en-US" dirty="0"/>
           </a:p>
@@ -4393,7 +4399,7 @@
             <a:fld id="{B61BEF0D-F0BB-DE4B-95CE-6DB70DBA9567}" type="datetimeFigureOut">
               <a:rPr lang="en-US" dirty="0"/>
               <a:pPr/>
-              <a:t>3/2/21</a:t>
+              <a:t>3/3/21</a:t>
             </a:fld>
             <a:endParaRPr lang="en-US" dirty="0"/>
           </a:p>
@@ -4681,7 +4687,7 @@
             <a:fld id="{B61BEF0D-F0BB-DE4B-95CE-6DB70DBA9567}" type="datetimeFigureOut">
               <a:rPr lang="en-US" dirty="0"/>
               <a:pPr/>
-              <a:t>3/2/21</a:t>
+              <a:t>3/3/21</a:t>
             </a:fld>
             <a:endParaRPr lang="en-US" dirty="0"/>
           </a:p>
@@ -4909,7 +4915,7 @@
             <a:fld id="{B61BEF0D-F0BB-DE4B-95CE-6DB70DBA9567}" type="datetimeFigureOut">
               <a:rPr lang="en-US" dirty="0"/>
               <a:pPr/>
-              <a:t>3/2/21</a:t>
+              <a:t>3/3/21</a:t>
             </a:fld>
             <a:endParaRPr lang="en-US" dirty="0"/>
           </a:p>
@@ -5902,41 +5908,494 @@
       </p:pic>
       <p:sp>
         <p:nvSpPr>
-          <p:cNvPr id="10" name="TextBox 9">
+          <p:cNvPr id="8" name="Content Placeholder 2">
             <a:extLst>
               <a:ext uri="{FF2B5EF4-FFF2-40B4-BE49-F238E27FC236}">
-                <a16:creationId xmlns:a16="http://schemas.microsoft.com/office/drawing/2014/main" id="{5F5C614D-0ED9-F94F-AB4A-1A9EF90EA0C8}"/>
+                <a16:creationId xmlns:a16="http://schemas.microsoft.com/office/drawing/2014/main" id="{EF62CEAC-07CB-4D4B-A550-A8EAD5E9CCE5}"/>
               </a:ext>
             </a:extLst>
           </p:cNvPr>
-          <p:cNvSpPr txBox="1"/>
+          <p:cNvSpPr txBox="1">
+            <a:spLocks/>
+          </p:cNvSpPr>
           <p:nvPr/>
         </p:nvSpPr>
         <p:spPr>
           <a:xfrm>
-            <a:off x="1141413" y="5397500"/>
-            <a:ext cx="4954587" cy="646331"/>
+            <a:off x="1141413" y="5232400"/>
+            <a:ext cx="5823591" cy="1169096"/>
           </a:xfrm>
           <a:prstGeom prst="rect">
             <a:avLst/>
           </a:prstGeom>
-          <a:noFill/>
         </p:spPr>
         <p:txBody>
-          <a:bodyPr wrap="square" rtlCol="0">
-            <a:spAutoFit/>
+          <a:bodyPr vert="horz" lIns="91440" tIns="45720" rIns="91440" bIns="45720" rtlCol="0" anchor="ctr">
+            <a:normAutofit fontScale="85000" lnSpcReduction="20000"/>
           </a:bodyPr>
-          <a:lstStyle/>
+          <a:lstStyle>
+            <a:lvl1pPr marL="285750" indent="-285750" algn="l" defTabSz="457200" rtl="0" eaLnBrk="1" latinLnBrk="0" hangingPunct="1">
+              <a:spcBef>
+                <a:spcPct val="20000"/>
+              </a:spcBef>
+              <a:spcAft>
+                <a:spcPts val="600"/>
+              </a:spcAft>
+              <a:buClr>
+                <a:schemeClr val="tx1"/>
+              </a:buClr>
+              <a:buSzPct val="100000"/>
+              <a:buFont typeface="Arial"/>
+              <a:buChar char="•"/>
+              <a:defRPr sz="2000" kern="1200" cap="small">
+                <a:gradFill flip="none" rotWithShape="1">
+                  <a:gsLst>
+                    <a:gs pos="0">
+                      <a:schemeClr val="tx1"/>
+                    </a:gs>
+                    <a:gs pos="100000">
+                      <a:schemeClr val="tx1">
+                        <a:lumMod val="75000"/>
+                      </a:schemeClr>
+                    </a:gs>
+                  </a:gsLst>
+                  <a:lin ang="5580000" scaled="0"/>
+                  <a:tileRect/>
+                </a:gradFill>
+                <a:effectLst>
+                  <a:glow rad="38100">
+                    <a:schemeClr val="bg1">
+                      <a:lumMod val="50000"/>
+                      <a:lumOff val="50000"/>
+                      <a:alpha val="20000"/>
+                    </a:schemeClr>
+                  </a:glow>
+                  <a:outerShdw blurRad="44450" dist="12700" dir="13860000" algn="tl" rotWithShape="0">
+                    <a:srgbClr val="000000">
+                      <a:alpha val="20000"/>
+                    </a:srgbClr>
+                  </a:outerShdw>
+                </a:effectLst>
+                <a:latin typeface="+mn-lt"/>
+                <a:ea typeface="+mn-ea"/>
+                <a:cs typeface="+mn-cs"/>
+              </a:defRPr>
+            </a:lvl1pPr>
+            <a:lvl2pPr marL="742950" indent="-285750" algn="l" defTabSz="457200" rtl="0" eaLnBrk="1" latinLnBrk="0" hangingPunct="1">
+              <a:spcBef>
+                <a:spcPct val="20000"/>
+              </a:spcBef>
+              <a:spcAft>
+                <a:spcPts val="600"/>
+              </a:spcAft>
+              <a:buClr>
+                <a:schemeClr val="tx1"/>
+              </a:buClr>
+              <a:buSzPct val="100000"/>
+              <a:buFont typeface="Arial"/>
+              <a:buChar char="•"/>
+              <a:defRPr sz="1800" kern="1200" cap="small">
+                <a:gradFill flip="none" rotWithShape="1">
+                  <a:gsLst>
+                    <a:gs pos="0">
+                      <a:schemeClr val="tx1"/>
+                    </a:gs>
+                    <a:gs pos="100000">
+                      <a:schemeClr val="tx1">
+                        <a:lumMod val="75000"/>
+                      </a:schemeClr>
+                    </a:gs>
+                  </a:gsLst>
+                  <a:lin ang="5580000" scaled="0"/>
+                  <a:tileRect/>
+                </a:gradFill>
+                <a:effectLst>
+                  <a:glow rad="38100">
+                    <a:schemeClr val="bg1">
+                      <a:lumMod val="50000"/>
+                      <a:lumOff val="50000"/>
+                      <a:alpha val="20000"/>
+                    </a:schemeClr>
+                  </a:glow>
+                  <a:outerShdw blurRad="44450" dist="12700" dir="13860000" algn="tl" rotWithShape="0">
+                    <a:srgbClr val="000000">
+                      <a:alpha val="20000"/>
+                    </a:srgbClr>
+                  </a:outerShdw>
+                </a:effectLst>
+                <a:latin typeface="+mn-lt"/>
+                <a:ea typeface="+mn-ea"/>
+                <a:cs typeface="+mn-cs"/>
+              </a:defRPr>
+            </a:lvl2pPr>
+            <a:lvl3pPr marL="1200150" indent="-285750" algn="l" defTabSz="457200" rtl="0" eaLnBrk="1" latinLnBrk="0" hangingPunct="1">
+              <a:spcBef>
+                <a:spcPct val="20000"/>
+              </a:spcBef>
+              <a:spcAft>
+                <a:spcPts val="600"/>
+              </a:spcAft>
+              <a:buClr>
+                <a:schemeClr val="tx1"/>
+              </a:buClr>
+              <a:buSzPct val="100000"/>
+              <a:buFont typeface="Arial"/>
+              <a:buChar char="•"/>
+              <a:defRPr sz="1600" kern="1200" cap="small">
+                <a:gradFill flip="none" rotWithShape="1">
+                  <a:gsLst>
+                    <a:gs pos="0">
+                      <a:schemeClr val="tx1"/>
+                    </a:gs>
+                    <a:gs pos="100000">
+                      <a:schemeClr val="tx1">
+                        <a:lumMod val="75000"/>
+                      </a:schemeClr>
+                    </a:gs>
+                  </a:gsLst>
+                  <a:lin ang="5580000" scaled="0"/>
+                  <a:tileRect/>
+                </a:gradFill>
+                <a:effectLst>
+                  <a:glow rad="38100">
+                    <a:schemeClr val="bg1">
+                      <a:lumMod val="50000"/>
+                      <a:lumOff val="50000"/>
+                      <a:alpha val="20000"/>
+                    </a:schemeClr>
+                  </a:glow>
+                  <a:outerShdw blurRad="44450" dist="12700" dir="13860000" algn="tl" rotWithShape="0">
+                    <a:srgbClr val="000000">
+                      <a:alpha val="20000"/>
+                    </a:srgbClr>
+                  </a:outerShdw>
+                </a:effectLst>
+                <a:latin typeface="+mn-lt"/>
+                <a:ea typeface="+mn-ea"/>
+                <a:cs typeface="+mn-cs"/>
+              </a:defRPr>
+            </a:lvl3pPr>
+            <a:lvl4pPr marL="1543050" indent="-171450" algn="l" defTabSz="457200" rtl="0" eaLnBrk="1" latinLnBrk="0" hangingPunct="1">
+              <a:spcBef>
+                <a:spcPct val="20000"/>
+              </a:spcBef>
+              <a:spcAft>
+                <a:spcPts val="600"/>
+              </a:spcAft>
+              <a:buClr>
+                <a:schemeClr val="tx1"/>
+              </a:buClr>
+              <a:buSzPct val="100000"/>
+              <a:buFont typeface="Arial"/>
+              <a:buChar char="•"/>
+              <a:defRPr sz="1400" kern="1200" cap="small">
+                <a:gradFill flip="none" rotWithShape="1">
+                  <a:gsLst>
+                    <a:gs pos="0">
+                      <a:schemeClr val="tx1"/>
+                    </a:gs>
+                    <a:gs pos="100000">
+                      <a:schemeClr val="tx1">
+                        <a:lumMod val="75000"/>
+                      </a:schemeClr>
+                    </a:gs>
+                  </a:gsLst>
+                  <a:lin ang="5580000" scaled="0"/>
+                  <a:tileRect/>
+                </a:gradFill>
+                <a:effectLst>
+                  <a:glow rad="38100">
+                    <a:schemeClr val="bg1">
+                      <a:lumMod val="50000"/>
+                      <a:lumOff val="50000"/>
+                      <a:alpha val="20000"/>
+                    </a:schemeClr>
+                  </a:glow>
+                  <a:outerShdw blurRad="44450" dist="12700" dir="13860000" algn="tl" rotWithShape="0">
+                    <a:srgbClr val="000000">
+                      <a:alpha val="20000"/>
+                    </a:srgbClr>
+                  </a:outerShdw>
+                </a:effectLst>
+                <a:latin typeface="+mn-lt"/>
+                <a:ea typeface="+mn-ea"/>
+                <a:cs typeface="+mn-cs"/>
+              </a:defRPr>
+            </a:lvl4pPr>
+            <a:lvl5pPr marL="2000250" indent="-171450" algn="l" defTabSz="457200" rtl="0" eaLnBrk="1" latinLnBrk="0" hangingPunct="1">
+              <a:spcBef>
+                <a:spcPct val="20000"/>
+              </a:spcBef>
+              <a:spcAft>
+                <a:spcPts val="600"/>
+              </a:spcAft>
+              <a:buClr>
+                <a:schemeClr val="tx1"/>
+              </a:buClr>
+              <a:buSzPct val="100000"/>
+              <a:buFont typeface="Arial"/>
+              <a:buChar char="•"/>
+              <a:defRPr sz="1400" kern="1200" cap="small">
+                <a:gradFill flip="none" rotWithShape="1">
+                  <a:gsLst>
+                    <a:gs pos="0">
+                      <a:schemeClr val="tx1"/>
+                    </a:gs>
+                    <a:gs pos="100000">
+                      <a:schemeClr val="tx1">
+                        <a:lumMod val="75000"/>
+                      </a:schemeClr>
+                    </a:gs>
+                  </a:gsLst>
+                  <a:lin ang="5580000" scaled="0"/>
+                  <a:tileRect/>
+                </a:gradFill>
+                <a:effectLst>
+                  <a:glow rad="38100">
+                    <a:schemeClr val="bg1">
+                      <a:lumMod val="50000"/>
+                      <a:lumOff val="50000"/>
+                      <a:alpha val="20000"/>
+                    </a:schemeClr>
+                  </a:glow>
+                  <a:outerShdw blurRad="44450" dist="12700" dir="13860000" algn="tl" rotWithShape="0">
+                    <a:srgbClr val="000000">
+                      <a:alpha val="20000"/>
+                    </a:srgbClr>
+                  </a:outerShdw>
+                </a:effectLst>
+                <a:latin typeface="+mn-lt"/>
+                <a:ea typeface="+mn-ea"/>
+                <a:cs typeface="+mn-cs"/>
+              </a:defRPr>
+            </a:lvl5pPr>
+            <a:lvl6pPr marL="2514600" indent="-228600" algn="l" defTabSz="457200" rtl="0" eaLnBrk="1" latinLnBrk="0" hangingPunct="1">
+              <a:spcBef>
+                <a:spcPct val="20000"/>
+              </a:spcBef>
+              <a:spcAft>
+                <a:spcPts val="600"/>
+              </a:spcAft>
+              <a:buClr>
+                <a:schemeClr val="tx1"/>
+              </a:buClr>
+              <a:buSzPct val="100000"/>
+              <a:buFont typeface="Arial"/>
+              <a:buChar char="•"/>
+              <a:defRPr sz="1200" kern="1200" cap="small">
+                <a:gradFill flip="none" rotWithShape="1">
+                  <a:gsLst>
+                    <a:gs pos="0">
+                      <a:schemeClr val="tx1"/>
+                    </a:gs>
+                    <a:gs pos="100000">
+                      <a:schemeClr val="tx1">
+                        <a:lumMod val="75000"/>
+                      </a:schemeClr>
+                    </a:gs>
+                  </a:gsLst>
+                  <a:lin ang="5580000" scaled="0"/>
+                  <a:tileRect/>
+                </a:gradFill>
+                <a:effectLst>
+                  <a:glow rad="38100">
+                    <a:schemeClr val="bg1">
+                      <a:lumMod val="50000"/>
+                      <a:lumOff val="50000"/>
+                      <a:alpha val="20000"/>
+                    </a:schemeClr>
+                  </a:glow>
+                  <a:outerShdw blurRad="44450" dist="12700" dir="13860000" algn="tl" rotWithShape="0">
+                    <a:srgbClr val="000000">
+                      <a:alpha val="20000"/>
+                    </a:srgbClr>
+                  </a:outerShdw>
+                </a:effectLst>
+                <a:latin typeface="+mn-lt"/>
+                <a:ea typeface="+mn-ea"/>
+                <a:cs typeface="+mn-cs"/>
+              </a:defRPr>
+            </a:lvl6pPr>
+            <a:lvl7pPr marL="2971800" indent="-228600" algn="l" defTabSz="457200" rtl="0" eaLnBrk="1" latinLnBrk="0" hangingPunct="1">
+              <a:spcBef>
+                <a:spcPct val="20000"/>
+              </a:spcBef>
+              <a:spcAft>
+                <a:spcPts val="600"/>
+              </a:spcAft>
+              <a:buClr>
+                <a:schemeClr val="tx1"/>
+              </a:buClr>
+              <a:buSzPct val="100000"/>
+              <a:buFont typeface="Arial"/>
+              <a:buChar char="•"/>
+              <a:defRPr sz="1200" kern="1200" cap="small">
+                <a:gradFill flip="none" rotWithShape="1">
+                  <a:gsLst>
+                    <a:gs pos="0">
+                      <a:schemeClr val="tx1"/>
+                    </a:gs>
+                    <a:gs pos="100000">
+                      <a:schemeClr val="tx1">
+                        <a:lumMod val="75000"/>
+                      </a:schemeClr>
+                    </a:gs>
+                  </a:gsLst>
+                  <a:lin ang="5580000" scaled="0"/>
+                  <a:tileRect/>
+                </a:gradFill>
+                <a:effectLst>
+                  <a:glow rad="38100">
+                    <a:schemeClr val="bg1">
+                      <a:lumMod val="50000"/>
+                      <a:lumOff val="50000"/>
+                      <a:alpha val="20000"/>
+                    </a:schemeClr>
+                  </a:glow>
+                  <a:outerShdw blurRad="44450" dist="12700" dir="13860000" algn="tl" rotWithShape="0">
+                    <a:srgbClr val="000000">
+                      <a:alpha val="20000"/>
+                    </a:srgbClr>
+                  </a:outerShdw>
+                </a:effectLst>
+                <a:latin typeface="+mn-lt"/>
+                <a:ea typeface="+mn-ea"/>
+                <a:cs typeface="+mn-cs"/>
+              </a:defRPr>
+            </a:lvl7pPr>
+            <a:lvl8pPr marL="3429000" indent="-228600" algn="l" defTabSz="457200" rtl="0" eaLnBrk="1" latinLnBrk="0" hangingPunct="1">
+              <a:spcBef>
+                <a:spcPct val="20000"/>
+              </a:spcBef>
+              <a:spcAft>
+                <a:spcPts val="600"/>
+              </a:spcAft>
+              <a:buClr>
+                <a:schemeClr val="tx1"/>
+              </a:buClr>
+              <a:buSzPct val="100000"/>
+              <a:buFont typeface="Arial"/>
+              <a:buChar char="•"/>
+              <a:defRPr sz="1200" kern="1200" cap="small">
+                <a:gradFill flip="none" rotWithShape="1">
+                  <a:gsLst>
+                    <a:gs pos="0">
+                      <a:schemeClr val="tx1"/>
+                    </a:gs>
+                    <a:gs pos="100000">
+                      <a:schemeClr val="tx1">
+                        <a:lumMod val="75000"/>
+                      </a:schemeClr>
+                    </a:gs>
+                  </a:gsLst>
+                  <a:lin ang="5580000" scaled="0"/>
+                  <a:tileRect/>
+                </a:gradFill>
+                <a:effectLst>
+                  <a:glow rad="38100">
+                    <a:schemeClr val="bg1">
+                      <a:lumMod val="50000"/>
+                      <a:lumOff val="50000"/>
+                      <a:alpha val="20000"/>
+                    </a:schemeClr>
+                  </a:glow>
+                  <a:outerShdw blurRad="44450" dist="12700" dir="13860000" algn="tl" rotWithShape="0">
+                    <a:srgbClr val="000000">
+                      <a:alpha val="20000"/>
+                    </a:srgbClr>
+                  </a:outerShdw>
+                </a:effectLst>
+                <a:latin typeface="+mn-lt"/>
+                <a:ea typeface="+mn-ea"/>
+                <a:cs typeface="+mn-cs"/>
+              </a:defRPr>
+            </a:lvl8pPr>
+            <a:lvl9pPr marL="3886200" indent="-228600" algn="l" defTabSz="457200" rtl="0" eaLnBrk="1" latinLnBrk="0" hangingPunct="1">
+              <a:spcBef>
+                <a:spcPct val="20000"/>
+              </a:spcBef>
+              <a:spcAft>
+                <a:spcPts val="600"/>
+              </a:spcAft>
+              <a:buClr>
+                <a:schemeClr val="tx1"/>
+              </a:buClr>
+              <a:buSzPct val="100000"/>
+              <a:buFont typeface="Arial"/>
+              <a:buChar char="•"/>
+              <a:defRPr sz="1200" kern="1200" cap="small">
+                <a:gradFill flip="none" rotWithShape="1">
+                  <a:gsLst>
+                    <a:gs pos="0">
+                      <a:schemeClr val="tx1"/>
+                    </a:gs>
+                    <a:gs pos="100000">
+                      <a:schemeClr val="tx1">
+                        <a:lumMod val="75000"/>
+                      </a:schemeClr>
+                    </a:gs>
+                  </a:gsLst>
+                  <a:lin ang="5580000" scaled="0"/>
+                  <a:tileRect/>
+                </a:gradFill>
+                <a:effectLst>
+                  <a:glow rad="38100">
+                    <a:schemeClr val="bg1">
+                      <a:lumMod val="50000"/>
+                      <a:lumOff val="50000"/>
+                      <a:alpha val="20000"/>
+                    </a:schemeClr>
+                  </a:glow>
+                  <a:outerShdw blurRad="44450" dist="12700" dir="13860000" algn="tl" rotWithShape="0">
+                    <a:srgbClr val="000000">
+                      <a:alpha val="20000"/>
+                    </a:srgbClr>
+                  </a:outerShdw>
+                </a:effectLst>
+                <a:latin typeface="+mn-lt"/>
+                <a:ea typeface="+mn-ea"/>
+                <a:cs typeface="+mn-cs"/>
+              </a:defRPr>
+            </a:lvl9pPr>
+          </a:lstStyle>
           <a:p>
             <a:r>
               <a:rPr lang="en-MX" dirty="0"/>
-              <a:t>Still Speed is the most relevant feature</a:t>
-            </a:r>
-          </a:p>
-          <a:p>
+              <a:t>Consistent with Linear Regression – Most Relevant feature: Speed</a:t>
+            </a:r>
+          </a:p>
+          <a:p>
+            <a:pPr lvl="1"/>
             <a:r>
               <a:rPr lang="en-MX" dirty="0"/>
-              <a:t>Including 10 features R2 = 69.30%</a:t>
+              <a:t>10 Variables </a:t>
+            </a:r>
+            <a:r>
+              <a:rPr lang="en-MX" dirty="0">
+                <a:sym typeface="Wingdings" pitchFamily="2" charset="2"/>
+              </a:rPr>
+              <a:t></a:t>
+            </a:r>
+            <a:r>
+              <a:rPr lang="en-MX" dirty="0"/>
+              <a:t> R2 = 69.30%</a:t>
+            </a:r>
+          </a:p>
+          <a:p>
+            <a:pPr lvl="1"/>
+            <a:r>
+              <a:rPr lang="en-MX" dirty="0"/>
+              <a:t>39 Variables </a:t>
+            </a:r>
+            <a:r>
+              <a:rPr lang="en-MX" dirty="0">
+                <a:sym typeface="Wingdings" pitchFamily="2" charset="2"/>
+              </a:rPr>
+              <a:t></a:t>
+            </a:r>
+            <a:r>
+              <a:rPr lang="en-MX" dirty="0"/>
+              <a:t> R2 = 73.29%</a:t>
             </a:r>
           </a:p>
         </p:txBody>
@@ -6019,12 +6478,587 @@
             <p:ph idx="1"/>
           </p:nvPr>
         </p:nvSpPr>
-        <p:spPr/>
-        <p:txBody>
-          <a:bodyPr/>
+        <p:spPr>
+          <a:xfrm>
+            <a:off x="1141413" y="2667000"/>
+            <a:ext cx="4954587" cy="3072320"/>
+          </a:xfrm>
+        </p:spPr>
+        <p:txBody>
+          <a:bodyPr>
+            <a:normAutofit lnSpcReduction="10000"/>
+          </a:bodyPr>
           <a:lstStyle/>
           <a:p>
-            <a:endParaRPr lang="en-MX"/>
+            <a:r>
+              <a:rPr lang="en-MX" sz="1700" dirty="0"/>
+              <a:t>Linear Regression</a:t>
+            </a:r>
+          </a:p>
+          <a:p>
+            <a:r>
+              <a:rPr lang="en-MX" sz="1700" dirty="0"/>
+              <a:t>Pros:	</a:t>
+            </a:r>
+          </a:p>
+          <a:p>
+            <a:pPr lvl="1"/>
+            <a:r>
+              <a:rPr lang="en-MX" sz="1500" dirty="0"/>
+              <a:t>Interpretation: y = 0.22*x + 4.75</a:t>
+            </a:r>
+          </a:p>
+          <a:p>
+            <a:pPr lvl="2"/>
+            <a:r>
+              <a:rPr lang="en-MX" sz="1300" dirty="0"/>
+              <a:t>X - Average Speed: Data mean 11.63 kph</a:t>
+            </a:r>
+          </a:p>
+          <a:p>
+            <a:pPr lvl="2"/>
+            <a:r>
+              <a:rPr lang="en-GB" sz="1300" dirty="0"/>
+              <a:t>Y</a:t>
+            </a:r>
+            <a:r>
+              <a:rPr lang="en-MX" sz="1300" dirty="0"/>
+              <a:t> - Liters Per Hour: Data mean 7.31</a:t>
+            </a:r>
+          </a:p>
+          <a:p>
+            <a:pPr lvl="1"/>
+            <a:r>
+              <a:rPr lang="en-MX" sz="1500" dirty="0"/>
+              <a:t>Easy and quickly to train       </a:t>
+            </a:r>
+          </a:p>
+          <a:p>
+            <a:r>
+              <a:rPr lang="en-MX" sz="1700" dirty="0"/>
+              <a:t>Cons:</a:t>
+            </a:r>
+          </a:p>
+          <a:p>
+            <a:pPr lvl="1"/>
+            <a:r>
+              <a:rPr lang="en-MX" sz="1500" dirty="0"/>
+              <a:t>R2 range from 53.80% to 62.20%</a:t>
+            </a:r>
+          </a:p>
+          <a:p>
+            <a:pPr lvl="1"/>
+            <a:r>
+              <a:rPr lang="en-MX" sz="1500" dirty="0"/>
+              <a:t>Not-Flexible: Only explains Linear relations</a:t>
+            </a:r>
+          </a:p>
+        </p:txBody>
+      </p:sp>
+      <p:sp>
+        <p:nvSpPr>
+          <p:cNvPr id="4" name="Content Placeholder 2">
+            <a:extLst>
+              <a:ext uri="{FF2B5EF4-FFF2-40B4-BE49-F238E27FC236}">
+                <a16:creationId xmlns:a16="http://schemas.microsoft.com/office/drawing/2014/main" id="{0B72090E-FD81-E243-91D0-3B10D38A41F7}"/>
+              </a:ext>
+            </a:extLst>
+          </p:cNvPr>
+          <p:cNvSpPr txBox="1">
+            <a:spLocks/>
+          </p:cNvSpPr>
+          <p:nvPr/>
+        </p:nvSpPr>
+        <p:spPr>
+          <a:xfrm>
+            <a:off x="6094412" y="2667000"/>
+            <a:ext cx="4954587" cy="3072320"/>
+          </a:xfrm>
+          <a:prstGeom prst="rect">
+            <a:avLst/>
+          </a:prstGeom>
+        </p:spPr>
+        <p:txBody>
+          <a:bodyPr vert="horz" lIns="91440" tIns="45720" rIns="91440" bIns="45720" rtlCol="0" anchor="ctr">
+            <a:normAutofit fontScale="85000" lnSpcReduction="20000"/>
+          </a:bodyPr>
+          <a:lstStyle>
+            <a:lvl1pPr marL="285750" indent="-285750" algn="l" defTabSz="457200" rtl="0" eaLnBrk="1" latinLnBrk="0" hangingPunct="1">
+              <a:spcBef>
+                <a:spcPct val="20000"/>
+              </a:spcBef>
+              <a:spcAft>
+                <a:spcPts val="600"/>
+              </a:spcAft>
+              <a:buClr>
+                <a:schemeClr val="tx1"/>
+              </a:buClr>
+              <a:buSzPct val="100000"/>
+              <a:buFont typeface="Arial"/>
+              <a:buChar char="•"/>
+              <a:defRPr sz="2000" kern="1200" cap="small">
+                <a:gradFill flip="none" rotWithShape="1">
+                  <a:gsLst>
+                    <a:gs pos="0">
+                      <a:schemeClr val="tx1"/>
+                    </a:gs>
+                    <a:gs pos="100000">
+                      <a:schemeClr val="tx1">
+                        <a:lumMod val="75000"/>
+                      </a:schemeClr>
+                    </a:gs>
+                  </a:gsLst>
+                  <a:lin ang="5580000" scaled="0"/>
+                  <a:tileRect/>
+                </a:gradFill>
+                <a:effectLst>
+                  <a:glow rad="38100">
+                    <a:schemeClr val="bg1">
+                      <a:lumMod val="50000"/>
+                      <a:lumOff val="50000"/>
+                      <a:alpha val="20000"/>
+                    </a:schemeClr>
+                  </a:glow>
+                  <a:outerShdw blurRad="44450" dist="12700" dir="13860000" algn="tl" rotWithShape="0">
+                    <a:srgbClr val="000000">
+                      <a:alpha val="20000"/>
+                    </a:srgbClr>
+                  </a:outerShdw>
+                </a:effectLst>
+                <a:latin typeface="+mn-lt"/>
+                <a:ea typeface="+mn-ea"/>
+                <a:cs typeface="+mn-cs"/>
+              </a:defRPr>
+            </a:lvl1pPr>
+            <a:lvl2pPr marL="742950" indent="-285750" algn="l" defTabSz="457200" rtl="0" eaLnBrk="1" latinLnBrk="0" hangingPunct="1">
+              <a:spcBef>
+                <a:spcPct val="20000"/>
+              </a:spcBef>
+              <a:spcAft>
+                <a:spcPts val="600"/>
+              </a:spcAft>
+              <a:buClr>
+                <a:schemeClr val="tx1"/>
+              </a:buClr>
+              <a:buSzPct val="100000"/>
+              <a:buFont typeface="Arial"/>
+              <a:buChar char="•"/>
+              <a:defRPr sz="1800" kern="1200" cap="small">
+                <a:gradFill flip="none" rotWithShape="1">
+                  <a:gsLst>
+                    <a:gs pos="0">
+                      <a:schemeClr val="tx1"/>
+                    </a:gs>
+                    <a:gs pos="100000">
+                      <a:schemeClr val="tx1">
+                        <a:lumMod val="75000"/>
+                      </a:schemeClr>
+                    </a:gs>
+                  </a:gsLst>
+                  <a:lin ang="5580000" scaled="0"/>
+                  <a:tileRect/>
+                </a:gradFill>
+                <a:effectLst>
+                  <a:glow rad="38100">
+                    <a:schemeClr val="bg1">
+                      <a:lumMod val="50000"/>
+                      <a:lumOff val="50000"/>
+                      <a:alpha val="20000"/>
+                    </a:schemeClr>
+                  </a:glow>
+                  <a:outerShdw blurRad="44450" dist="12700" dir="13860000" algn="tl" rotWithShape="0">
+                    <a:srgbClr val="000000">
+                      <a:alpha val="20000"/>
+                    </a:srgbClr>
+                  </a:outerShdw>
+                </a:effectLst>
+                <a:latin typeface="+mn-lt"/>
+                <a:ea typeface="+mn-ea"/>
+                <a:cs typeface="+mn-cs"/>
+              </a:defRPr>
+            </a:lvl2pPr>
+            <a:lvl3pPr marL="1200150" indent="-285750" algn="l" defTabSz="457200" rtl="0" eaLnBrk="1" latinLnBrk="0" hangingPunct="1">
+              <a:spcBef>
+                <a:spcPct val="20000"/>
+              </a:spcBef>
+              <a:spcAft>
+                <a:spcPts val="600"/>
+              </a:spcAft>
+              <a:buClr>
+                <a:schemeClr val="tx1"/>
+              </a:buClr>
+              <a:buSzPct val="100000"/>
+              <a:buFont typeface="Arial"/>
+              <a:buChar char="•"/>
+              <a:defRPr sz="1600" kern="1200" cap="small">
+                <a:gradFill flip="none" rotWithShape="1">
+                  <a:gsLst>
+                    <a:gs pos="0">
+                      <a:schemeClr val="tx1"/>
+                    </a:gs>
+                    <a:gs pos="100000">
+                      <a:schemeClr val="tx1">
+                        <a:lumMod val="75000"/>
+                      </a:schemeClr>
+                    </a:gs>
+                  </a:gsLst>
+                  <a:lin ang="5580000" scaled="0"/>
+                  <a:tileRect/>
+                </a:gradFill>
+                <a:effectLst>
+                  <a:glow rad="38100">
+                    <a:schemeClr val="bg1">
+                      <a:lumMod val="50000"/>
+                      <a:lumOff val="50000"/>
+                      <a:alpha val="20000"/>
+                    </a:schemeClr>
+                  </a:glow>
+                  <a:outerShdw blurRad="44450" dist="12700" dir="13860000" algn="tl" rotWithShape="0">
+                    <a:srgbClr val="000000">
+                      <a:alpha val="20000"/>
+                    </a:srgbClr>
+                  </a:outerShdw>
+                </a:effectLst>
+                <a:latin typeface="+mn-lt"/>
+                <a:ea typeface="+mn-ea"/>
+                <a:cs typeface="+mn-cs"/>
+              </a:defRPr>
+            </a:lvl3pPr>
+            <a:lvl4pPr marL="1543050" indent="-171450" algn="l" defTabSz="457200" rtl="0" eaLnBrk="1" latinLnBrk="0" hangingPunct="1">
+              <a:spcBef>
+                <a:spcPct val="20000"/>
+              </a:spcBef>
+              <a:spcAft>
+                <a:spcPts val="600"/>
+              </a:spcAft>
+              <a:buClr>
+                <a:schemeClr val="tx1"/>
+              </a:buClr>
+              <a:buSzPct val="100000"/>
+              <a:buFont typeface="Arial"/>
+              <a:buChar char="•"/>
+              <a:defRPr sz="1400" kern="1200" cap="small">
+                <a:gradFill flip="none" rotWithShape="1">
+                  <a:gsLst>
+                    <a:gs pos="0">
+                      <a:schemeClr val="tx1"/>
+                    </a:gs>
+                    <a:gs pos="100000">
+                      <a:schemeClr val="tx1">
+                        <a:lumMod val="75000"/>
+                      </a:schemeClr>
+                    </a:gs>
+                  </a:gsLst>
+                  <a:lin ang="5580000" scaled="0"/>
+                  <a:tileRect/>
+                </a:gradFill>
+                <a:effectLst>
+                  <a:glow rad="38100">
+                    <a:schemeClr val="bg1">
+                      <a:lumMod val="50000"/>
+                      <a:lumOff val="50000"/>
+                      <a:alpha val="20000"/>
+                    </a:schemeClr>
+                  </a:glow>
+                  <a:outerShdw blurRad="44450" dist="12700" dir="13860000" algn="tl" rotWithShape="0">
+                    <a:srgbClr val="000000">
+                      <a:alpha val="20000"/>
+                    </a:srgbClr>
+                  </a:outerShdw>
+                </a:effectLst>
+                <a:latin typeface="+mn-lt"/>
+                <a:ea typeface="+mn-ea"/>
+                <a:cs typeface="+mn-cs"/>
+              </a:defRPr>
+            </a:lvl4pPr>
+            <a:lvl5pPr marL="2000250" indent="-171450" algn="l" defTabSz="457200" rtl="0" eaLnBrk="1" latinLnBrk="0" hangingPunct="1">
+              <a:spcBef>
+                <a:spcPct val="20000"/>
+              </a:spcBef>
+              <a:spcAft>
+                <a:spcPts val="600"/>
+              </a:spcAft>
+              <a:buClr>
+                <a:schemeClr val="tx1"/>
+              </a:buClr>
+              <a:buSzPct val="100000"/>
+              <a:buFont typeface="Arial"/>
+              <a:buChar char="•"/>
+              <a:defRPr sz="1400" kern="1200" cap="small">
+                <a:gradFill flip="none" rotWithShape="1">
+                  <a:gsLst>
+                    <a:gs pos="0">
+                      <a:schemeClr val="tx1"/>
+                    </a:gs>
+                    <a:gs pos="100000">
+                      <a:schemeClr val="tx1">
+                        <a:lumMod val="75000"/>
+                      </a:schemeClr>
+                    </a:gs>
+                  </a:gsLst>
+                  <a:lin ang="5580000" scaled="0"/>
+                  <a:tileRect/>
+                </a:gradFill>
+                <a:effectLst>
+                  <a:glow rad="38100">
+                    <a:schemeClr val="bg1">
+                      <a:lumMod val="50000"/>
+                      <a:lumOff val="50000"/>
+                      <a:alpha val="20000"/>
+                    </a:schemeClr>
+                  </a:glow>
+                  <a:outerShdw blurRad="44450" dist="12700" dir="13860000" algn="tl" rotWithShape="0">
+                    <a:srgbClr val="000000">
+                      <a:alpha val="20000"/>
+                    </a:srgbClr>
+                  </a:outerShdw>
+                </a:effectLst>
+                <a:latin typeface="+mn-lt"/>
+                <a:ea typeface="+mn-ea"/>
+                <a:cs typeface="+mn-cs"/>
+              </a:defRPr>
+            </a:lvl5pPr>
+            <a:lvl6pPr marL="2514600" indent="-228600" algn="l" defTabSz="457200" rtl="0" eaLnBrk="1" latinLnBrk="0" hangingPunct="1">
+              <a:spcBef>
+                <a:spcPct val="20000"/>
+              </a:spcBef>
+              <a:spcAft>
+                <a:spcPts val="600"/>
+              </a:spcAft>
+              <a:buClr>
+                <a:schemeClr val="tx1"/>
+              </a:buClr>
+              <a:buSzPct val="100000"/>
+              <a:buFont typeface="Arial"/>
+              <a:buChar char="•"/>
+              <a:defRPr sz="1200" kern="1200" cap="small">
+                <a:gradFill flip="none" rotWithShape="1">
+                  <a:gsLst>
+                    <a:gs pos="0">
+                      <a:schemeClr val="tx1"/>
+                    </a:gs>
+                    <a:gs pos="100000">
+                      <a:schemeClr val="tx1">
+                        <a:lumMod val="75000"/>
+                      </a:schemeClr>
+                    </a:gs>
+                  </a:gsLst>
+                  <a:lin ang="5580000" scaled="0"/>
+                  <a:tileRect/>
+                </a:gradFill>
+                <a:effectLst>
+                  <a:glow rad="38100">
+                    <a:schemeClr val="bg1">
+                      <a:lumMod val="50000"/>
+                      <a:lumOff val="50000"/>
+                      <a:alpha val="20000"/>
+                    </a:schemeClr>
+                  </a:glow>
+                  <a:outerShdw blurRad="44450" dist="12700" dir="13860000" algn="tl" rotWithShape="0">
+                    <a:srgbClr val="000000">
+                      <a:alpha val="20000"/>
+                    </a:srgbClr>
+                  </a:outerShdw>
+                </a:effectLst>
+                <a:latin typeface="+mn-lt"/>
+                <a:ea typeface="+mn-ea"/>
+                <a:cs typeface="+mn-cs"/>
+              </a:defRPr>
+            </a:lvl6pPr>
+            <a:lvl7pPr marL="2971800" indent="-228600" algn="l" defTabSz="457200" rtl="0" eaLnBrk="1" latinLnBrk="0" hangingPunct="1">
+              <a:spcBef>
+                <a:spcPct val="20000"/>
+              </a:spcBef>
+              <a:spcAft>
+                <a:spcPts val="600"/>
+              </a:spcAft>
+              <a:buClr>
+                <a:schemeClr val="tx1"/>
+              </a:buClr>
+              <a:buSzPct val="100000"/>
+              <a:buFont typeface="Arial"/>
+              <a:buChar char="•"/>
+              <a:defRPr sz="1200" kern="1200" cap="small">
+                <a:gradFill flip="none" rotWithShape="1">
+                  <a:gsLst>
+                    <a:gs pos="0">
+                      <a:schemeClr val="tx1"/>
+                    </a:gs>
+                    <a:gs pos="100000">
+                      <a:schemeClr val="tx1">
+                        <a:lumMod val="75000"/>
+                      </a:schemeClr>
+                    </a:gs>
+                  </a:gsLst>
+                  <a:lin ang="5580000" scaled="0"/>
+                  <a:tileRect/>
+                </a:gradFill>
+                <a:effectLst>
+                  <a:glow rad="38100">
+                    <a:schemeClr val="bg1">
+                      <a:lumMod val="50000"/>
+                      <a:lumOff val="50000"/>
+                      <a:alpha val="20000"/>
+                    </a:schemeClr>
+                  </a:glow>
+                  <a:outerShdw blurRad="44450" dist="12700" dir="13860000" algn="tl" rotWithShape="0">
+                    <a:srgbClr val="000000">
+                      <a:alpha val="20000"/>
+                    </a:srgbClr>
+                  </a:outerShdw>
+                </a:effectLst>
+                <a:latin typeface="+mn-lt"/>
+                <a:ea typeface="+mn-ea"/>
+                <a:cs typeface="+mn-cs"/>
+              </a:defRPr>
+            </a:lvl7pPr>
+            <a:lvl8pPr marL="3429000" indent="-228600" algn="l" defTabSz="457200" rtl="0" eaLnBrk="1" latinLnBrk="0" hangingPunct="1">
+              <a:spcBef>
+                <a:spcPct val="20000"/>
+              </a:spcBef>
+              <a:spcAft>
+                <a:spcPts val="600"/>
+              </a:spcAft>
+              <a:buClr>
+                <a:schemeClr val="tx1"/>
+              </a:buClr>
+              <a:buSzPct val="100000"/>
+              <a:buFont typeface="Arial"/>
+              <a:buChar char="•"/>
+              <a:defRPr sz="1200" kern="1200" cap="small">
+                <a:gradFill flip="none" rotWithShape="1">
+                  <a:gsLst>
+                    <a:gs pos="0">
+                      <a:schemeClr val="tx1"/>
+                    </a:gs>
+                    <a:gs pos="100000">
+                      <a:schemeClr val="tx1">
+                        <a:lumMod val="75000"/>
+                      </a:schemeClr>
+                    </a:gs>
+                  </a:gsLst>
+                  <a:lin ang="5580000" scaled="0"/>
+                  <a:tileRect/>
+                </a:gradFill>
+                <a:effectLst>
+                  <a:glow rad="38100">
+                    <a:schemeClr val="bg1">
+                      <a:lumMod val="50000"/>
+                      <a:lumOff val="50000"/>
+                      <a:alpha val="20000"/>
+                    </a:schemeClr>
+                  </a:glow>
+                  <a:outerShdw blurRad="44450" dist="12700" dir="13860000" algn="tl" rotWithShape="0">
+                    <a:srgbClr val="000000">
+                      <a:alpha val="20000"/>
+                    </a:srgbClr>
+                  </a:outerShdw>
+                </a:effectLst>
+                <a:latin typeface="+mn-lt"/>
+                <a:ea typeface="+mn-ea"/>
+                <a:cs typeface="+mn-cs"/>
+              </a:defRPr>
+            </a:lvl8pPr>
+            <a:lvl9pPr marL="3886200" indent="-228600" algn="l" defTabSz="457200" rtl="0" eaLnBrk="1" latinLnBrk="0" hangingPunct="1">
+              <a:spcBef>
+                <a:spcPct val="20000"/>
+              </a:spcBef>
+              <a:spcAft>
+                <a:spcPts val="600"/>
+              </a:spcAft>
+              <a:buClr>
+                <a:schemeClr val="tx1"/>
+              </a:buClr>
+              <a:buSzPct val="100000"/>
+              <a:buFont typeface="Arial"/>
+              <a:buChar char="•"/>
+              <a:defRPr sz="1200" kern="1200" cap="small">
+                <a:gradFill flip="none" rotWithShape="1">
+                  <a:gsLst>
+                    <a:gs pos="0">
+                      <a:schemeClr val="tx1"/>
+                    </a:gs>
+                    <a:gs pos="100000">
+                      <a:schemeClr val="tx1">
+                        <a:lumMod val="75000"/>
+                      </a:schemeClr>
+                    </a:gs>
+                  </a:gsLst>
+                  <a:lin ang="5580000" scaled="0"/>
+                  <a:tileRect/>
+                </a:gradFill>
+                <a:effectLst>
+                  <a:glow rad="38100">
+                    <a:schemeClr val="bg1">
+                      <a:lumMod val="50000"/>
+                      <a:lumOff val="50000"/>
+                      <a:alpha val="20000"/>
+                    </a:schemeClr>
+                  </a:glow>
+                  <a:outerShdw blurRad="44450" dist="12700" dir="13860000" algn="tl" rotWithShape="0">
+                    <a:srgbClr val="000000">
+                      <a:alpha val="20000"/>
+                    </a:srgbClr>
+                  </a:outerShdw>
+                </a:effectLst>
+                <a:latin typeface="+mn-lt"/>
+                <a:ea typeface="+mn-ea"/>
+                <a:cs typeface="+mn-cs"/>
+              </a:defRPr>
+            </a:lvl9pPr>
+          </a:lstStyle>
+          <a:p>
+            <a:r>
+              <a:rPr lang="en-MX" dirty="0"/>
+              <a:t>Random Forest</a:t>
+            </a:r>
+          </a:p>
+          <a:p>
+            <a:r>
+              <a:rPr lang="en-MX" dirty="0"/>
+              <a:t>Pros:	</a:t>
+            </a:r>
+          </a:p>
+          <a:p>
+            <a:pPr lvl="1"/>
+            <a:r>
+              <a:rPr lang="en-MX" dirty="0"/>
+              <a:t>Flexible: Can explains Non-Linear relations</a:t>
+            </a:r>
+          </a:p>
+          <a:p>
+            <a:pPr lvl="1"/>
+            <a:r>
+              <a:rPr lang="en-MX" dirty="0"/>
+              <a:t>R2 improves to 73.29%                  (Considering all features)</a:t>
+            </a:r>
+          </a:p>
+          <a:p>
+            <a:r>
+              <a:rPr lang="en-MX" dirty="0"/>
+              <a:t>Cons:</a:t>
+            </a:r>
+          </a:p>
+          <a:p>
+            <a:pPr lvl="1"/>
+            <a:r>
+              <a:rPr lang="en-MX" dirty="0"/>
+              <a:t>Computational Expensive</a:t>
+            </a:r>
+          </a:p>
+          <a:p>
+            <a:pPr lvl="1"/>
+            <a:r>
+              <a:rPr lang="en-MX" dirty="0"/>
+              <a:t>Not Very easy to Interpret</a:t>
+            </a:r>
+          </a:p>
+          <a:p>
+            <a:pPr lvl="2"/>
+            <a:r>
+              <a:rPr lang="en-MX" dirty="0"/>
+              <a:t>Still the most relevant feature is the Speed which clearly has a linear relations with the target variable: liters per hour</a:t>
+            </a:r>
           </a:p>
         </p:txBody>
       </p:sp>
@@ -6032,6 +7066,179 @@
     <p:extLst>
       <p:ext uri="{BB962C8B-B14F-4D97-AF65-F5344CB8AC3E}">
         <p14:creationId xmlns:p14="http://schemas.microsoft.com/office/powerpoint/2010/main" val="3408552053"/>
+      </p:ext>
+    </p:extLst>
+  </p:cSld>
+  <p:clrMapOvr>
+    <a:masterClrMapping/>
+  </p:clrMapOvr>
+</p:sld>
+</file>
+
+<file path=ppt/slides/slide12.xml><?xml version="1.0" encoding="utf-8"?>
+<p:sld xmlns:a="http://schemas.openxmlformats.org/drawingml/2006/main" xmlns:r="http://schemas.openxmlformats.org/officeDocument/2006/relationships" xmlns:p="http://schemas.openxmlformats.org/presentationml/2006/main">
+  <p:cSld>
+    <p:spTree>
+      <p:nvGrpSpPr>
+        <p:cNvPr id="1" name=""/>
+        <p:cNvGrpSpPr/>
+        <p:nvPr/>
+      </p:nvGrpSpPr>
+      <p:grpSpPr>
+        <a:xfrm>
+          <a:off x="0" y="0"/>
+          <a:ext cx="0" cy="0"/>
+          <a:chOff x="0" y="0"/>
+          <a:chExt cx="0" cy="0"/>
+        </a:xfrm>
+      </p:grpSpPr>
+      <p:sp>
+        <p:nvSpPr>
+          <p:cNvPr id="2" name="Title 1">
+            <a:extLst>
+              <a:ext uri="{FF2B5EF4-FFF2-40B4-BE49-F238E27FC236}">
+                <a16:creationId xmlns:a16="http://schemas.microsoft.com/office/drawing/2014/main" id="{85FDCE74-5A6A-974B-8D79-79D052E0FA65}"/>
+              </a:ext>
+            </a:extLst>
+          </p:cNvPr>
+          <p:cNvSpPr>
+            <a:spLocks noGrp="1"/>
+          </p:cNvSpPr>
+          <p:nvPr>
+            <p:ph type="title"/>
+          </p:nvPr>
+        </p:nvSpPr>
+        <p:spPr/>
+        <p:txBody>
+          <a:bodyPr/>
+          <a:lstStyle/>
+          <a:p>
+            <a:r>
+              <a:rPr lang="en-MX" dirty="0"/>
+              <a:t>Conclusions and Next Steps</a:t>
+            </a:r>
+          </a:p>
+        </p:txBody>
+      </p:sp>
+      <p:sp>
+        <p:nvSpPr>
+          <p:cNvPr id="3" name="Content Placeholder 2">
+            <a:extLst>
+              <a:ext uri="{FF2B5EF4-FFF2-40B4-BE49-F238E27FC236}">
+                <a16:creationId xmlns:a16="http://schemas.microsoft.com/office/drawing/2014/main" id="{146FF50D-90C0-9043-B1F1-08B6C24BD015}"/>
+              </a:ext>
+            </a:extLst>
+          </p:cNvPr>
+          <p:cNvSpPr>
+            <a:spLocks noGrp="1"/>
+          </p:cNvSpPr>
+          <p:nvPr>
+            <p:ph idx="1"/>
+          </p:nvPr>
+        </p:nvSpPr>
+        <p:spPr/>
+        <p:txBody>
+          <a:bodyPr>
+            <a:normAutofit fontScale="70000" lnSpcReduction="20000"/>
+          </a:bodyPr>
+          <a:lstStyle/>
+          <a:p>
+            <a:r>
+              <a:rPr lang="en-MX" dirty="0"/>
+              <a:t>Most Relevant Feature to explain the fuel consumption: Average Speed of the Ready-Mix Truck along the whole day</a:t>
+            </a:r>
+          </a:p>
+          <a:p>
+            <a:r>
+              <a:rPr lang="en-MX" dirty="0"/>
+              <a:t>+ 1 kph Speed  </a:t>
+            </a:r>
+            <a:r>
+              <a:rPr lang="en-MX" dirty="0">
+                <a:sym typeface="Wingdings" pitchFamily="2" charset="2"/>
+              </a:rPr>
+              <a:t> </a:t>
+            </a:r>
+            <a:r>
+              <a:rPr lang="en-MX" dirty="0"/>
+              <a:t>+ 0.22 liters per hour fuel consumption</a:t>
+            </a:r>
+          </a:p>
+          <a:p>
+            <a:pPr lvl="1"/>
+            <a:r>
+              <a:rPr lang="en-MX" dirty="0"/>
+              <a:t>Each Ready-Mix truck has its engine on ~10 hrs per day</a:t>
+            </a:r>
+          </a:p>
+          <a:p>
+            <a:pPr lvl="1"/>
+            <a:r>
+              <a:rPr lang="en-MX" dirty="0"/>
+              <a:t>Hence the +1 kph </a:t>
+            </a:r>
+            <a:r>
+              <a:rPr lang="en-MX" dirty="0">
+                <a:sym typeface="Wingdings" pitchFamily="2" charset="2"/>
+              </a:rPr>
+              <a:t> </a:t>
+            </a:r>
+            <a:r>
+              <a:rPr lang="en-MX" dirty="0"/>
+              <a:t>+ 2.2 extra liters per day</a:t>
+            </a:r>
+          </a:p>
+          <a:p>
+            <a:pPr lvl="1"/>
+            <a:r>
+              <a:rPr lang="en-MX" dirty="0"/>
+              <a:t>Each liter costs $20 MXN, so +1 KPH </a:t>
+            </a:r>
+            <a:r>
+              <a:rPr lang="en-MX" dirty="0">
+                <a:sym typeface="Wingdings" pitchFamily="2" charset="2"/>
+              </a:rPr>
+              <a:t> + $44 MXN per truck per day</a:t>
+            </a:r>
+          </a:p>
+          <a:p>
+            <a:pPr lvl="1"/>
+            <a:r>
+              <a:rPr lang="en-MX" dirty="0"/>
+              <a:t>On average there are 1,500 trucks on the streets: therefore +1 KPH (On every truck) </a:t>
+            </a:r>
+            <a:r>
+              <a:rPr lang="en-MX" dirty="0">
+                <a:sym typeface="Wingdings" pitchFamily="2" charset="2"/>
+              </a:rPr>
+              <a:t> + $66,000 MXN per day</a:t>
+            </a:r>
+            <a:endParaRPr lang="en-MX" dirty="0"/>
+          </a:p>
+          <a:p>
+            <a:r>
+              <a:rPr lang="en-MX" dirty="0"/>
+              <a:t>Very Important to control the avergae driving speed, not only because it saves fuel, but also it will guarantee the safety of our drivers and all the other people on the streets/roads</a:t>
+            </a:r>
+          </a:p>
+          <a:p>
+            <a:r>
+              <a:rPr lang="en-MX" dirty="0"/>
+              <a:t>However we need to be efficient on this trade-off as we would not want to make people work extra hours (Increments engine hours per truck) or hurt the relations with our clients (Avoid impunctual deliveries)</a:t>
+            </a:r>
+          </a:p>
+          <a:p>
+            <a:r>
+              <a:rPr lang="en-MX" dirty="0"/>
+              <a:t>Important to keep track of this data and look for explanations to the outliers and missing data that wa no t considered on this analysis</a:t>
+            </a:r>
+          </a:p>
+        </p:txBody>
+      </p:sp>
+    </p:spTree>
+    <p:extLst>
+      <p:ext uri="{BB962C8B-B14F-4D97-AF65-F5344CB8AC3E}">
+        <p14:creationId xmlns:p14="http://schemas.microsoft.com/office/powerpoint/2010/main" val="2887040630"/>
       </p:ext>
     </p:extLst>
   </p:cSld>
@@ -6166,7 +7373,7 @@
         </p:blipFill>
         <p:spPr>
           <a:xfrm>
-            <a:off x="7796211" y="1695449"/>
+            <a:off x="7796211" y="3257549"/>
             <a:ext cx="3251200" cy="1943100"/>
           </a:xfrm>
           <a:prstGeom prst="rect">
@@ -6250,7 +7457,7 @@
         </p:nvSpPr>
         <p:spPr>
           <a:xfrm>
-            <a:off x="1141413" y="2666999"/>
+            <a:off x="849584" y="2676727"/>
             <a:ext cx="5370598" cy="3124201"/>
           </a:xfrm>
         </p:spPr>
@@ -6267,14 +7474,14 @@
             <a:pPr lvl="1"/>
             <a:r>
               <a:rPr lang="en-MX" dirty="0"/>
-              <a:t>Applied Mathematician (ITAM)</a:t>
+              <a:t>Applied Mathematician - ITAM</a:t>
             </a:r>
           </a:p>
           <a:p>
             <a:pPr lvl="1"/>
             <a:r>
               <a:rPr lang="en-MX" dirty="0"/>
-              <a:t>MSc and PhD from University of Warwick</a:t>
+              <a:t>MSc and PhD in Mathematics and Statistics - the University of Warwick</a:t>
             </a:r>
           </a:p>
           <a:p>
@@ -6302,7 +7509,7 @@
         </p:nvSpPr>
         <p:spPr>
           <a:xfrm>
-            <a:off x="6512011" y="2514600"/>
+            <a:off x="6289546" y="2514773"/>
             <a:ext cx="5370598" cy="3124201"/>
           </a:xfrm>
           <a:prstGeom prst="rect">
@@ -6740,22 +7947,26 @@
           </a:lstStyle>
           <a:p>
             <a:r>
+              <a:rPr lang="en-GB" dirty="0"/>
+              <a:t>A</a:t>
+            </a:r>
+            <a:r>
               <a:rPr lang="en-MX" dirty="0"/>
-              <a:t>Mathematical Idea:</a:t>
+              <a:t>bout the project:</a:t>
             </a:r>
           </a:p>
           <a:p>
             <a:pPr lvl="1"/>
             <a:r>
               <a:rPr lang="en-MX" dirty="0"/>
-              <a:t>Find the most relevant factors that affects the fuel consumption in the ready-mix trucks:</a:t>
+              <a:t>Mathematical Idea: Find the most relevant factors that affects the fuel consumption in the ready-mix trucks</a:t>
             </a:r>
           </a:p>
           <a:p>
             <a:pPr lvl="2"/>
             <a:r>
               <a:rPr lang="en-MX" dirty="0"/>
-              <a:t>Fuel Consumption Measured as Liters per Hour</a:t>
+              <a:t>Fuel Consumption measured as Liters per Hour consume by the truck</a:t>
             </a:r>
           </a:p>
         </p:txBody>
@@ -7052,7 +8263,7 @@
             </a:r>
             <a:r>
               <a:rPr lang="en-MX" dirty="0"/>
-              <a:t>ach day around mexico 1,500 are on the streets</a:t>
+              <a:t>ach day around mexico 1,500 trucks are on the streets</a:t>
             </a:r>
           </a:p>
           <a:p>
@@ -7063,14 +8274,14 @@
             </a:r>
             <a:r>
               <a:rPr lang="en-MX" dirty="0"/>
-              <a:t>iesel tanks = 200 liters –&gt; ~ 15,000 Diesel Liters on the roads (Considering full medium tank in Average per truck)</a:t>
-            </a:r>
-          </a:p>
-          <a:p>
-            <a:pPr lvl="3"/>
+              <a:t>iesel tanks = 400 liters –&gt; ~ 300,000 Diesel Liters on the roads                                          (Considering full medium tank in Average per truck)</a:t>
+            </a:r>
+          </a:p>
+          <a:p>
+            <a:pPr lvl="2"/>
             <a:r>
               <a:rPr lang="en-MX" dirty="0"/>
-              <a:t>$20 per Liter -&gt; $300,000  are on the roads every day in diesel form</a:t>
+              <a:t>$20 MXN per Liter -&gt; $6’000,000 MXN are on the roads every day in diesel form</a:t>
             </a:r>
           </a:p>
           <a:p>
@@ -7296,7 +8507,12 @@
             <p:ph idx="1"/>
           </p:nvPr>
         </p:nvSpPr>
-        <p:spPr/>
+        <p:spPr>
+          <a:xfrm>
+            <a:off x="1141413" y="2373549"/>
+            <a:ext cx="9905998" cy="3874851"/>
+          </a:xfrm>
+        </p:spPr>
         <p:txBody>
           <a:bodyPr>
             <a:normAutofit lnSpcReduction="10000"/>
@@ -7312,7 +8528,7 @@
             <a:pPr lvl="1"/>
             <a:r>
               <a:rPr lang="en-MX" dirty="0"/>
-              <a:t>Daily entries for each truck measuring around 25 diifferent features:</a:t>
+              <a:t>Daily entries from a complete year (2020). Each entry represents one truck on that day together with ~25 different features:</a:t>
             </a:r>
           </a:p>
           <a:p>
@@ -7347,6 +8563,13 @@
           <a:p>
             <a:pPr lvl="2"/>
             <a:r>
+              <a:rPr lang="en-MX" dirty="0"/>
+              <a:t>mileage</a:t>
+            </a:r>
+          </a:p>
+          <a:p>
+            <a:pPr lvl="2"/>
+            <a:r>
               <a:rPr lang="en-GB" dirty="0"/>
               <a:t>I</a:t>
             </a:r>
@@ -7370,7 +8593,7 @@
             </a:r>
             <a:r>
               <a:rPr lang="en-MX" dirty="0"/>
-              <a:t>mount of different mechanical events:</a:t>
+              <a:t>mount of different mechanical/Safety events (~15 variables):</a:t>
             </a:r>
           </a:p>
           <a:p>
@@ -7705,39 +8928,9 @@
         </p:blipFill>
         <p:spPr>
           <a:xfrm>
-            <a:off x="321276" y="741963"/>
-            <a:ext cx="5111021" cy="5111021"/>
+            <a:off x="5428297" y="364919"/>
+            <a:ext cx="6128162" cy="6128162"/>
           </a:xfrm>
-        </p:spPr>
-      </p:pic>
-      <p:pic>
-        <p:nvPicPr>
-          <p:cNvPr id="7" name="Picture 6">
-            <a:extLst>
-              <a:ext uri="{FF2B5EF4-FFF2-40B4-BE49-F238E27FC236}">
-                <a16:creationId xmlns:a16="http://schemas.microsoft.com/office/drawing/2014/main" id="{2917E4AF-FDEB-AB45-915D-B3DAC58916EA}"/>
-              </a:ext>
-            </a:extLst>
-          </p:cNvPr>
-          <p:cNvPicPr>
-            <a:picLocks noChangeAspect="1"/>
-          </p:cNvPicPr>
-          <p:nvPr/>
-        </p:nvPicPr>
-        <p:blipFill>
-          <a:blip r:embed="rId3"/>
-          <a:stretch>
-            <a:fillRect/>
-          </a:stretch>
-        </p:blipFill>
-        <p:spPr>
-          <a:xfrm>
-            <a:off x="5743833" y="270819"/>
-            <a:ext cx="6316362" cy="6316362"/>
-          </a:xfrm>
-          <a:prstGeom prst="rect">
-            <a:avLst/>
-          </a:prstGeom>
         </p:spPr>
       </p:pic>
       <p:sp>
@@ -7754,8 +8947,8 @@
         </p:nvSpPr>
         <p:spPr>
           <a:xfrm>
-            <a:off x="321276" y="3521677"/>
-            <a:ext cx="5111021" cy="370702"/>
+            <a:off x="5428297" y="3677055"/>
+            <a:ext cx="6128162" cy="505839"/>
           </a:xfrm>
           <a:prstGeom prst="rect">
             <a:avLst/>
@@ -7787,6 +8980,579 @@
           <a:p>
             <a:pPr algn="ctr"/>
             <a:endParaRPr lang="en-MX"/>
+          </a:p>
+        </p:txBody>
+      </p:sp>
+      <p:sp>
+        <p:nvSpPr>
+          <p:cNvPr id="6" name="Title 1">
+            <a:extLst>
+              <a:ext uri="{FF2B5EF4-FFF2-40B4-BE49-F238E27FC236}">
+                <a16:creationId xmlns:a16="http://schemas.microsoft.com/office/drawing/2014/main" id="{20BE8E3B-8E1C-1D4A-9DA9-226607203F8B}"/>
+              </a:ext>
+            </a:extLst>
+          </p:cNvPr>
+          <p:cNvSpPr>
+            <a:spLocks noGrp="1"/>
+          </p:cNvSpPr>
+          <p:nvPr>
+            <p:ph type="title"/>
+          </p:nvPr>
+        </p:nvSpPr>
+        <p:spPr>
+          <a:xfrm>
+            <a:off x="859311" y="483136"/>
+            <a:ext cx="4432536" cy="2337881"/>
+          </a:xfrm>
+        </p:spPr>
+        <p:txBody>
+          <a:bodyPr/>
+          <a:lstStyle/>
+          <a:p>
+            <a:r>
+              <a:rPr lang="es-ES" dirty="0" err="1"/>
+              <a:t>Correlations</a:t>
+            </a:r>
+            <a:r>
+              <a:rPr lang="es-ES" dirty="0"/>
+              <a:t> </a:t>
+            </a:r>
+            <a:r>
+              <a:rPr lang="es-ES" dirty="0" err="1"/>
+              <a:t>coefficients</a:t>
+            </a:r>
+            <a:r>
+              <a:rPr lang="es-ES" dirty="0"/>
+              <a:t> </a:t>
+            </a:r>
+            <a:r>
+              <a:rPr lang="es-ES" dirty="0" err="1"/>
+              <a:t>between</a:t>
+            </a:r>
+            <a:r>
+              <a:rPr lang="es-ES" dirty="0"/>
+              <a:t> variables</a:t>
+            </a:r>
+            <a:endParaRPr lang="en-MX" dirty="0"/>
+          </a:p>
+        </p:txBody>
+      </p:sp>
+      <p:sp>
+        <p:nvSpPr>
+          <p:cNvPr id="9" name="Content Placeholder 2">
+            <a:extLst>
+              <a:ext uri="{FF2B5EF4-FFF2-40B4-BE49-F238E27FC236}">
+                <a16:creationId xmlns:a16="http://schemas.microsoft.com/office/drawing/2014/main" id="{F9165167-471E-3A40-A414-C1DFE284F211}"/>
+              </a:ext>
+            </a:extLst>
+          </p:cNvPr>
+          <p:cNvSpPr txBox="1">
+            <a:spLocks/>
+          </p:cNvSpPr>
+          <p:nvPr/>
+        </p:nvSpPr>
+        <p:spPr>
+          <a:xfrm>
+            <a:off x="859312" y="2890736"/>
+            <a:ext cx="3954566" cy="3124201"/>
+          </a:xfrm>
+          <a:prstGeom prst="rect">
+            <a:avLst/>
+          </a:prstGeom>
+        </p:spPr>
+        <p:txBody>
+          <a:bodyPr vert="horz" lIns="91440" tIns="45720" rIns="91440" bIns="45720" rtlCol="0" anchor="ctr">
+            <a:normAutofit lnSpcReduction="10000"/>
+          </a:bodyPr>
+          <a:lstStyle>
+            <a:lvl1pPr marL="285750" indent="-285750" algn="l" defTabSz="457200" rtl="0" eaLnBrk="1" latinLnBrk="0" hangingPunct="1">
+              <a:spcBef>
+                <a:spcPct val="20000"/>
+              </a:spcBef>
+              <a:spcAft>
+                <a:spcPts val="600"/>
+              </a:spcAft>
+              <a:buClr>
+                <a:schemeClr val="tx1"/>
+              </a:buClr>
+              <a:buSzPct val="100000"/>
+              <a:buFont typeface="Arial"/>
+              <a:buChar char="•"/>
+              <a:defRPr sz="2000" kern="1200" cap="small">
+                <a:gradFill flip="none" rotWithShape="1">
+                  <a:gsLst>
+                    <a:gs pos="0">
+                      <a:schemeClr val="tx1"/>
+                    </a:gs>
+                    <a:gs pos="100000">
+                      <a:schemeClr val="tx1">
+                        <a:lumMod val="75000"/>
+                      </a:schemeClr>
+                    </a:gs>
+                  </a:gsLst>
+                  <a:lin ang="5580000" scaled="0"/>
+                  <a:tileRect/>
+                </a:gradFill>
+                <a:effectLst>
+                  <a:glow rad="38100">
+                    <a:schemeClr val="bg1">
+                      <a:lumMod val="50000"/>
+                      <a:lumOff val="50000"/>
+                      <a:alpha val="20000"/>
+                    </a:schemeClr>
+                  </a:glow>
+                  <a:outerShdw blurRad="44450" dist="12700" dir="13860000" algn="tl" rotWithShape="0">
+                    <a:srgbClr val="000000">
+                      <a:alpha val="20000"/>
+                    </a:srgbClr>
+                  </a:outerShdw>
+                </a:effectLst>
+                <a:latin typeface="+mn-lt"/>
+                <a:ea typeface="+mn-ea"/>
+                <a:cs typeface="+mn-cs"/>
+              </a:defRPr>
+            </a:lvl1pPr>
+            <a:lvl2pPr marL="742950" indent="-285750" algn="l" defTabSz="457200" rtl="0" eaLnBrk="1" latinLnBrk="0" hangingPunct="1">
+              <a:spcBef>
+                <a:spcPct val="20000"/>
+              </a:spcBef>
+              <a:spcAft>
+                <a:spcPts val="600"/>
+              </a:spcAft>
+              <a:buClr>
+                <a:schemeClr val="tx1"/>
+              </a:buClr>
+              <a:buSzPct val="100000"/>
+              <a:buFont typeface="Arial"/>
+              <a:buChar char="•"/>
+              <a:defRPr sz="1800" kern="1200" cap="small">
+                <a:gradFill flip="none" rotWithShape="1">
+                  <a:gsLst>
+                    <a:gs pos="0">
+                      <a:schemeClr val="tx1"/>
+                    </a:gs>
+                    <a:gs pos="100000">
+                      <a:schemeClr val="tx1">
+                        <a:lumMod val="75000"/>
+                      </a:schemeClr>
+                    </a:gs>
+                  </a:gsLst>
+                  <a:lin ang="5580000" scaled="0"/>
+                  <a:tileRect/>
+                </a:gradFill>
+                <a:effectLst>
+                  <a:glow rad="38100">
+                    <a:schemeClr val="bg1">
+                      <a:lumMod val="50000"/>
+                      <a:lumOff val="50000"/>
+                      <a:alpha val="20000"/>
+                    </a:schemeClr>
+                  </a:glow>
+                  <a:outerShdw blurRad="44450" dist="12700" dir="13860000" algn="tl" rotWithShape="0">
+                    <a:srgbClr val="000000">
+                      <a:alpha val="20000"/>
+                    </a:srgbClr>
+                  </a:outerShdw>
+                </a:effectLst>
+                <a:latin typeface="+mn-lt"/>
+                <a:ea typeface="+mn-ea"/>
+                <a:cs typeface="+mn-cs"/>
+              </a:defRPr>
+            </a:lvl2pPr>
+            <a:lvl3pPr marL="1200150" indent="-285750" algn="l" defTabSz="457200" rtl="0" eaLnBrk="1" latinLnBrk="0" hangingPunct="1">
+              <a:spcBef>
+                <a:spcPct val="20000"/>
+              </a:spcBef>
+              <a:spcAft>
+                <a:spcPts val="600"/>
+              </a:spcAft>
+              <a:buClr>
+                <a:schemeClr val="tx1"/>
+              </a:buClr>
+              <a:buSzPct val="100000"/>
+              <a:buFont typeface="Arial"/>
+              <a:buChar char="•"/>
+              <a:defRPr sz="1600" kern="1200" cap="small">
+                <a:gradFill flip="none" rotWithShape="1">
+                  <a:gsLst>
+                    <a:gs pos="0">
+                      <a:schemeClr val="tx1"/>
+                    </a:gs>
+                    <a:gs pos="100000">
+                      <a:schemeClr val="tx1">
+                        <a:lumMod val="75000"/>
+                      </a:schemeClr>
+                    </a:gs>
+                  </a:gsLst>
+                  <a:lin ang="5580000" scaled="0"/>
+                  <a:tileRect/>
+                </a:gradFill>
+                <a:effectLst>
+                  <a:glow rad="38100">
+                    <a:schemeClr val="bg1">
+                      <a:lumMod val="50000"/>
+                      <a:lumOff val="50000"/>
+                      <a:alpha val="20000"/>
+                    </a:schemeClr>
+                  </a:glow>
+                  <a:outerShdw blurRad="44450" dist="12700" dir="13860000" algn="tl" rotWithShape="0">
+                    <a:srgbClr val="000000">
+                      <a:alpha val="20000"/>
+                    </a:srgbClr>
+                  </a:outerShdw>
+                </a:effectLst>
+                <a:latin typeface="+mn-lt"/>
+                <a:ea typeface="+mn-ea"/>
+                <a:cs typeface="+mn-cs"/>
+              </a:defRPr>
+            </a:lvl3pPr>
+            <a:lvl4pPr marL="1543050" indent="-171450" algn="l" defTabSz="457200" rtl="0" eaLnBrk="1" latinLnBrk="0" hangingPunct="1">
+              <a:spcBef>
+                <a:spcPct val="20000"/>
+              </a:spcBef>
+              <a:spcAft>
+                <a:spcPts val="600"/>
+              </a:spcAft>
+              <a:buClr>
+                <a:schemeClr val="tx1"/>
+              </a:buClr>
+              <a:buSzPct val="100000"/>
+              <a:buFont typeface="Arial"/>
+              <a:buChar char="•"/>
+              <a:defRPr sz="1400" kern="1200" cap="small">
+                <a:gradFill flip="none" rotWithShape="1">
+                  <a:gsLst>
+                    <a:gs pos="0">
+                      <a:schemeClr val="tx1"/>
+                    </a:gs>
+                    <a:gs pos="100000">
+                      <a:schemeClr val="tx1">
+                        <a:lumMod val="75000"/>
+                      </a:schemeClr>
+                    </a:gs>
+                  </a:gsLst>
+                  <a:lin ang="5580000" scaled="0"/>
+                  <a:tileRect/>
+                </a:gradFill>
+                <a:effectLst>
+                  <a:glow rad="38100">
+                    <a:schemeClr val="bg1">
+                      <a:lumMod val="50000"/>
+                      <a:lumOff val="50000"/>
+                      <a:alpha val="20000"/>
+                    </a:schemeClr>
+                  </a:glow>
+                  <a:outerShdw blurRad="44450" dist="12700" dir="13860000" algn="tl" rotWithShape="0">
+                    <a:srgbClr val="000000">
+                      <a:alpha val="20000"/>
+                    </a:srgbClr>
+                  </a:outerShdw>
+                </a:effectLst>
+                <a:latin typeface="+mn-lt"/>
+                <a:ea typeface="+mn-ea"/>
+                <a:cs typeface="+mn-cs"/>
+              </a:defRPr>
+            </a:lvl4pPr>
+            <a:lvl5pPr marL="2000250" indent="-171450" algn="l" defTabSz="457200" rtl="0" eaLnBrk="1" latinLnBrk="0" hangingPunct="1">
+              <a:spcBef>
+                <a:spcPct val="20000"/>
+              </a:spcBef>
+              <a:spcAft>
+                <a:spcPts val="600"/>
+              </a:spcAft>
+              <a:buClr>
+                <a:schemeClr val="tx1"/>
+              </a:buClr>
+              <a:buSzPct val="100000"/>
+              <a:buFont typeface="Arial"/>
+              <a:buChar char="•"/>
+              <a:defRPr sz="1400" kern="1200" cap="small">
+                <a:gradFill flip="none" rotWithShape="1">
+                  <a:gsLst>
+                    <a:gs pos="0">
+                      <a:schemeClr val="tx1"/>
+                    </a:gs>
+                    <a:gs pos="100000">
+                      <a:schemeClr val="tx1">
+                        <a:lumMod val="75000"/>
+                      </a:schemeClr>
+                    </a:gs>
+                  </a:gsLst>
+                  <a:lin ang="5580000" scaled="0"/>
+                  <a:tileRect/>
+                </a:gradFill>
+                <a:effectLst>
+                  <a:glow rad="38100">
+                    <a:schemeClr val="bg1">
+                      <a:lumMod val="50000"/>
+                      <a:lumOff val="50000"/>
+                      <a:alpha val="20000"/>
+                    </a:schemeClr>
+                  </a:glow>
+                  <a:outerShdw blurRad="44450" dist="12700" dir="13860000" algn="tl" rotWithShape="0">
+                    <a:srgbClr val="000000">
+                      <a:alpha val="20000"/>
+                    </a:srgbClr>
+                  </a:outerShdw>
+                </a:effectLst>
+                <a:latin typeface="+mn-lt"/>
+                <a:ea typeface="+mn-ea"/>
+                <a:cs typeface="+mn-cs"/>
+              </a:defRPr>
+            </a:lvl5pPr>
+            <a:lvl6pPr marL="2514600" indent="-228600" algn="l" defTabSz="457200" rtl="0" eaLnBrk="1" latinLnBrk="0" hangingPunct="1">
+              <a:spcBef>
+                <a:spcPct val="20000"/>
+              </a:spcBef>
+              <a:spcAft>
+                <a:spcPts val="600"/>
+              </a:spcAft>
+              <a:buClr>
+                <a:schemeClr val="tx1"/>
+              </a:buClr>
+              <a:buSzPct val="100000"/>
+              <a:buFont typeface="Arial"/>
+              <a:buChar char="•"/>
+              <a:defRPr sz="1200" kern="1200" cap="small">
+                <a:gradFill flip="none" rotWithShape="1">
+                  <a:gsLst>
+                    <a:gs pos="0">
+                      <a:schemeClr val="tx1"/>
+                    </a:gs>
+                    <a:gs pos="100000">
+                      <a:schemeClr val="tx1">
+                        <a:lumMod val="75000"/>
+                      </a:schemeClr>
+                    </a:gs>
+                  </a:gsLst>
+                  <a:lin ang="5580000" scaled="0"/>
+                  <a:tileRect/>
+                </a:gradFill>
+                <a:effectLst>
+                  <a:glow rad="38100">
+                    <a:schemeClr val="bg1">
+                      <a:lumMod val="50000"/>
+                      <a:lumOff val="50000"/>
+                      <a:alpha val="20000"/>
+                    </a:schemeClr>
+                  </a:glow>
+                  <a:outerShdw blurRad="44450" dist="12700" dir="13860000" algn="tl" rotWithShape="0">
+                    <a:srgbClr val="000000">
+                      <a:alpha val="20000"/>
+                    </a:srgbClr>
+                  </a:outerShdw>
+                </a:effectLst>
+                <a:latin typeface="+mn-lt"/>
+                <a:ea typeface="+mn-ea"/>
+                <a:cs typeface="+mn-cs"/>
+              </a:defRPr>
+            </a:lvl6pPr>
+            <a:lvl7pPr marL="2971800" indent="-228600" algn="l" defTabSz="457200" rtl="0" eaLnBrk="1" latinLnBrk="0" hangingPunct="1">
+              <a:spcBef>
+                <a:spcPct val="20000"/>
+              </a:spcBef>
+              <a:spcAft>
+                <a:spcPts val="600"/>
+              </a:spcAft>
+              <a:buClr>
+                <a:schemeClr val="tx1"/>
+              </a:buClr>
+              <a:buSzPct val="100000"/>
+              <a:buFont typeface="Arial"/>
+              <a:buChar char="•"/>
+              <a:defRPr sz="1200" kern="1200" cap="small">
+                <a:gradFill flip="none" rotWithShape="1">
+                  <a:gsLst>
+                    <a:gs pos="0">
+                      <a:schemeClr val="tx1"/>
+                    </a:gs>
+                    <a:gs pos="100000">
+                      <a:schemeClr val="tx1">
+                        <a:lumMod val="75000"/>
+                      </a:schemeClr>
+                    </a:gs>
+                  </a:gsLst>
+                  <a:lin ang="5580000" scaled="0"/>
+                  <a:tileRect/>
+                </a:gradFill>
+                <a:effectLst>
+                  <a:glow rad="38100">
+                    <a:schemeClr val="bg1">
+                      <a:lumMod val="50000"/>
+                      <a:lumOff val="50000"/>
+                      <a:alpha val="20000"/>
+                    </a:schemeClr>
+                  </a:glow>
+                  <a:outerShdw blurRad="44450" dist="12700" dir="13860000" algn="tl" rotWithShape="0">
+                    <a:srgbClr val="000000">
+                      <a:alpha val="20000"/>
+                    </a:srgbClr>
+                  </a:outerShdw>
+                </a:effectLst>
+                <a:latin typeface="+mn-lt"/>
+                <a:ea typeface="+mn-ea"/>
+                <a:cs typeface="+mn-cs"/>
+              </a:defRPr>
+            </a:lvl7pPr>
+            <a:lvl8pPr marL="3429000" indent="-228600" algn="l" defTabSz="457200" rtl="0" eaLnBrk="1" latinLnBrk="0" hangingPunct="1">
+              <a:spcBef>
+                <a:spcPct val="20000"/>
+              </a:spcBef>
+              <a:spcAft>
+                <a:spcPts val="600"/>
+              </a:spcAft>
+              <a:buClr>
+                <a:schemeClr val="tx1"/>
+              </a:buClr>
+              <a:buSzPct val="100000"/>
+              <a:buFont typeface="Arial"/>
+              <a:buChar char="•"/>
+              <a:defRPr sz="1200" kern="1200" cap="small">
+                <a:gradFill flip="none" rotWithShape="1">
+                  <a:gsLst>
+                    <a:gs pos="0">
+                      <a:schemeClr val="tx1"/>
+                    </a:gs>
+                    <a:gs pos="100000">
+                      <a:schemeClr val="tx1">
+                        <a:lumMod val="75000"/>
+                      </a:schemeClr>
+                    </a:gs>
+                  </a:gsLst>
+                  <a:lin ang="5580000" scaled="0"/>
+                  <a:tileRect/>
+                </a:gradFill>
+                <a:effectLst>
+                  <a:glow rad="38100">
+                    <a:schemeClr val="bg1">
+                      <a:lumMod val="50000"/>
+                      <a:lumOff val="50000"/>
+                      <a:alpha val="20000"/>
+                    </a:schemeClr>
+                  </a:glow>
+                  <a:outerShdw blurRad="44450" dist="12700" dir="13860000" algn="tl" rotWithShape="0">
+                    <a:srgbClr val="000000">
+                      <a:alpha val="20000"/>
+                    </a:srgbClr>
+                  </a:outerShdw>
+                </a:effectLst>
+                <a:latin typeface="+mn-lt"/>
+                <a:ea typeface="+mn-ea"/>
+                <a:cs typeface="+mn-cs"/>
+              </a:defRPr>
+            </a:lvl8pPr>
+            <a:lvl9pPr marL="3886200" indent="-228600" algn="l" defTabSz="457200" rtl="0" eaLnBrk="1" latinLnBrk="0" hangingPunct="1">
+              <a:spcBef>
+                <a:spcPct val="20000"/>
+              </a:spcBef>
+              <a:spcAft>
+                <a:spcPts val="600"/>
+              </a:spcAft>
+              <a:buClr>
+                <a:schemeClr val="tx1"/>
+              </a:buClr>
+              <a:buSzPct val="100000"/>
+              <a:buFont typeface="Arial"/>
+              <a:buChar char="•"/>
+              <a:defRPr sz="1200" kern="1200" cap="small">
+                <a:gradFill flip="none" rotWithShape="1">
+                  <a:gsLst>
+                    <a:gs pos="0">
+                      <a:schemeClr val="tx1"/>
+                    </a:gs>
+                    <a:gs pos="100000">
+                      <a:schemeClr val="tx1">
+                        <a:lumMod val="75000"/>
+                      </a:schemeClr>
+                    </a:gs>
+                  </a:gsLst>
+                  <a:lin ang="5580000" scaled="0"/>
+                  <a:tileRect/>
+                </a:gradFill>
+                <a:effectLst>
+                  <a:glow rad="38100">
+                    <a:schemeClr val="bg1">
+                      <a:lumMod val="50000"/>
+                      <a:lumOff val="50000"/>
+                      <a:alpha val="20000"/>
+                    </a:schemeClr>
+                  </a:glow>
+                  <a:outerShdw blurRad="44450" dist="12700" dir="13860000" algn="tl" rotWithShape="0">
+                    <a:srgbClr val="000000">
+                      <a:alpha val="20000"/>
+                    </a:srgbClr>
+                  </a:outerShdw>
+                </a:effectLst>
+                <a:latin typeface="+mn-lt"/>
+                <a:ea typeface="+mn-ea"/>
+                <a:cs typeface="+mn-cs"/>
+              </a:defRPr>
+            </a:lvl9pPr>
+          </a:lstStyle>
+          <a:p>
+            <a:r>
+              <a:rPr lang="en-MX" dirty="0"/>
+              <a:t>Linear Regression Model:</a:t>
+            </a:r>
+          </a:p>
+          <a:p>
+            <a:pPr lvl="1"/>
+            <a:r>
+              <a:rPr lang="en-MX" dirty="0"/>
+              <a:t>Simple regression using the feature with highest correlation against the target</a:t>
+            </a:r>
+          </a:p>
+          <a:p>
+            <a:pPr lvl="1"/>
+            <a:r>
+              <a:rPr lang="en-GB" dirty="0"/>
+              <a:t>M</a:t>
+            </a:r>
+            <a:r>
+              <a:rPr lang="en-MX" dirty="0"/>
+              <a:t>ultiple regression:</a:t>
+            </a:r>
+          </a:p>
+          <a:p>
+            <a:pPr lvl="2"/>
+            <a:r>
+              <a:rPr lang="en-GB" dirty="0"/>
+              <a:t>A</a:t>
+            </a:r>
+            <a:r>
+              <a:rPr lang="en-MX" dirty="0"/>
+              <a:t>void multicolinearity</a:t>
+            </a:r>
+          </a:p>
+          <a:p>
+            <a:pPr lvl="3"/>
+            <a:r>
+              <a:rPr lang="en-GB" dirty="0"/>
+              <a:t>Only keep</a:t>
+            </a:r>
+            <a:r>
+              <a:rPr lang="en-MX" dirty="0"/>
+              <a:t> mileage or speed</a:t>
+            </a:r>
+          </a:p>
+          <a:p>
+            <a:pPr lvl="3"/>
+            <a:r>
+              <a:rPr lang="es-ES" dirty="0" err="1"/>
+              <a:t>Only</a:t>
+            </a:r>
+            <a:r>
+              <a:rPr lang="es-ES" dirty="0"/>
+              <a:t> </a:t>
+            </a:r>
+            <a:r>
+              <a:rPr lang="es-ES" dirty="0" err="1"/>
+              <a:t>keep</a:t>
+            </a:r>
+            <a:r>
+              <a:rPr lang="en-MX" dirty="0"/>
+              <a:t> trips or volume or idle time</a:t>
+            </a:r>
           </a:p>
         </p:txBody>
       </p:sp>
@@ -7836,14 +9602,26 @@
             <p:ph type="title"/>
           </p:nvPr>
         </p:nvSpPr>
-        <p:spPr/>
+        <p:spPr>
+          <a:xfrm>
+            <a:off x="1141413" y="385857"/>
+            <a:ext cx="9905998" cy="1905000"/>
+          </a:xfrm>
+        </p:spPr>
         <p:txBody>
           <a:bodyPr/>
           <a:lstStyle/>
           <a:p>
             <a:r>
               <a:rPr lang="en-MX" dirty="0"/>
-              <a:t>Speed or mileage?</a:t>
+              <a:t>Simple Linear Regression:</a:t>
+            </a:r>
+            <a:br>
+              <a:rPr lang="en-MX" dirty="0"/>
+            </a:br>
+            <a:r>
+              <a:rPr lang="en-MX" dirty="0"/>
+              <a:t>							Speed or mileage?</a:t>
             </a:r>
           </a:p>
         </p:txBody>
@@ -8071,7 +9849,7 @@
           <a:p>
             <a:r>
               <a:rPr lang="en-MX" dirty="0"/>
-              <a:t>Machine learning</a:t>
+              <a:t>Multiple linear regression</a:t>
             </a:r>
           </a:p>
         </p:txBody>
@@ -8131,8 +9909,8 @@
         </p:blipFill>
         <p:spPr>
           <a:xfrm>
-            <a:off x="3719512" y="2023534"/>
-            <a:ext cx="4749800" cy="3166533"/>
+            <a:off x="3875003" y="1991672"/>
+            <a:ext cx="4441994" cy="2961329"/>
           </a:xfrm>
           <a:prstGeom prst="rect">
             <a:avLst/>
@@ -8155,7 +9933,7 @@
         </p:nvSpPr>
         <p:spPr>
           <a:xfrm>
-            <a:off x="1143001" y="5435601"/>
+            <a:off x="1141413" y="5037512"/>
             <a:ext cx="9905998" cy="1231901"/>
           </a:xfrm>
           <a:prstGeom prst="rect">
@@ -8164,7 +9942,7 @@
         </p:spPr>
         <p:txBody>
           <a:bodyPr vert="horz" lIns="91440" tIns="45720" rIns="91440" bIns="45720" rtlCol="0" anchor="ctr">
-            <a:normAutofit/>
+            <a:normAutofit fontScale="85000" lnSpcReduction="20000"/>
           </a:bodyPr>
           <a:lstStyle>
             <a:lvl1pPr marL="285750" indent="-285750" algn="l" defTabSz="457200" rtl="0" eaLnBrk="1" latinLnBrk="0" hangingPunct="1">
@@ -8601,14 +10379,51 @@
             <a:pPr lvl="1"/>
             <a:r>
               <a:rPr lang="en-MX" dirty="0"/>
-              <a:t>1 Variable -&gt; R2 = 53.80</a:t>
+              <a:t>1 Variable </a:t>
+            </a:r>
+            <a:r>
+              <a:rPr lang="en-MX" dirty="0">
+                <a:sym typeface="Wingdings" pitchFamily="2" charset="2"/>
+              </a:rPr>
+              <a:t></a:t>
+            </a:r>
+            <a:r>
+              <a:rPr lang="en-MX" dirty="0"/>
+              <a:t> R2 = 53.80%</a:t>
             </a:r>
           </a:p>
           <a:p>
             <a:pPr lvl="1"/>
             <a:r>
               <a:rPr lang="en-MX" dirty="0"/>
-              <a:t>39 Variables -&gt; R2 = 62.20%</a:t>
+              <a:t>10 Variables </a:t>
+            </a:r>
+            <a:r>
+              <a:rPr lang="en-MX" dirty="0">
+                <a:sym typeface="Wingdings" pitchFamily="2" charset="2"/>
+              </a:rPr>
+              <a:t></a:t>
+            </a:r>
+            <a:r>
+              <a:rPr lang="en-MX" dirty="0"/>
+              <a:t> R2 = 58.99%</a:t>
+            </a:r>
+          </a:p>
+          <a:p>
+            <a:pPr lvl="1"/>
+            <a:r>
+              <a:rPr lang="en-MX" dirty="0"/>
+              <a:t>39 Variables </a:t>
+            </a:r>
+            <a:r>
+              <a:rPr lang="en-MX" dirty="0">
+                <a:sym typeface="Wingdings" pitchFamily="2" charset="2"/>
+              </a:rPr>
+              <a:t></a:t>
+            </a:r>
+            <a:r>
+              <a:rPr lang="en-MX" dirty="0"/>
+              <a:t> R2 = 62.20%</a:t>
             </a:r>
           </a:p>
         </p:txBody>

</xml_diff>

<commit_message>
Minor changes, mainly typos
</commit_message>
<xml_diff>
--- a/Presentation.pptx
+++ b/Presentation.pptx
@@ -337,7 +337,7 @@
             <a:fld id="{B61BEF0D-F0BB-DE4B-95CE-6DB70DBA9567}" type="datetimeFigureOut">
               <a:rPr lang="en-US" dirty="0"/>
               <a:pPr/>
-              <a:t>3/3/21</a:t>
+              <a:t>3/4/21</a:t>
             </a:fld>
             <a:endParaRPr lang="en-US" dirty="0"/>
           </a:p>
@@ -625,7 +625,7 @@
             <a:fld id="{B61BEF0D-F0BB-DE4B-95CE-6DB70DBA9567}" type="datetimeFigureOut">
               <a:rPr lang="en-US" dirty="0"/>
               <a:pPr/>
-              <a:t>3/3/21</a:t>
+              <a:t>3/4/21</a:t>
             </a:fld>
             <a:endParaRPr lang="en-US" dirty="0"/>
           </a:p>
@@ -881,7 +881,7 @@
             <a:fld id="{B61BEF0D-F0BB-DE4B-95CE-6DB70DBA9567}" type="datetimeFigureOut">
               <a:rPr lang="en-US" dirty="0"/>
               <a:pPr/>
-              <a:t>3/3/21</a:t>
+              <a:t>3/4/21</a:t>
             </a:fld>
             <a:endParaRPr lang="en-US" dirty="0"/>
           </a:p>
@@ -1347,7 +1347,7 @@
             <a:fld id="{B61BEF0D-F0BB-DE4B-95CE-6DB70DBA9567}" type="datetimeFigureOut">
               <a:rPr lang="en-US" dirty="0"/>
               <a:pPr/>
-              <a:t>3/3/21</a:t>
+              <a:t>3/4/21</a:t>
             </a:fld>
             <a:endParaRPr lang="en-US" dirty="0"/>
           </a:p>
@@ -1524,7 +1524,7 @@
             <a:fld id="{B61BEF0D-F0BB-DE4B-95CE-6DB70DBA9567}" type="datetimeFigureOut">
               <a:rPr lang="en-US" dirty="0"/>
               <a:pPr/>
-              <a:t>3/3/21</a:t>
+              <a:t>3/4/21</a:t>
             </a:fld>
             <a:endParaRPr lang="en-US" dirty="0"/>
           </a:p>
@@ -2097,7 +2097,7 @@
             <a:fld id="{B61BEF0D-F0BB-DE4B-95CE-6DB70DBA9567}" type="datetimeFigureOut">
               <a:rPr lang="en-US" dirty="0"/>
               <a:pPr/>
-              <a:t>3/3/21</a:t>
+              <a:t>3/4/21</a:t>
             </a:fld>
             <a:endParaRPr lang="en-US" dirty="0"/>
           </a:p>
@@ -2426,7 +2426,7 @@
             <a:fld id="{B61BEF0D-F0BB-DE4B-95CE-6DB70DBA9567}" type="datetimeFigureOut">
               <a:rPr lang="en-US" dirty="0"/>
               <a:pPr/>
-              <a:t>3/3/21</a:t>
+              <a:t>3/4/21</a:t>
             </a:fld>
             <a:endParaRPr lang="en-US" dirty="0"/>
           </a:p>
@@ -2598,7 +2598,7 @@
             <a:fld id="{B61BEF0D-F0BB-DE4B-95CE-6DB70DBA9567}" type="datetimeFigureOut">
               <a:rPr lang="en-US" dirty="0"/>
               <a:pPr/>
-              <a:t>3/3/21</a:t>
+              <a:t>3/4/21</a:t>
             </a:fld>
             <a:endParaRPr lang="en-US" dirty="0"/>
           </a:p>
@@ -2775,7 +2775,7 @@
             <a:fld id="{B61BEF0D-F0BB-DE4B-95CE-6DB70DBA9567}" type="datetimeFigureOut">
               <a:rPr lang="en-US" dirty="0"/>
               <a:pPr/>
-              <a:t>3/3/21</a:t>
+              <a:t>3/4/21</a:t>
             </a:fld>
             <a:endParaRPr lang="en-US" dirty="0"/>
           </a:p>
@@ -2942,7 +2942,7 @@
             <a:fld id="{B61BEF0D-F0BB-DE4B-95CE-6DB70DBA9567}" type="datetimeFigureOut">
               <a:rPr lang="en-US" dirty="0"/>
               <a:pPr/>
-              <a:t>3/3/21</a:t>
+              <a:t>3/4/21</a:t>
             </a:fld>
             <a:endParaRPr lang="en-US" dirty="0"/>
           </a:p>
@@ -3196,7 +3196,7 @@
             <a:fld id="{B61BEF0D-F0BB-DE4B-95CE-6DB70DBA9567}" type="datetimeFigureOut">
               <a:rPr lang="en-US" dirty="0"/>
               <a:pPr/>
-              <a:t>3/3/21</a:t>
+              <a:t>3/4/21</a:t>
             </a:fld>
             <a:endParaRPr lang="en-US" dirty="0"/>
           </a:p>
@@ -3485,7 +3485,7 @@
             <a:fld id="{B61BEF0D-F0BB-DE4B-95CE-6DB70DBA9567}" type="datetimeFigureOut">
               <a:rPr lang="en-US" dirty="0"/>
               <a:pPr/>
-              <a:t>3/3/21</a:t>
+              <a:t>3/4/21</a:t>
             </a:fld>
             <a:endParaRPr lang="en-US" dirty="0"/>
           </a:p>
@@ -3912,7 +3912,7 @@
             <a:fld id="{B61BEF0D-F0BB-DE4B-95CE-6DB70DBA9567}" type="datetimeFigureOut">
               <a:rPr lang="en-US" dirty="0"/>
               <a:pPr/>
-              <a:t>3/3/21</a:t>
+              <a:t>3/4/21</a:t>
             </a:fld>
             <a:endParaRPr lang="en-US" dirty="0"/>
           </a:p>
@@ -4027,7 +4027,7 @@
             <a:fld id="{B61BEF0D-F0BB-DE4B-95CE-6DB70DBA9567}" type="datetimeFigureOut">
               <a:rPr lang="en-US" dirty="0"/>
               <a:pPr/>
-              <a:t>3/3/21</a:t>
+              <a:t>3/4/21</a:t>
             </a:fld>
             <a:endParaRPr lang="en-US" dirty="0"/>
           </a:p>
@@ -4119,7 +4119,7 @@
             <a:fld id="{B61BEF0D-F0BB-DE4B-95CE-6DB70DBA9567}" type="datetimeFigureOut">
               <a:rPr lang="en-US" dirty="0"/>
               <a:pPr/>
-              <a:t>3/3/21</a:t>
+              <a:t>3/4/21</a:t>
             </a:fld>
             <a:endParaRPr lang="en-US" dirty="0"/>
           </a:p>
@@ -4399,7 +4399,7 @@
             <a:fld id="{B61BEF0D-F0BB-DE4B-95CE-6DB70DBA9567}" type="datetimeFigureOut">
               <a:rPr lang="en-US" dirty="0"/>
               <a:pPr/>
-              <a:t>3/3/21</a:t>
+              <a:t>3/4/21</a:t>
             </a:fld>
             <a:endParaRPr lang="en-US" dirty="0"/>
           </a:p>
@@ -4687,7 +4687,7 @@
             <a:fld id="{B61BEF0D-F0BB-DE4B-95CE-6DB70DBA9567}" type="datetimeFigureOut">
               <a:rPr lang="en-US" dirty="0"/>
               <a:pPr/>
-              <a:t>3/3/21</a:t>
+              <a:t>3/4/21</a:t>
             </a:fld>
             <a:endParaRPr lang="en-US" dirty="0"/>
           </a:p>
@@ -4915,7 +4915,7 @@
             <a:fld id="{B61BEF0D-F0BB-DE4B-95CE-6DB70DBA9567}" type="datetimeFigureOut">
               <a:rPr lang="en-US" dirty="0"/>
               <a:pPr/>
-              <a:t>3/3/21</a:t>
+              <a:t>3/4/21</a:t>
             </a:fld>
             <a:endParaRPr lang="en-US" dirty="0"/>
           </a:p>
@@ -7230,7 +7230,7 @@
           <a:p>
             <a:r>
               <a:rPr lang="en-MX" dirty="0"/>
-              <a:t>Important to keep track of this data and look for explanations to the outliers and missing data that wa no t considered on this analysis</a:t>
+              <a:t>Important to keep track of this data and look for explanations to the outliers and missing data that wass not considered on this analysis</a:t>
             </a:r>
           </a:p>
         </p:txBody>
@@ -8274,14 +8274,34 @@
             </a:r>
             <a:r>
               <a:rPr lang="en-MX" dirty="0"/>
-              <a:t>iesel tanks = 400 liters –&gt; ~ 300,000 Diesel Liters on the roads                                          (Considering full medium tank in Average per truck)</a:t>
+              <a:t>iesel tanks = 400 liters </a:t>
+            </a:r>
+            <a:r>
+              <a:rPr lang="en-MX" dirty="0">
+                <a:sym typeface="Wingdings" pitchFamily="2" charset="2"/>
+              </a:rPr>
+              <a:t></a:t>
+            </a:r>
+            <a:r>
+              <a:rPr lang="en-MX" dirty="0"/>
+              <a:t> ~ 300,000 Diesel Liters on the roads                                          (Considering full medium tank in Average per truck)</a:t>
             </a:r>
           </a:p>
           <a:p>
             <a:pPr lvl="2"/>
             <a:r>
               <a:rPr lang="en-MX" dirty="0"/>
-              <a:t>$20 MXN per Liter -&gt; $6’000,000 MXN are on the roads every day in diesel form</a:t>
+              <a:t>$20 MXN per Liter </a:t>
+            </a:r>
+            <a:r>
+              <a:rPr lang="en-MX" dirty="0">
+                <a:sym typeface="Wingdings" pitchFamily="2" charset="2"/>
+              </a:rPr>
+              <a:t></a:t>
+            </a:r>
+            <a:r>
+              <a:rPr lang="en-MX" dirty="0"/>
+              <a:t> $6’000,000 MXN are on the roads every day in diesel form</a:t>
             </a:r>
           </a:p>
           <a:p>

</xml_diff>

<commit_message>
Intermediate version with some improvements
</commit_message>
<xml_diff>
--- a/Presentation.pptx
+++ b/Presentation.pptx
@@ -8,9 +8,9 @@
     <p:sldId id="256" r:id="rId2"/>
     <p:sldId id="257" r:id="rId3"/>
     <p:sldId id="258" r:id="rId4"/>
-    <p:sldId id="259" r:id="rId5"/>
-    <p:sldId id="260" r:id="rId6"/>
-    <p:sldId id="262" r:id="rId7"/>
+    <p:sldId id="269" r:id="rId5"/>
+    <p:sldId id="270" r:id="rId6"/>
+    <p:sldId id="260" r:id="rId7"/>
     <p:sldId id="261" r:id="rId8"/>
     <p:sldId id="263" r:id="rId9"/>
     <p:sldId id="264" r:id="rId10"/>
@@ -337,7 +337,7 @@
             <a:fld id="{B61BEF0D-F0BB-DE4B-95CE-6DB70DBA9567}" type="datetimeFigureOut">
               <a:rPr lang="en-US" dirty="0"/>
               <a:pPr/>
-              <a:t>3/4/21</a:t>
+              <a:t>3/7/21</a:t>
             </a:fld>
             <a:endParaRPr lang="en-US" dirty="0"/>
           </a:p>
@@ -625,7 +625,7 @@
             <a:fld id="{B61BEF0D-F0BB-DE4B-95CE-6DB70DBA9567}" type="datetimeFigureOut">
               <a:rPr lang="en-US" dirty="0"/>
               <a:pPr/>
-              <a:t>3/4/21</a:t>
+              <a:t>3/7/21</a:t>
             </a:fld>
             <a:endParaRPr lang="en-US" dirty="0"/>
           </a:p>
@@ -881,7 +881,7 @@
             <a:fld id="{B61BEF0D-F0BB-DE4B-95CE-6DB70DBA9567}" type="datetimeFigureOut">
               <a:rPr lang="en-US" dirty="0"/>
               <a:pPr/>
-              <a:t>3/4/21</a:t>
+              <a:t>3/7/21</a:t>
             </a:fld>
             <a:endParaRPr lang="en-US" dirty="0"/>
           </a:p>
@@ -1347,7 +1347,7 @@
             <a:fld id="{B61BEF0D-F0BB-DE4B-95CE-6DB70DBA9567}" type="datetimeFigureOut">
               <a:rPr lang="en-US" dirty="0"/>
               <a:pPr/>
-              <a:t>3/4/21</a:t>
+              <a:t>3/7/21</a:t>
             </a:fld>
             <a:endParaRPr lang="en-US" dirty="0"/>
           </a:p>
@@ -1524,7 +1524,7 @@
             <a:fld id="{B61BEF0D-F0BB-DE4B-95CE-6DB70DBA9567}" type="datetimeFigureOut">
               <a:rPr lang="en-US" dirty="0"/>
               <a:pPr/>
-              <a:t>3/4/21</a:t>
+              <a:t>3/7/21</a:t>
             </a:fld>
             <a:endParaRPr lang="en-US" dirty="0"/>
           </a:p>
@@ -2097,7 +2097,7 @@
             <a:fld id="{B61BEF0D-F0BB-DE4B-95CE-6DB70DBA9567}" type="datetimeFigureOut">
               <a:rPr lang="en-US" dirty="0"/>
               <a:pPr/>
-              <a:t>3/4/21</a:t>
+              <a:t>3/7/21</a:t>
             </a:fld>
             <a:endParaRPr lang="en-US" dirty="0"/>
           </a:p>
@@ -2426,7 +2426,7 @@
             <a:fld id="{B61BEF0D-F0BB-DE4B-95CE-6DB70DBA9567}" type="datetimeFigureOut">
               <a:rPr lang="en-US" dirty="0"/>
               <a:pPr/>
-              <a:t>3/4/21</a:t>
+              <a:t>3/7/21</a:t>
             </a:fld>
             <a:endParaRPr lang="en-US" dirty="0"/>
           </a:p>
@@ -2598,7 +2598,7 @@
             <a:fld id="{B61BEF0D-F0BB-DE4B-95CE-6DB70DBA9567}" type="datetimeFigureOut">
               <a:rPr lang="en-US" dirty="0"/>
               <a:pPr/>
-              <a:t>3/4/21</a:t>
+              <a:t>3/7/21</a:t>
             </a:fld>
             <a:endParaRPr lang="en-US" dirty="0"/>
           </a:p>
@@ -2775,7 +2775,7 @@
             <a:fld id="{B61BEF0D-F0BB-DE4B-95CE-6DB70DBA9567}" type="datetimeFigureOut">
               <a:rPr lang="en-US" dirty="0"/>
               <a:pPr/>
-              <a:t>3/4/21</a:t>
+              <a:t>3/7/21</a:t>
             </a:fld>
             <a:endParaRPr lang="en-US" dirty="0"/>
           </a:p>
@@ -2942,7 +2942,7 @@
             <a:fld id="{B61BEF0D-F0BB-DE4B-95CE-6DB70DBA9567}" type="datetimeFigureOut">
               <a:rPr lang="en-US" dirty="0"/>
               <a:pPr/>
-              <a:t>3/4/21</a:t>
+              <a:t>3/7/21</a:t>
             </a:fld>
             <a:endParaRPr lang="en-US" dirty="0"/>
           </a:p>
@@ -3196,7 +3196,7 @@
             <a:fld id="{B61BEF0D-F0BB-DE4B-95CE-6DB70DBA9567}" type="datetimeFigureOut">
               <a:rPr lang="en-US" dirty="0"/>
               <a:pPr/>
-              <a:t>3/4/21</a:t>
+              <a:t>3/7/21</a:t>
             </a:fld>
             <a:endParaRPr lang="en-US" dirty="0"/>
           </a:p>
@@ -3485,7 +3485,7 @@
             <a:fld id="{B61BEF0D-F0BB-DE4B-95CE-6DB70DBA9567}" type="datetimeFigureOut">
               <a:rPr lang="en-US" dirty="0"/>
               <a:pPr/>
-              <a:t>3/4/21</a:t>
+              <a:t>3/7/21</a:t>
             </a:fld>
             <a:endParaRPr lang="en-US" dirty="0"/>
           </a:p>
@@ -3912,7 +3912,7 @@
             <a:fld id="{B61BEF0D-F0BB-DE4B-95CE-6DB70DBA9567}" type="datetimeFigureOut">
               <a:rPr lang="en-US" dirty="0"/>
               <a:pPr/>
-              <a:t>3/4/21</a:t>
+              <a:t>3/7/21</a:t>
             </a:fld>
             <a:endParaRPr lang="en-US" dirty="0"/>
           </a:p>
@@ -4027,7 +4027,7 @@
             <a:fld id="{B61BEF0D-F0BB-DE4B-95CE-6DB70DBA9567}" type="datetimeFigureOut">
               <a:rPr lang="en-US" dirty="0"/>
               <a:pPr/>
-              <a:t>3/4/21</a:t>
+              <a:t>3/7/21</a:t>
             </a:fld>
             <a:endParaRPr lang="en-US" dirty="0"/>
           </a:p>
@@ -4119,7 +4119,7 @@
             <a:fld id="{B61BEF0D-F0BB-DE4B-95CE-6DB70DBA9567}" type="datetimeFigureOut">
               <a:rPr lang="en-US" dirty="0"/>
               <a:pPr/>
-              <a:t>3/4/21</a:t>
+              <a:t>3/7/21</a:t>
             </a:fld>
             <a:endParaRPr lang="en-US" dirty="0"/>
           </a:p>
@@ -4399,7 +4399,7 @@
             <a:fld id="{B61BEF0D-F0BB-DE4B-95CE-6DB70DBA9567}" type="datetimeFigureOut">
               <a:rPr lang="en-US" dirty="0"/>
               <a:pPr/>
-              <a:t>3/4/21</a:t>
+              <a:t>3/7/21</a:t>
             </a:fld>
             <a:endParaRPr lang="en-US" dirty="0"/>
           </a:p>
@@ -4687,7 +4687,7 @@
             <a:fld id="{B61BEF0D-F0BB-DE4B-95CE-6DB70DBA9567}" type="datetimeFigureOut">
               <a:rPr lang="en-US" dirty="0"/>
               <a:pPr/>
-              <a:t>3/4/21</a:t>
+              <a:t>3/7/21</a:t>
             </a:fld>
             <a:endParaRPr lang="en-US" dirty="0"/>
           </a:p>
@@ -4915,7 +4915,7 @@
             <a:fld id="{B61BEF0D-F0BB-DE4B-95CE-6DB70DBA9567}" type="datetimeFigureOut">
               <a:rPr lang="en-US" dirty="0"/>
               <a:pPr/>
-              <a:t>3/4/21</a:t>
+              <a:t>3/7/21</a:t>
             </a:fld>
             <a:endParaRPr lang="en-US" dirty="0"/>
           </a:p>
@@ -7136,7 +7136,12 @@
             <p:ph idx="1"/>
           </p:nvPr>
         </p:nvSpPr>
-        <p:spPr/>
+        <p:spPr>
+          <a:xfrm>
+            <a:off x="1141413" y="2188723"/>
+            <a:ext cx="9905998" cy="3602477"/>
+          </a:xfrm>
+        </p:spPr>
         <p:txBody>
           <a:bodyPr>
             <a:normAutofit fontScale="70000" lnSpcReduction="20000"/>
@@ -7185,7 +7190,7 @@
             </a:r>
             <a:r>
               <a:rPr lang="en-MX" dirty="0"/>
-              <a:t>+ 2.2 extra liters per day</a:t>
+              <a:t>+ 2.2 extra liters per day per truck</a:t>
             </a:r>
           </a:p>
           <a:p>
@@ -7198,7 +7203,7 @@
               <a:rPr lang="en-MX" dirty="0">
                 <a:sym typeface="Wingdings" pitchFamily="2" charset="2"/>
               </a:rPr>
-              <a:t> + $44 MXN per truck per day</a:t>
+              <a:t> + $44 MXN per day per truck</a:t>
             </a:r>
           </a:p>
           <a:p>
@@ -7340,13 +7345,13 @@
           <a:p>
             <a:r>
               <a:rPr lang="en-MX" dirty="0"/>
-              <a:t>Deployment and Next Steps</a:t>
+              <a:t>Model Comparison</a:t>
             </a:r>
           </a:p>
           <a:p>
             <a:r>
               <a:rPr lang="en-MX" dirty="0"/>
-              <a:t>Conclusions</a:t>
+              <a:t>Conclusions and Next Steps</a:t>
             </a:r>
           </a:p>
         </p:txBody>
@@ -7474,21 +7479,21 @@
             <a:pPr lvl="1"/>
             <a:r>
               <a:rPr lang="en-MX" dirty="0"/>
-              <a:t>Applied Mathematician - ITAM</a:t>
+              <a:t>Applied Mathematician – ITAM, CDMX</a:t>
             </a:r>
           </a:p>
           <a:p>
             <a:pPr lvl="1"/>
             <a:r>
               <a:rPr lang="en-MX" dirty="0"/>
-              <a:t>MSc and PhD in Mathematics and Statistics - the University of Warwick</a:t>
+              <a:t>MSc and PhD in Mathematics and Statistics - the University of Warwick, UK</a:t>
             </a:r>
           </a:p>
           <a:p>
             <a:pPr lvl="1"/>
             <a:r>
               <a:rPr lang="en-MX" dirty="0"/>
-              <a:t>Working at Cemex for 2 Years</a:t>
+              <a:t>Working at Cemex for 2 Years, MTY</a:t>
             </a:r>
           </a:p>
         </p:txBody>
@@ -7959,7 +7964,7 @@
             <a:pPr lvl="1"/>
             <a:r>
               <a:rPr lang="en-MX" dirty="0"/>
-              <a:t>Mathematical Idea: Find the most relevant factors that affects the fuel consumption in the ready-mix trucks</a:t>
+              <a:t>Mathematical Idea: Find the most relevant factors that affects the fuel consumption in the ready-mix trucks operation</a:t>
             </a:r>
           </a:p>
           <a:p>
@@ -8233,8 +8238,8 @@
         </p:nvSpPr>
         <p:spPr>
           <a:xfrm>
-            <a:off x="1141413" y="2613460"/>
-            <a:ext cx="9905998" cy="3461952"/>
+            <a:off x="1141413" y="2422187"/>
+            <a:ext cx="9905998" cy="3653225"/>
           </a:xfrm>
         </p:spPr>
         <p:txBody>
@@ -8256,53 +8261,13 @@
             </a:r>
           </a:p>
           <a:p>
-            <a:pPr lvl="2"/>
-            <a:r>
-              <a:rPr lang="en-GB" dirty="0"/>
-              <a:t>E</a:t>
-            </a:r>
-            <a:r>
-              <a:rPr lang="en-MX" dirty="0"/>
-              <a:t>ach day around mexico 1,500 trucks are on the streets</a:t>
-            </a:r>
-          </a:p>
-          <a:p>
-            <a:pPr lvl="2"/>
-            <a:r>
-              <a:rPr lang="en-GB" dirty="0"/>
-              <a:t>D</a:t>
-            </a:r>
-            <a:r>
-              <a:rPr lang="en-MX" dirty="0"/>
-              <a:t>iesel tanks = 400 liters </a:t>
-            </a:r>
-            <a:r>
-              <a:rPr lang="en-MX" dirty="0">
-                <a:sym typeface="Wingdings" pitchFamily="2" charset="2"/>
-              </a:rPr>
-              <a:t></a:t>
-            </a:r>
-            <a:r>
-              <a:rPr lang="en-MX" dirty="0"/>
-              <a:t> ~ 300,000 Diesel Liters on the roads                                          (Considering full medium tank in Average per truck)</a:t>
-            </a:r>
-          </a:p>
-          <a:p>
-            <a:pPr lvl="2"/>
-            <a:r>
-              <a:rPr lang="en-MX" dirty="0"/>
-              <a:t>$20 MXN per Liter </a:t>
-            </a:r>
-            <a:r>
-              <a:rPr lang="en-MX" dirty="0">
-                <a:sym typeface="Wingdings" pitchFamily="2" charset="2"/>
-              </a:rPr>
-              <a:t></a:t>
-            </a:r>
-            <a:r>
-              <a:rPr lang="en-MX" dirty="0"/>
-              <a:t> $6’000,000 MXN are on the roads every day in diesel form</a:t>
-            </a:r>
+            <a:endParaRPr lang="en-MX" dirty="0"/>
+          </a:p>
+          <a:p>
+            <a:endParaRPr lang="en-MX" dirty="0"/>
+          </a:p>
+          <a:p>
+            <a:endParaRPr lang="en-MX" dirty="0"/>
           </a:p>
           <a:p>
             <a:endParaRPr lang="en-MX" dirty="0"/>
@@ -8449,10 +8414,289 @@
           </a:prstGeom>
         </p:spPr>
       </p:pic>
+      <p:sp>
+        <p:nvSpPr>
+          <p:cNvPr id="4" name="TextBox 3">
+            <a:extLst>
+              <a:ext uri="{FF2B5EF4-FFF2-40B4-BE49-F238E27FC236}">
+                <a16:creationId xmlns:a16="http://schemas.microsoft.com/office/drawing/2014/main" id="{7723F4C5-F9A4-444D-8C0B-6B94481F771A}"/>
+              </a:ext>
+            </a:extLst>
+          </p:cNvPr>
+          <p:cNvSpPr txBox="1"/>
+          <p:nvPr/>
+        </p:nvSpPr>
+        <p:spPr>
+          <a:xfrm>
+            <a:off x="1997447" y="3579779"/>
+            <a:ext cx="5533221" cy="369332"/>
+          </a:xfrm>
+          <a:prstGeom prst="rect">
+            <a:avLst/>
+          </a:prstGeom>
+          <a:noFill/>
+        </p:spPr>
+        <p:txBody>
+          <a:bodyPr wrap="square" rtlCol="0">
+            <a:spAutoFit/>
+          </a:bodyPr>
+          <a:lstStyle/>
+          <a:p>
+            <a:r>
+              <a:rPr lang="en-MX" dirty="0"/>
+              <a:t>$6 M MXN =  1,500     *     200     *     $20 MXN</a:t>
+            </a:r>
+          </a:p>
+        </p:txBody>
+      </p:sp>
+      <p:sp>
+        <p:nvSpPr>
+          <p:cNvPr id="8" name="TextBox 7">
+            <a:extLst>
+              <a:ext uri="{FF2B5EF4-FFF2-40B4-BE49-F238E27FC236}">
+                <a16:creationId xmlns:a16="http://schemas.microsoft.com/office/drawing/2014/main" id="{7EC00E22-0F2A-CA47-B335-0776FC4B96F2}"/>
+              </a:ext>
+            </a:extLst>
+          </p:cNvPr>
+          <p:cNvSpPr txBox="1"/>
+          <p:nvPr/>
+        </p:nvSpPr>
+        <p:spPr>
+          <a:xfrm>
+            <a:off x="4055158" y="4202688"/>
+            <a:ext cx="3945842" cy="276999"/>
+          </a:xfrm>
+          <a:prstGeom prst="rect">
+            <a:avLst/>
+          </a:prstGeom>
+          <a:noFill/>
+        </p:spPr>
+        <p:txBody>
+          <a:bodyPr wrap="square" rtlCol="0">
+            <a:spAutoFit/>
+          </a:bodyPr>
+          <a:lstStyle/>
+          <a:p>
+            <a:r>
+              <a:rPr lang="en-MX" sz="1200" dirty="0"/>
+              <a:t>Operational Daily average of Ready-Mix Trucks</a:t>
+            </a:r>
+          </a:p>
+        </p:txBody>
+      </p:sp>
+      <p:sp>
+        <p:nvSpPr>
+          <p:cNvPr id="9" name="TextBox 8">
+            <a:extLst>
+              <a:ext uri="{FF2B5EF4-FFF2-40B4-BE49-F238E27FC236}">
+                <a16:creationId xmlns:a16="http://schemas.microsoft.com/office/drawing/2014/main" id="{66EF01B5-C5ED-2245-849E-5DB4B0BA1B81}"/>
+              </a:ext>
+            </a:extLst>
+          </p:cNvPr>
+          <p:cNvSpPr txBox="1"/>
+          <p:nvPr/>
+        </p:nvSpPr>
+        <p:spPr>
+          <a:xfrm>
+            <a:off x="5686551" y="3162252"/>
+            <a:ext cx="3516742" cy="276999"/>
+          </a:xfrm>
+          <a:prstGeom prst="rect">
+            <a:avLst/>
+          </a:prstGeom>
+          <a:noFill/>
+        </p:spPr>
+        <p:txBody>
+          <a:bodyPr wrap="square" rtlCol="0">
+            <a:spAutoFit/>
+          </a:bodyPr>
+          <a:lstStyle/>
+          <a:p>
+            <a:r>
+              <a:rPr lang="en-MX" sz="1200" dirty="0"/>
+              <a:t>Liters of Diesel per Truck: Half Tank (400/2)</a:t>
+            </a:r>
+          </a:p>
+        </p:txBody>
+      </p:sp>
+      <p:sp>
+        <p:nvSpPr>
+          <p:cNvPr id="11" name="TextBox 10">
+            <a:extLst>
+              <a:ext uri="{FF2B5EF4-FFF2-40B4-BE49-F238E27FC236}">
+                <a16:creationId xmlns:a16="http://schemas.microsoft.com/office/drawing/2014/main" id="{DC44061A-2329-3946-BEEB-E3EE5150A312}"/>
+              </a:ext>
+            </a:extLst>
+          </p:cNvPr>
+          <p:cNvSpPr txBox="1"/>
+          <p:nvPr/>
+        </p:nvSpPr>
+        <p:spPr>
+          <a:xfrm>
+            <a:off x="8243783" y="3625945"/>
+            <a:ext cx="3516742" cy="276999"/>
+          </a:xfrm>
+          <a:prstGeom prst="rect">
+            <a:avLst/>
+          </a:prstGeom>
+          <a:noFill/>
+        </p:spPr>
+        <p:txBody>
+          <a:bodyPr wrap="square" rtlCol="0">
+            <a:spAutoFit/>
+          </a:bodyPr>
+          <a:lstStyle/>
+          <a:p>
+            <a:r>
+              <a:rPr lang="en-MX" sz="1200" dirty="0"/>
+              <a:t>Price of a Liter of Diesel ($ MXN)</a:t>
+            </a:r>
+          </a:p>
+        </p:txBody>
+      </p:sp>
+      <p:cxnSp>
+        <p:nvCxnSpPr>
+          <p:cNvPr id="12" name="Elbow Connector 11">
+            <a:extLst>
+              <a:ext uri="{FF2B5EF4-FFF2-40B4-BE49-F238E27FC236}">
+                <a16:creationId xmlns:a16="http://schemas.microsoft.com/office/drawing/2014/main" id="{6B0523CA-7904-4B48-A286-00D0378DBD00}"/>
+              </a:ext>
+            </a:extLst>
+          </p:cNvPr>
+          <p:cNvCxnSpPr>
+            <a:cxnSpLocks/>
+            <a:endCxn id="8" idx="1"/>
+          </p:cNvCxnSpPr>
+          <p:nvPr/>
+        </p:nvCxnSpPr>
+        <p:spPr>
+          <a:xfrm rot="16200000" flipH="1">
+            <a:off x="3661573" y="3947603"/>
+            <a:ext cx="438250" cy="348919"/>
+          </a:xfrm>
+          <a:prstGeom prst="bentConnector2">
+            <a:avLst/>
+          </a:prstGeom>
+          <a:ln w="25400">
+            <a:solidFill>
+              <a:schemeClr val="tx1"/>
+            </a:solidFill>
+            <a:tailEnd type="triangle"/>
+          </a:ln>
+        </p:spPr>
+        <p:style>
+          <a:lnRef idx="1">
+            <a:schemeClr val="accent1"/>
+          </a:lnRef>
+          <a:fillRef idx="0">
+            <a:schemeClr val="accent1"/>
+          </a:fillRef>
+          <a:effectRef idx="0">
+            <a:schemeClr val="accent1"/>
+          </a:effectRef>
+          <a:fontRef idx="minor">
+            <a:schemeClr val="tx1"/>
+          </a:fontRef>
+        </p:style>
+      </p:cxnSp>
+      <p:cxnSp>
+        <p:nvCxnSpPr>
+          <p:cNvPr id="24" name="Elbow Connector 23">
+            <a:extLst>
+              <a:ext uri="{FF2B5EF4-FFF2-40B4-BE49-F238E27FC236}">
+                <a16:creationId xmlns:a16="http://schemas.microsoft.com/office/drawing/2014/main" id="{CDC64474-A5A4-024C-A67B-BA04990CD8A9}"/>
+              </a:ext>
+            </a:extLst>
+          </p:cNvPr>
+          <p:cNvCxnSpPr>
+            <a:cxnSpLocks/>
+            <a:endCxn id="11" idx="1"/>
+          </p:cNvCxnSpPr>
+          <p:nvPr/>
+        </p:nvCxnSpPr>
+        <p:spPr>
+          <a:xfrm flipV="1">
+            <a:off x="6096000" y="3764445"/>
+            <a:ext cx="2147783" cy="184666"/>
+          </a:xfrm>
+          <a:prstGeom prst="bentConnector3">
+            <a:avLst>
+              <a:gd name="adj1" fmla="val 50000"/>
+            </a:avLst>
+          </a:prstGeom>
+          <a:ln w="25400">
+            <a:solidFill>
+              <a:schemeClr val="tx1"/>
+            </a:solidFill>
+            <a:tailEnd type="triangle"/>
+          </a:ln>
+        </p:spPr>
+        <p:style>
+          <a:lnRef idx="1">
+            <a:schemeClr val="accent1"/>
+          </a:lnRef>
+          <a:fillRef idx="0">
+            <a:schemeClr val="accent1"/>
+          </a:fillRef>
+          <a:effectRef idx="0">
+            <a:schemeClr val="accent1"/>
+          </a:effectRef>
+          <a:fontRef idx="minor">
+            <a:schemeClr val="tx1"/>
+          </a:fontRef>
+        </p:style>
+      </p:cxnSp>
+      <p:cxnSp>
+        <p:nvCxnSpPr>
+          <p:cNvPr id="32" name="Elbow Connector 31">
+            <a:extLst>
+              <a:ext uri="{FF2B5EF4-FFF2-40B4-BE49-F238E27FC236}">
+                <a16:creationId xmlns:a16="http://schemas.microsoft.com/office/drawing/2014/main" id="{CBCA6F6A-EB45-6947-83FF-4D0F3ABFFA8A}"/>
+              </a:ext>
+            </a:extLst>
+          </p:cNvPr>
+          <p:cNvCxnSpPr>
+            <a:cxnSpLocks/>
+            <a:endCxn id="9" idx="1"/>
+          </p:cNvCxnSpPr>
+          <p:nvPr/>
+        </p:nvCxnSpPr>
+        <p:spPr>
+          <a:xfrm flipV="1">
+            <a:off x="4999818" y="3300752"/>
+            <a:ext cx="686733" cy="296900"/>
+          </a:xfrm>
+          <a:prstGeom prst="bentConnector3">
+            <a:avLst>
+              <a:gd name="adj1" fmla="val -382"/>
+            </a:avLst>
+          </a:prstGeom>
+          <a:ln w="25400">
+            <a:solidFill>
+              <a:schemeClr val="tx1"/>
+            </a:solidFill>
+            <a:tailEnd type="triangle"/>
+          </a:ln>
+        </p:spPr>
+        <p:style>
+          <a:lnRef idx="1">
+            <a:schemeClr val="accent1"/>
+          </a:lnRef>
+          <a:fillRef idx="0">
+            <a:schemeClr val="accent1"/>
+          </a:fillRef>
+          <a:effectRef idx="0">
+            <a:schemeClr val="accent1"/>
+          </a:effectRef>
+          <a:fontRef idx="minor">
+            <a:schemeClr val="tx1"/>
+          </a:fontRef>
+        </p:style>
+      </p:cxnSp>
     </p:spTree>
     <p:extLst>
       <p:ext uri="{BB962C8B-B14F-4D97-AF65-F5344CB8AC3E}">
-        <p14:creationId xmlns:p14="http://schemas.microsoft.com/office/powerpoint/2010/main" val="3315167020"/>
+        <p14:creationId xmlns:p14="http://schemas.microsoft.com/office/powerpoint/2010/main" val="2192882820"/>
       </p:ext>
     </p:extLst>
   </p:cSld>
@@ -8484,7 +8728,7 @@
           <p:cNvPr id="2" name="Title 1">
             <a:extLst>
               <a:ext uri="{FF2B5EF4-FFF2-40B4-BE49-F238E27FC236}">
-                <a16:creationId xmlns:a16="http://schemas.microsoft.com/office/drawing/2014/main" id="{779D1011-5B63-3841-9C43-B4EFBFCA0D6B}"/>
+                <a16:creationId xmlns:a16="http://schemas.microsoft.com/office/drawing/2014/main" id="{BB3F8026-63FB-E446-A39B-7E6338124BA4}"/>
               </a:ext>
             </a:extLst>
           </p:cNvPr>
@@ -8502,11 +8746,11 @@
           <a:p>
             <a:r>
               <a:rPr lang="en-GB" dirty="0"/>
-              <a:t>D</a:t>
+              <a:t>P</a:t>
             </a:r>
             <a:r>
               <a:rPr lang="en-MX" dirty="0"/>
-              <a:t>ata analysis</a:t>
+              <a:t>roblem Statement</a:t>
             </a:r>
           </a:p>
         </p:txBody>
@@ -8516,7 +8760,7 @@
           <p:cNvPr id="3" name="Content Placeholder 2">
             <a:extLst>
               <a:ext uri="{FF2B5EF4-FFF2-40B4-BE49-F238E27FC236}">
-                <a16:creationId xmlns:a16="http://schemas.microsoft.com/office/drawing/2014/main" id="{A6085812-135B-6C4D-8B46-EA1B3F282122}"/>
+                <a16:creationId xmlns:a16="http://schemas.microsoft.com/office/drawing/2014/main" id="{1C51914D-E039-D845-83DF-4B8F10016ED9}"/>
               </a:ext>
             </a:extLst>
           </p:cNvPr>
@@ -8529,139 +8773,619 @@
         </p:nvSpPr>
         <p:spPr>
           <a:xfrm>
-            <a:off x="1141413" y="2373549"/>
-            <a:ext cx="9905998" cy="3874851"/>
+            <a:off x="1141413" y="2422187"/>
+            <a:ext cx="9905998" cy="3653225"/>
           </a:xfrm>
         </p:spPr>
         <p:txBody>
           <a:bodyPr>
-            <a:normAutofit lnSpcReduction="10000"/>
+            <a:normAutofit fontScale="92500" lnSpcReduction="10000"/>
           </a:bodyPr>
           <a:lstStyle/>
           <a:p>
             <a:r>
               <a:rPr lang="en-MX" dirty="0"/>
-              <a:t>Data characteristics</a:t>
+              <a:t>The Diesel represents one of the main insumptions in our company:</a:t>
             </a:r>
           </a:p>
           <a:p>
             <a:pPr lvl="1"/>
             <a:r>
               <a:rPr lang="en-MX" dirty="0"/>
-              <a:t>Daily entries from a complete year (2020). Each entry represents one truck on that day together with ~25 different features:</a:t>
+              <a:t>Cemex has around 2,400 ready-mix trucks</a:t>
+            </a:r>
+          </a:p>
+          <a:p>
+            <a:endParaRPr lang="en-MX" dirty="0"/>
+          </a:p>
+          <a:p>
+            <a:endParaRPr lang="en-MX" dirty="0"/>
+          </a:p>
+          <a:p>
+            <a:endParaRPr lang="en-MX" dirty="0"/>
+          </a:p>
+          <a:p>
+            <a:endParaRPr lang="en-MX" dirty="0"/>
+          </a:p>
+          <a:p>
+            <a:r>
+              <a:rPr lang="en-MX" dirty="0"/>
+              <a:t>The Fuel Consumption changes according the local conditions</a:t>
+            </a:r>
+          </a:p>
+          <a:p>
+            <a:pPr lvl="1"/>
+            <a:r>
+              <a:rPr lang="en-GB" dirty="0"/>
+              <a:t>T</a:t>
+            </a:r>
+            <a:r>
+              <a:rPr lang="en-MX" dirty="0"/>
+              <a:t>aking that into  account when is the Fuel Consumption too high?</a:t>
             </a:r>
           </a:p>
           <a:p>
             <a:pPr lvl="2"/>
             <a:r>
-              <a:rPr lang="en-GB" dirty="0"/>
-              <a:t>M</a:t>
-            </a:r>
-            <a:r>
               <a:rPr lang="en-MX" dirty="0"/>
-              <a:t>anufacturer</a:t>
-            </a:r>
-          </a:p>
-          <a:p>
-            <a:pPr lvl="2"/>
-            <a:r>
-              <a:rPr lang="en-GB" dirty="0"/>
-              <a:t>Year model</a:t>
-            </a:r>
-          </a:p>
-          <a:p>
-            <a:pPr lvl="2"/>
-            <a:r>
-              <a:rPr lang="en-GB" dirty="0"/>
-              <a:t>A</a:t>
-            </a:r>
-            <a:r>
-              <a:rPr lang="en-MX" dirty="0"/>
-              <a:t>verage speed</a:t>
-            </a:r>
-          </a:p>
-          <a:p>
-            <a:pPr lvl="2"/>
-            <a:r>
-              <a:rPr lang="en-MX" dirty="0"/>
-              <a:t>mileage</a:t>
-            </a:r>
-          </a:p>
-          <a:p>
-            <a:pPr lvl="2"/>
-            <a:r>
-              <a:rPr lang="en-GB" dirty="0"/>
-              <a:t>I</a:t>
-            </a:r>
-            <a:r>
-              <a:rPr lang="en-MX" dirty="0"/>
-              <a:t>dle time</a:t>
-            </a:r>
-          </a:p>
-          <a:p>
-            <a:pPr lvl="2"/>
-            <a:r>
-              <a:rPr lang="en-MX" dirty="0"/>
-              <a:t>Volume of Ready-Mix Transported</a:t>
-            </a:r>
-          </a:p>
-          <a:p>
-            <a:pPr lvl="2"/>
-            <a:r>
-              <a:rPr lang="en-GB" dirty="0"/>
-              <a:t>A</a:t>
-            </a:r>
-            <a:r>
-              <a:rPr lang="en-MX" dirty="0"/>
-              <a:t>mount of different mechanical/Safety events (~15 variables):</a:t>
+              <a:t>Is there anything that can be done to improve it</a:t>
             </a:r>
           </a:p>
           <a:p>
             <a:pPr lvl="3"/>
-            <a:r>
-              <a:rPr lang="es-ES" dirty="0" err="1"/>
-              <a:t>Overspeeding</a:t>
-            </a:r>
-            <a:r>
-              <a:rPr lang="es-ES" dirty="0"/>
-              <a:t>, High/</a:t>
-            </a:r>
-            <a:r>
-              <a:rPr lang="es-ES" dirty="0" err="1"/>
-              <a:t>Low</a:t>
-            </a:r>
-            <a:r>
-              <a:rPr lang="es-ES" dirty="0"/>
-              <a:t> RPM, </a:t>
-            </a:r>
-            <a:r>
-              <a:rPr lang="es-ES" dirty="0" err="1"/>
-              <a:t>accelerations</a:t>
-            </a:r>
-            <a:r>
-              <a:rPr lang="es-ES" dirty="0"/>
-              <a:t>, </a:t>
-            </a:r>
-            <a:r>
-              <a:rPr lang="es-ES" dirty="0" err="1"/>
-              <a:t>brakes</a:t>
-            </a:r>
-            <a:r>
-              <a:rPr lang="es-ES" dirty="0"/>
-              <a:t>, </a:t>
-            </a:r>
-            <a:r>
-              <a:rPr lang="es-ES" dirty="0" err="1"/>
-              <a:t>etc</a:t>
-            </a:r>
             <a:endParaRPr lang="en-MX" dirty="0"/>
+          </a:p>
+        </p:txBody>
+      </p:sp>
+      <p:pic>
+        <p:nvPicPr>
+          <p:cNvPr id="5" name="Picture 4">
+            <a:extLst>
+              <a:ext uri="{FF2B5EF4-FFF2-40B4-BE49-F238E27FC236}">
+                <a16:creationId xmlns:a16="http://schemas.microsoft.com/office/drawing/2014/main" id="{02FA4778-0277-D244-A77E-5F03FB37A68F}"/>
+              </a:ext>
+            </a:extLst>
+          </p:cNvPr>
+          <p:cNvPicPr>
+            <a:picLocks noChangeAspect="1"/>
+          </p:cNvPicPr>
+          <p:nvPr/>
+        </p:nvPicPr>
+        <p:blipFill>
+          <a:blip r:embed="rId2"/>
+          <a:stretch>
+            <a:fillRect/>
+          </a:stretch>
+        </p:blipFill>
+        <p:spPr>
+          <a:xfrm>
+            <a:off x="5762366" y="430427"/>
+            <a:ext cx="1905000" cy="1905000"/>
+          </a:xfrm>
+          <a:prstGeom prst="rect">
+            <a:avLst/>
+          </a:prstGeom>
+        </p:spPr>
+      </p:pic>
+      <p:sp>
+        <p:nvSpPr>
+          <p:cNvPr id="6" name="Right Arrow 5">
+            <a:extLst>
+              <a:ext uri="{FF2B5EF4-FFF2-40B4-BE49-F238E27FC236}">
+                <a16:creationId xmlns:a16="http://schemas.microsoft.com/office/drawing/2014/main" id="{49DBF241-FD2C-3A42-A8B3-094EDDEBD83B}"/>
+              </a:ext>
+            </a:extLst>
+          </p:cNvPr>
+          <p:cNvSpPr/>
+          <p:nvPr/>
+        </p:nvSpPr>
+        <p:spPr>
+          <a:xfrm>
+            <a:off x="8001000" y="1079671"/>
+            <a:ext cx="1155356" cy="606511"/>
+          </a:xfrm>
+          <a:prstGeom prst="rightArrow">
+            <a:avLst/>
+          </a:prstGeom>
+        </p:spPr>
+        <p:style>
+          <a:lnRef idx="2">
+            <a:schemeClr val="accent1">
+              <a:shade val="50000"/>
+            </a:schemeClr>
+          </a:lnRef>
+          <a:fillRef idx="1">
+            <a:schemeClr val="accent1"/>
+          </a:fillRef>
+          <a:effectRef idx="0">
+            <a:schemeClr val="accent1"/>
+          </a:effectRef>
+          <a:fontRef idx="minor">
+            <a:schemeClr val="lt1"/>
+          </a:fontRef>
+        </p:style>
+        <p:txBody>
+          <a:bodyPr rtlCol="0" anchor="ctr"/>
+          <a:lstStyle/>
+          <a:p>
+            <a:pPr algn="ctr"/>
+            <a:endParaRPr lang="en-MX"/>
+          </a:p>
+        </p:txBody>
+      </p:sp>
+      <p:pic>
+        <p:nvPicPr>
+          <p:cNvPr id="10" name="Picture 9">
+            <a:extLst>
+              <a:ext uri="{FF2B5EF4-FFF2-40B4-BE49-F238E27FC236}">
+                <a16:creationId xmlns:a16="http://schemas.microsoft.com/office/drawing/2014/main" id="{45A85300-EBC0-2843-A0E2-E6314D736484}"/>
+              </a:ext>
+            </a:extLst>
+          </p:cNvPr>
+          <p:cNvPicPr>
+            <a:picLocks noChangeAspect="1"/>
+          </p:cNvPicPr>
+          <p:nvPr/>
+        </p:nvPicPr>
+        <p:blipFill>
+          <a:blip r:embed="rId3">
+            <a:extLst>
+              <a:ext uri="{837473B0-CC2E-450A-ABE3-18F120FF3D39}">
+                <a1611:picAttrSrcUrl xmlns:a1611="http://schemas.microsoft.com/office/drawing/2016/11/main" r:id="rId4"/>
+              </a:ext>
+            </a:extLst>
+          </a:blip>
+          <a:stretch>
+            <a:fillRect/>
+          </a:stretch>
+        </p:blipFill>
+        <p:spPr>
+          <a:xfrm>
+            <a:off x="9492048" y="794951"/>
+            <a:ext cx="2172456" cy="1534297"/>
+          </a:xfrm>
+          <a:prstGeom prst="rect">
+            <a:avLst/>
+          </a:prstGeom>
+        </p:spPr>
+      </p:pic>
+      <p:sp>
+        <p:nvSpPr>
+          <p:cNvPr id="4" name="TextBox 3">
+            <a:extLst>
+              <a:ext uri="{FF2B5EF4-FFF2-40B4-BE49-F238E27FC236}">
+                <a16:creationId xmlns:a16="http://schemas.microsoft.com/office/drawing/2014/main" id="{7723F4C5-F9A4-444D-8C0B-6B94481F771A}"/>
+              </a:ext>
+            </a:extLst>
+          </p:cNvPr>
+          <p:cNvSpPr txBox="1"/>
+          <p:nvPr/>
+        </p:nvSpPr>
+        <p:spPr>
+          <a:xfrm>
+            <a:off x="1909897" y="3579779"/>
+            <a:ext cx="6246335" cy="369332"/>
+          </a:xfrm>
+          <a:prstGeom prst="rect">
+            <a:avLst/>
+          </a:prstGeom>
+          <a:noFill/>
+        </p:spPr>
+        <p:txBody>
+          <a:bodyPr wrap="square" rtlCol="0">
+            <a:spAutoFit/>
+          </a:bodyPr>
+          <a:lstStyle/>
+          <a:p>
+            <a:r>
+              <a:rPr lang="en-MX" b="1" dirty="0"/>
+              <a:t>$2.25 M MXN =  </a:t>
+            </a:r>
+            <a:r>
+              <a:rPr lang="en-MX" b="1" dirty="0">
+                <a:solidFill>
+                  <a:srgbClr val="0070C0"/>
+                </a:solidFill>
+              </a:rPr>
+              <a:t>1,500</a:t>
+            </a:r>
+            <a:r>
+              <a:rPr lang="en-MX" b="1" dirty="0"/>
+              <a:t>   *   </a:t>
+            </a:r>
+            <a:r>
+              <a:rPr lang="en-MX" b="1" dirty="0">
+                <a:solidFill>
+                  <a:srgbClr val="FF0000"/>
+                </a:solidFill>
+              </a:rPr>
+              <a:t>10</a:t>
+            </a:r>
+            <a:r>
+              <a:rPr lang="en-MX" b="1" dirty="0"/>
+              <a:t>   *   </a:t>
+            </a:r>
+            <a:r>
+              <a:rPr lang="en-MX" b="1" dirty="0">
+                <a:solidFill>
+                  <a:srgbClr val="FFC000"/>
+                </a:solidFill>
+              </a:rPr>
+              <a:t>7.5</a:t>
+            </a:r>
+            <a:r>
+              <a:rPr lang="en-MX" b="1" dirty="0"/>
+              <a:t>   *   </a:t>
+            </a:r>
+            <a:r>
+              <a:rPr lang="en-MX" b="1" dirty="0">
+                <a:solidFill>
+                  <a:srgbClr val="00B050"/>
+                </a:solidFill>
+              </a:rPr>
+              <a:t>$20 MXN</a:t>
+            </a:r>
+          </a:p>
+        </p:txBody>
+      </p:sp>
+      <p:sp>
+        <p:nvSpPr>
+          <p:cNvPr id="8" name="TextBox 7">
+            <a:extLst>
+              <a:ext uri="{FF2B5EF4-FFF2-40B4-BE49-F238E27FC236}">
+                <a16:creationId xmlns:a16="http://schemas.microsoft.com/office/drawing/2014/main" id="{7EC00E22-0F2A-CA47-B335-0776FC4B96F2}"/>
+              </a:ext>
+            </a:extLst>
+          </p:cNvPr>
+          <p:cNvSpPr txBox="1"/>
+          <p:nvPr/>
+        </p:nvSpPr>
+        <p:spPr>
+          <a:xfrm>
+            <a:off x="1351186" y="3975926"/>
+            <a:ext cx="2199727" cy="461665"/>
+          </a:xfrm>
+          <a:prstGeom prst="rect">
+            <a:avLst/>
+          </a:prstGeom>
+          <a:noFill/>
+        </p:spPr>
+        <p:txBody>
+          <a:bodyPr wrap="square" rtlCol="0">
+            <a:spAutoFit/>
+          </a:bodyPr>
+          <a:lstStyle/>
+          <a:p>
+            <a:r>
+              <a:rPr lang="en-MX" sz="1200" dirty="0">
+                <a:solidFill>
+                  <a:srgbClr val="0070C0"/>
+                </a:solidFill>
+              </a:rPr>
+              <a:t>Operational Daily average of Ready-Mix Trucks</a:t>
+            </a:r>
+          </a:p>
+        </p:txBody>
+      </p:sp>
+      <p:sp>
+        <p:nvSpPr>
+          <p:cNvPr id="9" name="TextBox 8">
+            <a:extLst>
+              <a:ext uri="{FF2B5EF4-FFF2-40B4-BE49-F238E27FC236}">
+                <a16:creationId xmlns:a16="http://schemas.microsoft.com/office/drawing/2014/main" id="{66EF01B5-C5ED-2245-849E-5DB4B0BA1B81}"/>
+              </a:ext>
+            </a:extLst>
+          </p:cNvPr>
+          <p:cNvSpPr txBox="1"/>
+          <p:nvPr/>
+        </p:nvSpPr>
+        <p:spPr>
+          <a:xfrm>
+            <a:off x="1624962" y="3193755"/>
+            <a:ext cx="2654706" cy="276999"/>
+          </a:xfrm>
+          <a:prstGeom prst="rect">
+            <a:avLst/>
+          </a:prstGeom>
+          <a:noFill/>
+        </p:spPr>
+        <p:txBody>
+          <a:bodyPr wrap="square" rtlCol="0">
+            <a:spAutoFit/>
+          </a:bodyPr>
+          <a:lstStyle/>
+          <a:p>
+            <a:r>
+              <a:rPr lang="en-MX" sz="1200" dirty="0">
+                <a:solidFill>
+                  <a:srgbClr val="FF0000"/>
+                </a:solidFill>
+              </a:rPr>
+              <a:t>Average Engine Hours per Truck</a:t>
+            </a:r>
+          </a:p>
+        </p:txBody>
+      </p:sp>
+      <p:sp>
+        <p:nvSpPr>
+          <p:cNvPr id="11" name="TextBox 10">
+            <a:extLst>
+              <a:ext uri="{FF2B5EF4-FFF2-40B4-BE49-F238E27FC236}">
+                <a16:creationId xmlns:a16="http://schemas.microsoft.com/office/drawing/2014/main" id="{DC44061A-2329-3946-BEEB-E3EE5150A312}"/>
+              </a:ext>
+            </a:extLst>
+          </p:cNvPr>
+          <p:cNvSpPr txBox="1"/>
+          <p:nvPr/>
+        </p:nvSpPr>
+        <p:spPr>
+          <a:xfrm>
+            <a:off x="8852398" y="3065253"/>
+            <a:ext cx="2681516" cy="276999"/>
+          </a:xfrm>
+          <a:prstGeom prst="rect">
+            <a:avLst/>
+          </a:prstGeom>
+          <a:noFill/>
+        </p:spPr>
+        <p:txBody>
+          <a:bodyPr wrap="square" rtlCol="0">
+            <a:spAutoFit/>
+          </a:bodyPr>
+          <a:lstStyle/>
+          <a:p>
+            <a:r>
+              <a:rPr lang="en-MX" sz="1200" dirty="0">
+                <a:solidFill>
+                  <a:srgbClr val="00B050"/>
+                </a:solidFill>
+              </a:rPr>
+              <a:t>Price of a Liter of Diesel ($ MXN)</a:t>
+            </a:r>
+          </a:p>
+        </p:txBody>
+      </p:sp>
+      <p:cxnSp>
+        <p:nvCxnSpPr>
+          <p:cNvPr id="12" name="Elbow Connector 11">
+            <a:extLst>
+              <a:ext uri="{FF2B5EF4-FFF2-40B4-BE49-F238E27FC236}">
+                <a16:creationId xmlns:a16="http://schemas.microsoft.com/office/drawing/2014/main" id="{6B0523CA-7904-4B48-A286-00D0378DBD00}"/>
+              </a:ext>
+            </a:extLst>
+          </p:cNvPr>
+          <p:cNvCxnSpPr>
+            <a:cxnSpLocks/>
+            <a:endCxn id="8" idx="3"/>
+          </p:cNvCxnSpPr>
+          <p:nvPr/>
+        </p:nvCxnSpPr>
+        <p:spPr>
+          <a:xfrm rot="10800000" flipV="1">
+            <a:off x="3550913" y="3926027"/>
+            <a:ext cx="504254" cy="280732"/>
+          </a:xfrm>
+          <a:prstGeom prst="bentConnector3">
+            <a:avLst>
+              <a:gd name="adj1" fmla="val 1394"/>
+            </a:avLst>
+          </a:prstGeom>
+          <a:ln w="25400">
+            <a:solidFill>
+              <a:srgbClr val="0070C0"/>
+            </a:solidFill>
+            <a:tailEnd type="triangle"/>
+          </a:ln>
+        </p:spPr>
+        <p:style>
+          <a:lnRef idx="1">
+            <a:schemeClr val="accent1"/>
+          </a:lnRef>
+          <a:fillRef idx="0">
+            <a:schemeClr val="accent1"/>
+          </a:fillRef>
+          <a:effectRef idx="0">
+            <a:schemeClr val="accent1"/>
+          </a:effectRef>
+          <a:fontRef idx="minor">
+            <a:schemeClr val="tx1"/>
+          </a:fontRef>
+        </p:style>
+      </p:cxnSp>
+      <p:cxnSp>
+        <p:nvCxnSpPr>
+          <p:cNvPr id="24" name="Elbow Connector 23">
+            <a:extLst>
+              <a:ext uri="{FF2B5EF4-FFF2-40B4-BE49-F238E27FC236}">
+                <a16:creationId xmlns:a16="http://schemas.microsoft.com/office/drawing/2014/main" id="{CDC64474-A5A4-024C-A67B-BA04990CD8A9}"/>
+              </a:ext>
+            </a:extLst>
+          </p:cNvPr>
+          <p:cNvCxnSpPr>
+            <a:cxnSpLocks/>
+            <a:endCxn id="11" idx="1"/>
+          </p:cNvCxnSpPr>
+          <p:nvPr/>
+        </p:nvCxnSpPr>
+        <p:spPr>
+          <a:xfrm flipV="1">
+            <a:off x="6855542" y="3203753"/>
+            <a:ext cx="1996856" cy="417464"/>
+          </a:xfrm>
+          <a:prstGeom prst="bentConnector3">
+            <a:avLst>
+              <a:gd name="adj1" fmla="val -41"/>
+            </a:avLst>
+          </a:prstGeom>
+          <a:ln w="25400">
+            <a:solidFill>
+              <a:srgbClr val="00B050"/>
+            </a:solidFill>
+            <a:tailEnd type="triangle"/>
+          </a:ln>
+        </p:spPr>
+        <p:style>
+          <a:lnRef idx="1">
+            <a:schemeClr val="accent1"/>
+          </a:lnRef>
+          <a:fillRef idx="0">
+            <a:schemeClr val="accent1"/>
+          </a:fillRef>
+          <a:effectRef idx="0">
+            <a:schemeClr val="accent1"/>
+          </a:effectRef>
+          <a:fontRef idx="minor">
+            <a:schemeClr val="tx1"/>
+          </a:fontRef>
+        </p:style>
+      </p:cxnSp>
+      <p:cxnSp>
+        <p:nvCxnSpPr>
+          <p:cNvPr id="32" name="Elbow Connector 31">
+            <a:extLst>
+              <a:ext uri="{FF2B5EF4-FFF2-40B4-BE49-F238E27FC236}">
+                <a16:creationId xmlns:a16="http://schemas.microsoft.com/office/drawing/2014/main" id="{CBCA6F6A-EB45-6947-83FF-4D0F3ABFFA8A}"/>
+              </a:ext>
+            </a:extLst>
+          </p:cNvPr>
+          <p:cNvCxnSpPr>
+            <a:cxnSpLocks/>
+            <a:endCxn id="9" idx="3"/>
+          </p:cNvCxnSpPr>
+          <p:nvPr/>
+        </p:nvCxnSpPr>
+        <p:spPr>
+          <a:xfrm rot="10800000">
+            <a:off x="4279669" y="3332255"/>
+            <a:ext cx="701083" cy="247524"/>
+          </a:xfrm>
+          <a:prstGeom prst="bentConnector3">
+            <a:avLst>
+              <a:gd name="adj1" fmla="val 250"/>
+            </a:avLst>
+          </a:prstGeom>
+          <a:ln w="25400">
+            <a:solidFill>
+              <a:srgbClr val="FF0000"/>
+            </a:solidFill>
+            <a:tailEnd type="triangle"/>
+          </a:ln>
+        </p:spPr>
+        <p:style>
+          <a:lnRef idx="1">
+            <a:schemeClr val="accent1"/>
+          </a:lnRef>
+          <a:fillRef idx="0">
+            <a:schemeClr val="accent1"/>
+          </a:fillRef>
+          <a:effectRef idx="0">
+            <a:schemeClr val="accent1"/>
+          </a:effectRef>
+          <a:fontRef idx="minor">
+            <a:schemeClr val="tx1"/>
+          </a:fontRef>
+        </p:style>
+      </p:cxnSp>
+      <p:cxnSp>
+        <p:nvCxnSpPr>
+          <p:cNvPr id="25" name="Elbow Connector 24">
+            <a:extLst>
+              <a:ext uri="{FF2B5EF4-FFF2-40B4-BE49-F238E27FC236}">
+                <a16:creationId xmlns:a16="http://schemas.microsoft.com/office/drawing/2014/main" id="{33B36B4C-82BA-144D-B92C-C6D5E874FC63}"/>
+              </a:ext>
+            </a:extLst>
+          </p:cNvPr>
+          <p:cNvCxnSpPr>
+            <a:cxnSpLocks/>
+            <a:endCxn id="26" idx="1"/>
+          </p:cNvCxnSpPr>
+          <p:nvPr/>
+        </p:nvCxnSpPr>
+        <p:spPr>
+          <a:xfrm>
+            <a:off x="5702525" y="3902408"/>
+            <a:ext cx="1350853" cy="420227"/>
+          </a:xfrm>
+          <a:prstGeom prst="bentConnector3">
+            <a:avLst>
+              <a:gd name="adj1" fmla="val 453"/>
+            </a:avLst>
+          </a:prstGeom>
+          <a:ln w="25400">
+            <a:solidFill>
+              <a:srgbClr val="FFC000"/>
+            </a:solidFill>
+            <a:tailEnd type="triangle"/>
+          </a:ln>
+        </p:spPr>
+        <p:style>
+          <a:lnRef idx="1">
+            <a:schemeClr val="accent1"/>
+          </a:lnRef>
+          <a:fillRef idx="0">
+            <a:schemeClr val="accent1"/>
+          </a:fillRef>
+          <a:effectRef idx="0">
+            <a:schemeClr val="accent1"/>
+          </a:effectRef>
+          <a:fontRef idx="minor">
+            <a:schemeClr val="tx1"/>
+          </a:fontRef>
+        </p:style>
+      </p:cxnSp>
+      <p:sp>
+        <p:nvSpPr>
+          <p:cNvPr id="26" name="TextBox 25">
+            <a:extLst>
+              <a:ext uri="{FF2B5EF4-FFF2-40B4-BE49-F238E27FC236}">
+                <a16:creationId xmlns:a16="http://schemas.microsoft.com/office/drawing/2014/main" id="{E637E9F7-2A67-8147-9154-829A7A2295B7}"/>
+              </a:ext>
+            </a:extLst>
+          </p:cNvPr>
+          <p:cNvSpPr txBox="1"/>
+          <p:nvPr/>
+        </p:nvSpPr>
+        <p:spPr>
+          <a:xfrm>
+            <a:off x="7053378" y="4091802"/>
+            <a:ext cx="2681516" cy="461665"/>
+          </a:xfrm>
+          <a:prstGeom prst="rect">
+            <a:avLst/>
+          </a:prstGeom>
+          <a:noFill/>
+        </p:spPr>
+        <p:txBody>
+          <a:bodyPr wrap="square" rtlCol="0">
+            <a:spAutoFit/>
+          </a:bodyPr>
+          <a:lstStyle/>
+          <a:p>
+            <a:r>
+              <a:rPr lang="en-MX" sz="1200" dirty="0">
+                <a:solidFill>
+                  <a:srgbClr val="FFC000"/>
+                </a:solidFill>
+              </a:rPr>
+              <a:t>Average Fuel Consumption:</a:t>
+            </a:r>
+          </a:p>
+          <a:p>
+            <a:r>
+              <a:rPr lang="en-MX" sz="1200" dirty="0">
+                <a:solidFill>
+                  <a:srgbClr val="FFC000"/>
+                </a:solidFill>
+              </a:rPr>
+              <a:t>Liters per Hour</a:t>
+            </a:r>
           </a:p>
         </p:txBody>
       </p:sp>
     </p:spTree>
     <p:extLst>
       <p:ext uri="{BB962C8B-B14F-4D97-AF65-F5344CB8AC3E}">
-        <p14:creationId xmlns:p14="http://schemas.microsoft.com/office/powerpoint/2010/main" val="4159700320"/>
+        <p14:creationId xmlns:p14="http://schemas.microsoft.com/office/powerpoint/2010/main" val="1611787388"/>
       </p:ext>
     </p:extLst>
   </p:cSld>
@@ -8693,7 +9417,7 @@
           <p:cNvPr id="2" name="Title 1">
             <a:extLst>
               <a:ext uri="{FF2B5EF4-FFF2-40B4-BE49-F238E27FC236}">
-                <a16:creationId xmlns:a16="http://schemas.microsoft.com/office/drawing/2014/main" id="{211F9E58-4869-CD4B-BBD4-1EF5C593BE33}"/>
+                <a16:creationId xmlns:a16="http://schemas.microsoft.com/office/drawing/2014/main" id="{779D1011-5B63-3841-9C43-B4EFBFCA0D6B}"/>
               </a:ext>
             </a:extLst>
           </p:cNvPr>
@@ -8715,7 +9439,7 @@
             </a:r>
             <a:r>
               <a:rPr lang="en-MX" dirty="0"/>
-              <a:t>ata cleaning</a:t>
+              <a:t>ata analysis</a:t>
             </a:r>
           </a:p>
         </p:txBody>
@@ -8725,7 +9449,7 @@
           <p:cNvPr id="3" name="Content Placeholder 2">
             <a:extLst>
               <a:ext uri="{FF2B5EF4-FFF2-40B4-BE49-F238E27FC236}">
-                <a16:creationId xmlns:a16="http://schemas.microsoft.com/office/drawing/2014/main" id="{F3A30E4D-5175-DA42-8692-5575B64D5FCD}"/>
+                <a16:creationId xmlns:a16="http://schemas.microsoft.com/office/drawing/2014/main" id="{A6085812-135B-6C4D-8B46-EA1B3F282122}"/>
               </a:ext>
             </a:extLst>
           </p:cNvPr>
@@ -8738,27 +9462,141 @@
         </p:nvSpPr>
         <p:spPr>
           <a:xfrm>
-            <a:off x="1141413" y="2666999"/>
-            <a:ext cx="3653009" cy="3124201"/>
+            <a:off x="1141413" y="2373549"/>
+            <a:ext cx="7477293" cy="3874851"/>
           </a:xfrm>
         </p:spPr>
         <p:txBody>
-          <a:bodyPr/>
+          <a:bodyPr>
+            <a:normAutofit fontScale="92500" lnSpcReduction="10000"/>
+          </a:bodyPr>
           <a:lstStyle/>
           <a:p>
             <a:r>
               <a:rPr lang="en-MX" dirty="0"/>
-              <a:t>There were some outliers and missing data, therefore some entries needed to be removed. In the end, from a total of 445,300 entries we ended up analysing 417,300 (~7% loss data)</a:t>
-            </a:r>
+              <a:t>Data characteristics</a:t>
+            </a:r>
+          </a:p>
+          <a:p>
+            <a:pPr lvl="1"/>
+            <a:r>
+              <a:rPr lang="en-MX" dirty="0"/>
+              <a:t>Daily entries from a complete year (2020).                                                                         Each entry represents one truck on that day                                                                    together with ~25 different features:</a:t>
+            </a:r>
+          </a:p>
+          <a:p>
+            <a:pPr lvl="2"/>
+            <a:r>
+              <a:rPr lang="en-GB" dirty="0"/>
+              <a:t>M</a:t>
+            </a:r>
+            <a:r>
+              <a:rPr lang="en-MX" dirty="0"/>
+              <a:t>anufacturer</a:t>
+            </a:r>
+          </a:p>
+          <a:p>
+            <a:pPr lvl="2"/>
+            <a:r>
+              <a:rPr lang="en-GB" dirty="0"/>
+              <a:t>Year model</a:t>
+            </a:r>
+          </a:p>
+          <a:p>
+            <a:pPr lvl="2"/>
+            <a:r>
+              <a:rPr lang="en-GB" dirty="0"/>
+              <a:t>A</a:t>
+            </a:r>
+            <a:r>
+              <a:rPr lang="en-MX" dirty="0"/>
+              <a:t>verage speed</a:t>
+            </a:r>
+          </a:p>
+          <a:p>
+            <a:pPr lvl="2"/>
+            <a:r>
+              <a:rPr lang="en-MX" dirty="0"/>
+              <a:t>mileage</a:t>
+            </a:r>
+          </a:p>
+          <a:p>
+            <a:pPr lvl="2"/>
+            <a:r>
+              <a:rPr lang="en-GB" dirty="0"/>
+              <a:t>I</a:t>
+            </a:r>
+            <a:r>
+              <a:rPr lang="en-MX" dirty="0"/>
+              <a:t>dle time</a:t>
+            </a:r>
+          </a:p>
+          <a:p>
+            <a:pPr lvl="2"/>
+            <a:r>
+              <a:rPr lang="en-MX" dirty="0"/>
+              <a:t>Volume of Ready-Mix Transported</a:t>
+            </a:r>
+          </a:p>
+          <a:p>
+            <a:pPr lvl="2"/>
+            <a:r>
+              <a:rPr lang="en-GB" dirty="0"/>
+              <a:t>A</a:t>
+            </a:r>
+            <a:r>
+              <a:rPr lang="en-MX" dirty="0"/>
+              <a:t>mount of different mechanical/Safety events (~15 variables):</a:t>
+            </a:r>
+          </a:p>
+          <a:p>
+            <a:pPr lvl="3"/>
+            <a:r>
+              <a:rPr lang="es-ES" dirty="0" err="1"/>
+              <a:t>Overspeeding</a:t>
+            </a:r>
+            <a:r>
+              <a:rPr lang="es-ES" dirty="0"/>
+              <a:t>, High/</a:t>
+            </a:r>
+            <a:r>
+              <a:rPr lang="es-ES" dirty="0" err="1"/>
+              <a:t>Low</a:t>
+            </a:r>
+            <a:r>
+              <a:rPr lang="es-ES" dirty="0"/>
+              <a:t> RPM, </a:t>
+            </a:r>
+            <a:r>
+              <a:rPr lang="es-ES" dirty="0" err="1"/>
+              <a:t>accelerations</a:t>
+            </a:r>
+            <a:r>
+              <a:rPr lang="es-ES" dirty="0"/>
+              <a:t>, </a:t>
+            </a:r>
+            <a:r>
+              <a:rPr lang="es-ES" dirty="0" err="1"/>
+              <a:t>brakes</a:t>
+            </a:r>
+            <a:r>
+              <a:rPr lang="es-ES" dirty="0"/>
+              <a:t>, </a:t>
+            </a:r>
+            <a:r>
+              <a:rPr lang="es-ES" dirty="0" err="1"/>
+              <a:t>etc</a:t>
+            </a:r>
+            <a:endParaRPr lang="en-MX" dirty="0"/>
           </a:p>
         </p:txBody>
       </p:sp>
       <p:pic>
         <p:nvPicPr>
-          <p:cNvPr id="5" name="Picture 4">
+          <p:cNvPr id="4" name="Picture 3">
             <a:extLst>
               <a:ext uri="{FF2B5EF4-FFF2-40B4-BE49-F238E27FC236}">
-                <a16:creationId xmlns:a16="http://schemas.microsoft.com/office/drawing/2014/main" id="{E744F49B-69AC-9F4B-897D-052EA236AF82}"/>
+                <a16:creationId xmlns:a16="http://schemas.microsoft.com/office/drawing/2014/main" id="{A7A85E29-F09E-384F-AD7C-A55A783946FC}"/>
               </a:ext>
             </a:extLst>
           </p:cNvPr>
@@ -8775,8 +9613,8 @@
         </p:blipFill>
         <p:spPr>
           <a:xfrm>
-            <a:off x="7397580" y="3783227"/>
-            <a:ext cx="3697760" cy="2465173"/>
+            <a:off x="8413462" y="4100727"/>
+            <a:ext cx="3108292" cy="2072194"/>
           </a:xfrm>
           <a:prstGeom prst="rect">
             <a:avLst/>
@@ -8785,10 +9623,10 @@
       </p:pic>
       <p:sp>
         <p:nvSpPr>
-          <p:cNvPr id="8" name="Down Arrow 7">
+          <p:cNvPr id="5" name="Down Arrow 4">
             <a:extLst>
               <a:ext uri="{FF2B5EF4-FFF2-40B4-BE49-F238E27FC236}">
-                <a16:creationId xmlns:a16="http://schemas.microsoft.com/office/drawing/2014/main" id="{EEB08DC0-6CAA-534C-86C8-BD5912EC30D2}"/>
+                <a16:creationId xmlns:a16="http://schemas.microsoft.com/office/drawing/2014/main" id="{57048A6D-9C88-1845-80E7-6CC71A6B9199}"/>
               </a:ext>
             </a:extLst>
           </p:cNvPr>
@@ -8797,8 +9635,8 @@
         </p:nvSpPr>
         <p:spPr>
           <a:xfrm>
-            <a:off x="8866935" y="2966400"/>
-            <a:ext cx="707941" cy="630195"/>
+            <a:off x="9670064" y="3039778"/>
+            <a:ext cx="595087" cy="486993"/>
           </a:xfrm>
           <a:prstGeom prst="downArrow">
             <a:avLst/>
@@ -8831,10 +9669,10 @@
       </p:sp>
       <p:sp>
         <p:nvSpPr>
-          <p:cNvPr id="9" name="TextBox 8">
+          <p:cNvPr id="6" name="TextBox 5">
             <a:extLst>
               <a:ext uri="{FF2B5EF4-FFF2-40B4-BE49-F238E27FC236}">
-                <a16:creationId xmlns:a16="http://schemas.microsoft.com/office/drawing/2014/main" id="{C9FA6398-A588-B048-84D7-2E65D2140B22}"/>
+                <a16:creationId xmlns:a16="http://schemas.microsoft.com/office/drawing/2014/main" id="{2D5337CB-D9BD-3A49-8A14-FD7805C875B7}"/>
               </a:ext>
             </a:extLst>
           </p:cNvPr>
@@ -8843,8 +9681,8 @@
         </p:nvSpPr>
         <p:spPr>
           <a:xfrm>
-            <a:off x="9737125" y="3059668"/>
-            <a:ext cx="2051222" cy="323165"/>
+            <a:off x="8413462" y="3610368"/>
+            <a:ext cx="3220818" cy="323165"/>
           </a:xfrm>
           <a:prstGeom prst="rect">
             <a:avLst/>
@@ -8859,17 +9697,17 @@
           <a:p>
             <a:r>
               <a:rPr lang="en-MX" sz="1500" dirty="0"/>
-              <a:t>Data Cleaning</a:t>
+              <a:t>Data Cleaning: Loss Data ~7%</a:t>
             </a:r>
           </a:p>
         </p:txBody>
       </p:sp>
       <p:pic>
         <p:nvPicPr>
-          <p:cNvPr id="11" name="Picture 10">
+          <p:cNvPr id="7" name="Picture 6">
             <a:extLst>
               <a:ext uri="{FF2B5EF4-FFF2-40B4-BE49-F238E27FC236}">
-                <a16:creationId xmlns:a16="http://schemas.microsoft.com/office/drawing/2014/main" id="{336BA963-2126-2040-AA36-0E1841795227}"/>
+                <a16:creationId xmlns:a16="http://schemas.microsoft.com/office/drawing/2014/main" id="{4F3B90E1-24E1-B543-BEE4-9EA309511D91}"/>
               </a:ext>
             </a:extLst>
           </p:cNvPr>
@@ -8886,8 +9724,8 @@
         </p:blipFill>
         <p:spPr>
           <a:xfrm>
-            <a:off x="7425897" y="292100"/>
-            <a:ext cx="3697760" cy="2465173"/>
+            <a:off x="8441779" y="609600"/>
+            <a:ext cx="3108292" cy="2072194"/>
           </a:xfrm>
           <a:prstGeom prst="rect">
             <a:avLst/>
@@ -8897,7 +9735,7 @@
     </p:spTree>
     <p:extLst>
       <p:ext uri="{BB962C8B-B14F-4D97-AF65-F5344CB8AC3E}">
-        <p14:creationId xmlns:p14="http://schemas.microsoft.com/office/powerpoint/2010/main" val="2855228161"/>
+        <p14:creationId xmlns:p14="http://schemas.microsoft.com/office/powerpoint/2010/main" val="4159700320"/>
       </p:ext>
     </p:extLst>
   </p:cSld>

</xml_diff>

<commit_message>
Final draft after a few corrections
</commit_message>
<xml_diff>
--- a/Presentation.pptx
+++ b/Presentation.pptx
@@ -5839,8 +5839,11 @@
           </a:bodyPr>
           <a:lstStyle/>
           <a:p>
-            <a:r>
-              <a:rPr lang="en-MX" sz="1700" dirty="0"/>
+            <a:pPr marL="0" indent="0">
+              <a:buNone/>
+            </a:pPr>
+            <a:r>
+              <a:rPr lang="en-MX" sz="1900" u="sng" dirty="0"/>
               <a:t>Linear Regression</a:t>
             </a:r>
           </a:p>
@@ -5860,19 +5863,19 @@
           <a:p>
             <a:pPr lvl="2"/>
             <a:r>
+              <a:rPr lang="en-GB" sz="1300" dirty="0"/>
+              <a:t>Y</a:t>
+            </a:r>
+            <a:r>
+              <a:rPr lang="en-MX" sz="1300" dirty="0"/>
+              <a:t> - Liters Per Hour: Data mean 7.31</a:t>
+            </a:r>
+          </a:p>
+          <a:p>
+            <a:pPr lvl="2"/>
+            <a:r>
               <a:rPr lang="en-MX" sz="1300" dirty="0"/>
               <a:t>X - Average Speed: Data mean 11.63 kph</a:t>
-            </a:r>
-          </a:p>
-          <a:p>
-            <a:pPr lvl="2"/>
-            <a:r>
-              <a:rPr lang="en-GB" sz="1300" dirty="0"/>
-              <a:t>Y</a:t>
-            </a:r>
-            <a:r>
-              <a:rPr lang="en-MX" sz="1300" dirty="0"/>
-              <a:t> - Liters Per Hour: Data mean 7.31</a:t>
             </a:r>
           </a:p>
           <a:p>
@@ -6357,8 +6360,11 @@
             </a:lvl9pPr>
           </a:lstStyle>
           <a:p>
-            <a:r>
-              <a:rPr lang="en-MX" dirty="0"/>
+            <a:pPr marL="0" indent="0">
+              <a:buNone/>
+            </a:pPr>
+            <a:r>
+              <a:rPr lang="en-MX" sz="2200" u="sng" dirty="0"/>
               <a:t>Random Forest</a:t>
             </a:r>
           </a:p>
@@ -6515,7 +6521,7 @@
             </a:r>
             <a:r>
               <a:rPr lang="en-MX" dirty="0"/>
-              <a:t>+ 0.22 liters per hour fuel consumption</a:t>
+              <a:t>+ 0.22 liters per hour in fuel consumption</a:t>
             </a:r>
           </a:p>
           <a:p>
@@ -7635,7 +7641,7 @@
             </a:r>
             <a:r>
               <a:rPr lang="en-MX" dirty="0"/>
-              <a:t>aking that into  account when is the Fuel Consumption too high?</a:t>
+              <a:t>aking that into account when is the Fuel Consumption too high?</a:t>
             </a:r>
           </a:p>
           <a:p>
@@ -7860,7 +7866,7 @@
         </p:nvSpPr>
         <p:spPr>
           <a:xfrm>
-            <a:off x="1351186" y="3975926"/>
+            <a:off x="1354357" y="4112568"/>
             <a:ext cx="2199727" cy="461665"/>
           </a:xfrm>
           <a:prstGeom prst="rect">
@@ -7980,12 +7986,12 @@
         </p:nvCxnSpPr>
         <p:spPr>
           <a:xfrm rot="10800000" flipV="1">
-            <a:off x="3550913" y="3926027"/>
-            <a:ext cx="504254" cy="280732"/>
+            <a:off x="3554084" y="3902407"/>
+            <a:ext cx="502350" cy="440993"/>
           </a:xfrm>
           <a:prstGeom prst="bentConnector3">
             <a:avLst>
-              <a:gd name="adj1" fmla="val 1394"/>
+              <a:gd name="adj1" fmla="val 1589"/>
             </a:avLst>
           </a:prstGeom>
           <a:ln w="25400">

</xml_diff>

<commit_message>
Presentations to be used on the Captsone Demo
</commit_message>
<xml_diff>
--- a/Presentation.pptx
+++ b/Presentation.pptx
@@ -15,7 +15,7 @@
     <p:sldId id="264" r:id="rId9"/>
     <p:sldId id="265" r:id="rId10"/>
     <p:sldId id="266" r:id="rId11"/>
-    <p:sldId id="268" r:id="rId12"/>
+    <p:sldId id="271" r:id="rId12"/>
   </p:sldIdLst>
   <p:sldSz cx="12192000" cy="6858000"/>
   <p:notesSz cx="6858000" cy="9144000"/>
@@ -5738,7 +5738,7 @@
           <a:p>
             <a:r>
               <a:rPr lang="en-MX" dirty="0"/>
-              <a:t>Operational Planning Leader</a:t>
+              <a:t>Operational Planning Lead</a:t>
             </a:r>
           </a:p>
           <a:p>
@@ -5857,7 +5857,7 @@
             <a:pPr lvl="1"/>
             <a:r>
               <a:rPr lang="en-MX" sz="1500" dirty="0"/>
-              <a:t>Interpretation: y = 0.22*x + 4.75</a:t>
+              <a:t>Interpretation: y  =  0.22 * x  +  4.75</a:t>
             </a:r>
           </a:p>
           <a:p>
@@ -5895,7 +5895,15 @@
             <a:pPr lvl="1"/>
             <a:r>
               <a:rPr lang="en-MX" sz="1500" dirty="0"/>
-              <a:t>R2 range from 53.80% to 62.20%</a:t>
+              <a:t>R</a:t>
+            </a:r>
+            <a:r>
+              <a:rPr lang="en-MX" sz="1500" baseline="30000" dirty="0"/>
+              <a:t>2</a:t>
+            </a:r>
+            <a:r>
+              <a:rPr lang="en-MX" sz="1500" dirty="0"/>
+              <a:t> range from 53.80% to 62.20%</a:t>
             </a:r>
           </a:p>
           <a:p>
@@ -6385,7 +6393,15 @@
             <a:pPr lvl="1"/>
             <a:r>
               <a:rPr lang="en-MX" dirty="0"/>
-              <a:t>R2 improves to 73.29%                  (Considering all features)</a:t>
+              <a:t>R</a:t>
+            </a:r>
+            <a:r>
+              <a:rPr lang="en-MX" baseline="30000" dirty="0"/>
+              <a:t>2</a:t>
+            </a:r>
+            <a:r>
+              <a:rPr lang="en-MX" dirty="0"/>
+              <a:t> improves to 73.29%                   (Considering all features)</a:t>
             </a:r>
           </a:p>
           <a:p>
@@ -6494,103 +6510,497 @@
         <p:spPr>
           <a:xfrm>
             <a:off x="1141413" y="2188723"/>
-            <a:ext cx="9905998" cy="3602477"/>
+            <a:ext cx="9905998" cy="4163439"/>
           </a:xfrm>
         </p:spPr>
         <p:txBody>
           <a:bodyPr>
-            <a:normAutofit fontScale="70000" lnSpcReduction="20000"/>
+            <a:normAutofit lnSpcReduction="10000"/>
           </a:bodyPr>
           <a:lstStyle/>
           <a:p>
             <a:r>
-              <a:rPr lang="en-MX" dirty="0"/>
+              <a:rPr lang="en-MX" sz="1500" dirty="0"/>
               <a:t>Most Relevant Feature to explain the fuel consumption: Average Speed of the Ready-Mix Truck along the whole day</a:t>
             </a:r>
           </a:p>
           <a:p>
             <a:r>
-              <a:rPr lang="en-MX" dirty="0"/>
-              <a:t>+ 1 kph Speed  </a:t>
-            </a:r>
-            <a:r>
-              <a:rPr lang="en-MX" dirty="0">
+              <a:rPr lang="en-MX" sz="1500" dirty="0"/>
+              <a:t>+ 1 KpH Speed   </a:t>
+            </a:r>
+            <a:r>
+              <a:rPr lang="en-MX" sz="1500" dirty="0">
                 <a:sym typeface="Wingdings" pitchFamily="2" charset="2"/>
               </a:rPr>
-              <a:t> </a:t>
-            </a:r>
-            <a:r>
-              <a:rPr lang="en-MX" dirty="0"/>
-              <a:t>+ 0.22 liters per hour in fuel consumption</a:t>
-            </a:r>
-          </a:p>
-          <a:p>
-            <a:pPr lvl="1"/>
-            <a:r>
-              <a:rPr lang="en-MX" dirty="0"/>
-              <a:t>Each Ready-Mix truck has its engine on ~10 hrs per day</a:t>
-            </a:r>
-          </a:p>
-          <a:p>
-            <a:pPr lvl="1"/>
-            <a:r>
-              <a:rPr lang="en-MX" dirty="0"/>
-              <a:t>Hence the +1 kph </a:t>
-            </a:r>
-            <a:r>
-              <a:rPr lang="en-MX" dirty="0">
-                <a:sym typeface="Wingdings" pitchFamily="2" charset="2"/>
+              <a:t>   </a:t>
+            </a:r>
+            <a:r>
+              <a:rPr lang="en-MX" sz="1500" dirty="0"/>
+              <a:t>$66,000 MXN</a:t>
+            </a:r>
+          </a:p>
+          <a:p>
+            <a:endParaRPr lang="en-MX" sz="1500" dirty="0"/>
+          </a:p>
+          <a:p>
+            <a:endParaRPr lang="en-MX" sz="1500" dirty="0"/>
+          </a:p>
+          <a:p>
+            <a:endParaRPr lang="en-MX" sz="1500" dirty="0"/>
+          </a:p>
+          <a:p>
+            <a:endParaRPr lang="en-MX" sz="1500" dirty="0"/>
+          </a:p>
+          <a:p>
+            <a:r>
+              <a:rPr lang="en-MX" sz="1500" dirty="0"/>
+              <a:t>Important to control the avergae driving speed, not only because it saves fuel, but also it will guarantee the safety of our drivers and all the other people on the streets/roads</a:t>
+            </a:r>
+          </a:p>
+          <a:p>
+            <a:r>
+              <a:rPr lang="en-MX" sz="1500" dirty="0"/>
+              <a:t>However we need to be efficient on this trade-off as we would not want to make people work extra hours (Increments engine hours per truck) or hurt the relations with our clients (Avoid impunctual deliveries)</a:t>
+            </a:r>
+          </a:p>
+          <a:p>
+            <a:r>
+              <a:rPr lang="en-MX" sz="1500" dirty="0"/>
+              <a:t>Speed is a good feature to consider as a Baseline, however some deep analysis could be done on the other features to explore discrepancies (High consumption with Low Speed)</a:t>
+            </a:r>
+          </a:p>
+          <a:p>
+            <a:r>
+              <a:rPr lang="en-MX" sz="1500" dirty="0"/>
+              <a:t>Divide the Analysis/DataSet into Idle Time and Trajectory Times</a:t>
+            </a:r>
+          </a:p>
+        </p:txBody>
+      </p:sp>
+      <p:sp>
+        <p:nvSpPr>
+          <p:cNvPr id="4" name="TextBox 3">
+            <a:extLst>
+              <a:ext uri="{FF2B5EF4-FFF2-40B4-BE49-F238E27FC236}">
+                <a16:creationId xmlns:a16="http://schemas.microsoft.com/office/drawing/2014/main" id="{57CCF627-542E-A64E-B036-5A26C6CC0712}"/>
+              </a:ext>
+            </a:extLst>
+          </p:cNvPr>
+          <p:cNvSpPr txBox="1"/>
+          <p:nvPr/>
+        </p:nvSpPr>
+        <p:spPr>
+          <a:xfrm>
+            <a:off x="2668656" y="3433855"/>
+            <a:ext cx="6246335" cy="369332"/>
+          </a:xfrm>
+          <a:prstGeom prst="rect">
+            <a:avLst/>
+          </a:prstGeom>
+          <a:noFill/>
+        </p:spPr>
+        <p:txBody>
+          <a:bodyPr wrap="square" rtlCol="0">
+            <a:spAutoFit/>
+          </a:bodyPr>
+          <a:lstStyle/>
+          <a:p>
+            <a:r>
+              <a:rPr lang="en-MX" b="1" u="sng" dirty="0"/>
+              <a:t>$66 K MXN</a:t>
+            </a:r>
+            <a:r>
+              <a:rPr lang="en-MX" b="1" dirty="0"/>
+              <a:t>    =   </a:t>
+            </a:r>
+            <a:r>
+              <a:rPr lang="en-MX" b="1" dirty="0">
+                <a:solidFill>
+                  <a:srgbClr val="0070C0"/>
+                </a:solidFill>
               </a:rPr>
-              <a:t> </a:t>
-            </a:r>
-            <a:r>
-              <a:rPr lang="en-MX" dirty="0"/>
-              <a:t>+ 2.2 extra liters per day per truck</a:t>
-            </a:r>
-          </a:p>
-          <a:p>
-            <a:pPr lvl="1"/>
-            <a:r>
-              <a:rPr lang="en-MX" dirty="0"/>
-              <a:t>Each liter costs $20 MXN, so +1 KPH </a:t>
-            </a:r>
-            <a:r>
-              <a:rPr lang="en-MX" dirty="0">
-                <a:sym typeface="Wingdings" pitchFamily="2" charset="2"/>
+              <a:t>1,500</a:t>
+            </a:r>
+            <a:r>
+              <a:rPr lang="en-MX" b="1" dirty="0"/>
+              <a:t>   *   </a:t>
+            </a:r>
+            <a:r>
+              <a:rPr lang="en-MX" b="1" dirty="0">
+                <a:solidFill>
+                  <a:srgbClr val="FF0000"/>
+                </a:solidFill>
               </a:rPr>
-              <a:t> + $44 MXN per day per truck</a:t>
-            </a:r>
-          </a:p>
-          <a:p>
-            <a:pPr lvl="1"/>
-            <a:r>
-              <a:rPr lang="en-MX" dirty="0"/>
-              <a:t>On average there are 1,500 trucks on the streets: therefore +1 KPH (On every truck) </a:t>
-            </a:r>
-            <a:r>
-              <a:rPr lang="en-MX" dirty="0">
-                <a:sym typeface="Wingdings" pitchFamily="2" charset="2"/>
+              <a:t>10</a:t>
+            </a:r>
+            <a:r>
+              <a:rPr lang="en-MX" b="1" dirty="0"/>
+              <a:t>   *   </a:t>
+            </a:r>
+            <a:r>
+              <a:rPr lang="en-MX" b="1" dirty="0">
+                <a:solidFill>
+                  <a:srgbClr val="FFC000"/>
+                </a:solidFill>
               </a:rPr>
-              <a:t> + $66,000 MXN per day</a:t>
-            </a:r>
-            <a:endParaRPr lang="en-MX" dirty="0"/>
-          </a:p>
-          <a:p>
-            <a:r>
-              <a:rPr lang="en-MX" dirty="0"/>
-              <a:t>Very Important to control the avergae driving speed, not only because it saves fuel, but also it will guarantee the safety of our drivers and all the other people on the streets/roads</a:t>
-            </a:r>
-          </a:p>
-          <a:p>
-            <a:r>
-              <a:rPr lang="en-MX" dirty="0"/>
-              <a:t>However we need to be efficient on this trade-off as we would not want to make people work extra hours (Increments engine hours per truck) or hurt the relations with our clients (Avoid impunctual deliveries)</a:t>
-            </a:r>
-          </a:p>
-          <a:p>
-            <a:r>
-              <a:rPr lang="en-MX" dirty="0"/>
-              <a:t>Important to keep track of this data and look for explanations to the outliers and missing data that wass not considered on this analysis</a:t>
+              <a:t>0.22</a:t>
+            </a:r>
+            <a:r>
+              <a:rPr lang="en-MX" b="1" dirty="0"/>
+              <a:t>   *   </a:t>
+            </a:r>
+            <a:r>
+              <a:rPr lang="en-MX" b="1" dirty="0">
+                <a:solidFill>
+                  <a:srgbClr val="00B050"/>
+                </a:solidFill>
+              </a:rPr>
+              <a:t>$20 MXN</a:t>
+            </a:r>
+          </a:p>
+        </p:txBody>
+      </p:sp>
+      <p:sp>
+        <p:nvSpPr>
+          <p:cNvPr id="5" name="TextBox 4">
+            <a:extLst>
+              <a:ext uri="{FF2B5EF4-FFF2-40B4-BE49-F238E27FC236}">
+                <a16:creationId xmlns:a16="http://schemas.microsoft.com/office/drawing/2014/main" id="{91D667DE-C9AB-204D-BD3C-E5052D4C028D}"/>
+              </a:ext>
+            </a:extLst>
+          </p:cNvPr>
+          <p:cNvSpPr txBox="1"/>
+          <p:nvPr/>
+        </p:nvSpPr>
+        <p:spPr>
+          <a:xfrm>
+            <a:off x="2113116" y="3888820"/>
+            <a:ext cx="2199727" cy="461665"/>
+          </a:xfrm>
+          <a:prstGeom prst="rect">
+            <a:avLst/>
+          </a:prstGeom>
+          <a:noFill/>
+        </p:spPr>
+        <p:txBody>
+          <a:bodyPr wrap="square" rtlCol="0">
+            <a:spAutoFit/>
+          </a:bodyPr>
+          <a:lstStyle/>
+          <a:p>
+            <a:r>
+              <a:rPr lang="en-MX" sz="1200" dirty="0">
+                <a:solidFill>
+                  <a:srgbClr val="0070C0"/>
+                </a:solidFill>
+              </a:rPr>
+              <a:t>Operational Daily average of Ready-Mix Trucks</a:t>
+            </a:r>
+          </a:p>
+        </p:txBody>
+      </p:sp>
+      <p:sp>
+        <p:nvSpPr>
+          <p:cNvPr id="6" name="TextBox 5">
+            <a:extLst>
+              <a:ext uri="{FF2B5EF4-FFF2-40B4-BE49-F238E27FC236}">
+                <a16:creationId xmlns:a16="http://schemas.microsoft.com/office/drawing/2014/main" id="{30531E5E-A711-924F-ABBE-C7B3D300E7B0}"/>
+              </a:ext>
+            </a:extLst>
+          </p:cNvPr>
+          <p:cNvSpPr txBox="1"/>
+          <p:nvPr/>
+        </p:nvSpPr>
+        <p:spPr>
+          <a:xfrm>
+            <a:off x="2373545" y="3077015"/>
+            <a:ext cx="2538417" cy="276999"/>
+          </a:xfrm>
+          <a:prstGeom prst="rect">
+            <a:avLst/>
+          </a:prstGeom>
+          <a:noFill/>
+        </p:spPr>
+        <p:txBody>
+          <a:bodyPr wrap="square" rtlCol="0">
+            <a:spAutoFit/>
+          </a:bodyPr>
+          <a:lstStyle/>
+          <a:p>
+            <a:r>
+              <a:rPr lang="en-MX" sz="1200" dirty="0">
+                <a:solidFill>
+                  <a:srgbClr val="FF0000"/>
+                </a:solidFill>
+              </a:rPr>
+              <a:t>Average Engine Hours per Truck</a:t>
+            </a:r>
+          </a:p>
+        </p:txBody>
+      </p:sp>
+      <p:sp>
+        <p:nvSpPr>
+          <p:cNvPr id="7" name="TextBox 6">
+            <a:extLst>
+              <a:ext uri="{FF2B5EF4-FFF2-40B4-BE49-F238E27FC236}">
+                <a16:creationId xmlns:a16="http://schemas.microsoft.com/office/drawing/2014/main" id="{F651C88B-803C-0A4C-9184-D599E302D6A7}"/>
+              </a:ext>
+            </a:extLst>
+          </p:cNvPr>
+          <p:cNvSpPr txBox="1"/>
+          <p:nvPr/>
+        </p:nvSpPr>
+        <p:spPr>
+          <a:xfrm>
+            <a:off x="8539433" y="2919329"/>
+            <a:ext cx="2538417" cy="276999"/>
+          </a:xfrm>
+          <a:prstGeom prst="rect">
+            <a:avLst/>
+          </a:prstGeom>
+          <a:noFill/>
+        </p:spPr>
+        <p:txBody>
+          <a:bodyPr wrap="square" rtlCol="0">
+            <a:spAutoFit/>
+          </a:bodyPr>
+          <a:lstStyle/>
+          <a:p>
+            <a:r>
+              <a:rPr lang="en-MX" sz="1200" dirty="0">
+                <a:solidFill>
+                  <a:srgbClr val="00B050"/>
+                </a:solidFill>
+              </a:rPr>
+              <a:t>Price of a Liter of Diesel ($ MXN)</a:t>
+            </a:r>
+          </a:p>
+        </p:txBody>
+      </p:sp>
+      <p:cxnSp>
+        <p:nvCxnSpPr>
+          <p:cNvPr id="8" name="Elbow Connector 7">
+            <a:extLst>
+              <a:ext uri="{FF2B5EF4-FFF2-40B4-BE49-F238E27FC236}">
+                <a16:creationId xmlns:a16="http://schemas.microsoft.com/office/drawing/2014/main" id="{52AA0BC0-EDA0-F14C-BE3E-5D6AC0AB85A8}"/>
+              </a:ext>
+            </a:extLst>
+          </p:cNvPr>
+          <p:cNvCxnSpPr>
+            <a:cxnSpLocks/>
+            <a:endCxn id="5" idx="3"/>
+          </p:cNvCxnSpPr>
+          <p:nvPr/>
+        </p:nvCxnSpPr>
+        <p:spPr>
+          <a:xfrm rot="10800000" flipV="1">
+            <a:off x="4312843" y="3756483"/>
+            <a:ext cx="550988" cy="363169"/>
+          </a:xfrm>
+          <a:prstGeom prst="bentConnector3">
+            <a:avLst>
+              <a:gd name="adj1" fmla="val -1199"/>
+            </a:avLst>
+          </a:prstGeom>
+          <a:ln w="25400">
+            <a:solidFill>
+              <a:srgbClr val="0070C0"/>
+            </a:solidFill>
+            <a:tailEnd type="triangle"/>
+          </a:ln>
+        </p:spPr>
+        <p:style>
+          <a:lnRef idx="1">
+            <a:schemeClr val="accent1"/>
+          </a:lnRef>
+          <a:fillRef idx="0">
+            <a:schemeClr val="accent1"/>
+          </a:fillRef>
+          <a:effectRef idx="0">
+            <a:schemeClr val="accent1"/>
+          </a:effectRef>
+          <a:fontRef idx="minor">
+            <a:schemeClr val="tx1"/>
+          </a:fontRef>
+        </p:style>
+      </p:cxnSp>
+      <p:cxnSp>
+        <p:nvCxnSpPr>
+          <p:cNvPr id="9" name="Elbow Connector 8">
+            <a:extLst>
+              <a:ext uri="{FF2B5EF4-FFF2-40B4-BE49-F238E27FC236}">
+                <a16:creationId xmlns:a16="http://schemas.microsoft.com/office/drawing/2014/main" id="{78FC56B1-8731-DA44-BD49-1B6542DF9157}"/>
+              </a:ext>
+            </a:extLst>
+          </p:cNvPr>
+          <p:cNvCxnSpPr>
+            <a:cxnSpLocks/>
+            <a:endCxn id="7" idx="1"/>
+          </p:cNvCxnSpPr>
+          <p:nvPr/>
+        </p:nvCxnSpPr>
+        <p:spPr>
+          <a:xfrm flipV="1">
+            <a:off x="7480570" y="3057829"/>
+            <a:ext cx="1058863" cy="366316"/>
+          </a:xfrm>
+          <a:prstGeom prst="bentConnector3">
+            <a:avLst>
+              <a:gd name="adj1" fmla="val -528"/>
+            </a:avLst>
+          </a:prstGeom>
+          <a:ln w="25400">
+            <a:solidFill>
+              <a:srgbClr val="00B050"/>
+            </a:solidFill>
+            <a:tailEnd type="triangle"/>
+          </a:ln>
+        </p:spPr>
+        <p:style>
+          <a:lnRef idx="1">
+            <a:schemeClr val="accent1"/>
+          </a:lnRef>
+          <a:fillRef idx="0">
+            <a:schemeClr val="accent1"/>
+          </a:fillRef>
+          <a:effectRef idx="0">
+            <a:schemeClr val="accent1"/>
+          </a:effectRef>
+          <a:fontRef idx="minor">
+            <a:schemeClr val="tx1"/>
+          </a:fontRef>
+        </p:style>
+      </p:cxnSp>
+      <p:cxnSp>
+        <p:nvCxnSpPr>
+          <p:cNvPr id="10" name="Elbow Connector 9">
+            <a:extLst>
+              <a:ext uri="{FF2B5EF4-FFF2-40B4-BE49-F238E27FC236}">
+                <a16:creationId xmlns:a16="http://schemas.microsoft.com/office/drawing/2014/main" id="{7D91E9E0-C009-A44C-9076-FAA897EA185E}"/>
+              </a:ext>
+            </a:extLst>
+          </p:cNvPr>
+          <p:cNvCxnSpPr>
+            <a:cxnSpLocks/>
+            <a:endCxn id="6" idx="3"/>
+          </p:cNvCxnSpPr>
+          <p:nvPr/>
+        </p:nvCxnSpPr>
+        <p:spPr>
+          <a:xfrm rot="10800000">
+            <a:off x="4911962" y="3215515"/>
+            <a:ext cx="798176" cy="218340"/>
+          </a:xfrm>
+          <a:prstGeom prst="bentConnector3">
+            <a:avLst>
+              <a:gd name="adj1" fmla="val 32"/>
+            </a:avLst>
+          </a:prstGeom>
+          <a:ln w="25400">
+            <a:solidFill>
+              <a:srgbClr val="FF0000"/>
+            </a:solidFill>
+            <a:tailEnd type="triangle"/>
+          </a:ln>
+        </p:spPr>
+        <p:style>
+          <a:lnRef idx="1">
+            <a:schemeClr val="accent1"/>
+          </a:lnRef>
+          <a:fillRef idx="0">
+            <a:schemeClr val="accent1"/>
+          </a:fillRef>
+          <a:effectRef idx="0">
+            <a:schemeClr val="accent1"/>
+          </a:effectRef>
+          <a:fontRef idx="minor">
+            <a:schemeClr val="tx1"/>
+          </a:fontRef>
+        </p:style>
+      </p:cxnSp>
+      <p:cxnSp>
+        <p:nvCxnSpPr>
+          <p:cNvPr id="11" name="Elbow Connector 10">
+            <a:extLst>
+              <a:ext uri="{FF2B5EF4-FFF2-40B4-BE49-F238E27FC236}">
+                <a16:creationId xmlns:a16="http://schemas.microsoft.com/office/drawing/2014/main" id="{28164B68-C2C7-254D-ADD0-C2C4E737AA9F}"/>
+              </a:ext>
+            </a:extLst>
+          </p:cNvPr>
+          <p:cNvCxnSpPr>
+            <a:cxnSpLocks/>
+            <a:endCxn id="12" idx="1"/>
+          </p:cNvCxnSpPr>
+          <p:nvPr/>
+        </p:nvCxnSpPr>
+        <p:spPr>
+          <a:xfrm>
+            <a:off x="6508017" y="3756483"/>
+            <a:ext cx="1105543" cy="393546"/>
+          </a:xfrm>
+          <a:prstGeom prst="bentConnector3">
+            <a:avLst>
+              <a:gd name="adj1" fmla="val -154"/>
+            </a:avLst>
+          </a:prstGeom>
+          <a:ln w="25400">
+            <a:solidFill>
+              <a:srgbClr val="FFC000"/>
+            </a:solidFill>
+            <a:tailEnd type="triangle"/>
+          </a:ln>
+        </p:spPr>
+        <p:style>
+          <a:lnRef idx="1">
+            <a:schemeClr val="accent1"/>
+          </a:lnRef>
+          <a:fillRef idx="0">
+            <a:schemeClr val="accent1"/>
+          </a:fillRef>
+          <a:effectRef idx="0">
+            <a:schemeClr val="accent1"/>
+          </a:effectRef>
+          <a:fontRef idx="minor">
+            <a:schemeClr val="tx1"/>
+          </a:fontRef>
+        </p:style>
+      </p:cxnSp>
+      <p:sp>
+        <p:nvSpPr>
+          <p:cNvPr id="12" name="TextBox 11">
+            <a:extLst>
+              <a:ext uri="{FF2B5EF4-FFF2-40B4-BE49-F238E27FC236}">
+                <a16:creationId xmlns:a16="http://schemas.microsoft.com/office/drawing/2014/main" id="{7E6E1F31-FC36-A748-A050-8680FE089E1F}"/>
+              </a:ext>
+            </a:extLst>
+          </p:cNvPr>
+          <p:cNvSpPr txBox="1"/>
+          <p:nvPr/>
+        </p:nvSpPr>
+        <p:spPr>
+          <a:xfrm>
+            <a:off x="7613560" y="3919196"/>
+            <a:ext cx="3028498" cy="461665"/>
+          </a:xfrm>
+          <a:prstGeom prst="rect">
+            <a:avLst/>
+          </a:prstGeom>
+          <a:noFill/>
+        </p:spPr>
+        <p:txBody>
+          <a:bodyPr wrap="square" rtlCol="0">
+            <a:spAutoFit/>
+          </a:bodyPr>
+          <a:lstStyle/>
+          <a:p>
+            <a:r>
+              <a:rPr lang="en-MX" sz="1200" dirty="0">
+                <a:solidFill>
+                  <a:srgbClr val="FFC000"/>
+                </a:solidFill>
+              </a:rPr>
+              <a:t>Additional Fuel Consumption due to +1 KpH by Truck, in Liters per Hour</a:t>
             </a:r>
           </a:p>
         </p:txBody>
@@ -6598,7 +7008,7 @@
     </p:spTree>
     <p:extLst>
       <p:ext uri="{BB962C8B-B14F-4D97-AF65-F5344CB8AC3E}">
-        <p14:creationId xmlns:p14="http://schemas.microsoft.com/office/powerpoint/2010/main" val="2887040630"/>
+        <p14:creationId xmlns:p14="http://schemas.microsoft.com/office/powerpoint/2010/main" val="4240733163"/>
       </p:ext>
     </p:extLst>
   </p:cSld>
@@ -6609,7 +7019,7 @@
 </file>
 
 <file path=ppt/slides/slide2.xml><?xml version="1.0" encoding="utf-8"?>
-<p:sld xmlns:a="http://schemas.openxmlformats.org/drawingml/2006/main" xmlns:r="http://schemas.openxmlformats.org/officeDocument/2006/relationships" xmlns:p="http://schemas.openxmlformats.org/presentationml/2006/main">
+<p:sld xmlns:a="http://schemas.openxmlformats.org/drawingml/2006/main" xmlns:r="http://schemas.openxmlformats.org/officeDocument/2006/relationships" xmlns:p="http://schemas.openxmlformats.org/presentationml/2006/main" show="0">
   <p:cSld>
     <p:spTree>
       <p:nvGrpSpPr>
@@ -7783,7 +8193,7 @@
         </p:nvSpPr>
         <p:spPr>
           <a:xfrm>
-            <a:off x="1909897" y="3579779"/>
+            <a:off x="2347641" y="3579779"/>
             <a:ext cx="6246335" cy="369332"/>
           </a:xfrm>
           <a:prstGeom prst="rect">
@@ -7803,7 +8213,7 @@
             </a:r>
             <a:r>
               <a:rPr lang="en-MX" b="1" dirty="0"/>
-              <a:t> =  </a:t>
+              <a:t>   =   </a:t>
             </a:r>
             <a:r>
               <a:rPr lang="en-MX" b="1" dirty="0">
@@ -7866,7 +8276,7 @@
         </p:nvSpPr>
         <p:spPr>
           <a:xfrm>
-            <a:off x="1354357" y="4112568"/>
+            <a:off x="2006115" y="4112568"/>
             <a:ext cx="2199727" cy="461665"/>
           </a:xfrm>
           <a:prstGeom prst="rect">
@@ -7905,7 +8315,7 @@
         </p:nvSpPr>
         <p:spPr>
           <a:xfrm>
-            <a:off x="1741250" y="3193755"/>
+            <a:off x="2393008" y="3193755"/>
             <a:ext cx="2538417" cy="276999"/>
           </a:xfrm>
           <a:prstGeom prst="rect">
@@ -7944,7 +8354,7 @@
         </p:nvSpPr>
         <p:spPr>
           <a:xfrm>
-            <a:off x="8568617" y="3065253"/>
+            <a:off x="8597804" y="3065253"/>
             <a:ext cx="2681516" cy="276999"/>
           </a:xfrm>
           <a:prstGeom prst="rect">
@@ -7986,7 +8396,7 @@
         </p:nvCxnSpPr>
         <p:spPr>
           <a:xfrm rot="10800000" flipV="1">
-            <a:off x="3554084" y="3902407"/>
+            <a:off x="4205842" y="3902407"/>
             <a:ext cx="502350" cy="440993"/>
           </a:xfrm>
           <a:prstGeom prst="bentConnector3">
@@ -8033,12 +8443,12 @@
         </p:nvCxnSpPr>
         <p:spPr>
           <a:xfrm flipV="1">
-            <a:off x="6571761" y="3203753"/>
-            <a:ext cx="1996856" cy="417464"/>
+            <a:off x="7260577" y="3203753"/>
+            <a:ext cx="1337227" cy="376026"/>
           </a:xfrm>
           <a:prstGeom prst="bentConnector3">
             <a:avLst>
-              <a:gd name="adj1" fmla="val -41"/>
+              <a:gd name="adj1" fmla="val -194"/>
             </a:avLst>
           </a:prstGeom>
           <a:ln w="25400">
@@ -8080,7 +8490,7 @@
         </p:nvCxnSpPr>
         <p:spPr>
           <a:xfrm rot="10800000">
-            <a:off x="4279667" y="3332255"/>
+            <a:off x="4931425" y="3332255"/>
             <a:ext cx="701086" cy="247524"/>
           </a:xfrm>
           <a:prstGeom prst="bentConnector3">
@@ -8127,7 +8537,7 @@
         </p:nvCxnSpPr>
         <p:spPr>
           <a:xfrm>
-            <a:off x="5702525" y="3902408"/>
+            <a:off x="6354283" y="3902408"/>
             <a:ext cx="1350853" cy="420227"/>
           </a:xfrm>
           <a:prstGeom prst="bentConnector3">
@@ -8171,7 +8581,7 @@
         </p:nvSpPr>
         <p:spPr>
           <a:xfrm>
-            <a:off x="7053378" y="4091802"/>
+            <a:off x="7705136" y="4091802"/>
             <a:ext cx="2681516" cy="461665"/>
           </a:xfrm>
           <a:prstGeom prst="rect">
@@ -9387,7 +9797,15 @@
           <a:p>
             <a:r>
               <a:rPr lang="en-MX" dirty="0"/>
-              <a:t>R2 =  53.80%</a:t>
+              <a:t>R</a:t>
+            </a:r>
+            <a:r>
+              <a:rPr lang="en-MX" baseline="30000" dirty="0"/>
+              <a:t>2</a:t>
+            </a:r>
+            <a:r>
+              <a:rPr lang="en-MX" dirty="0"/>
+              <a:t> =  53.80%</a:t>
             </a:r>
           </a:p>
         </p:txBody>
@@ -9422,7 +9840,15 @@
           <a:p>
             <a:r>
               <a:rPr lang="en-MX" dirty="0"/>
-              <a:t>R2 =  38.20%</a:t>
+              <a:t>R</a:t>
+            </a:r>
+            <a:r>
+              <a:rPr lang="en-MX" baseline="30000" dirty="0"/>
+              <a:t>2</a:t>
+            </a:r>
+            <a:r>
+              <a:rPr lang="en-MX" dirty="0"/>
+              <a:t> =  38.20%</a:t>
             </a:r>
           </a:p>
         </p:txBody>
@@ -10061,7 +10487,15 @@
             </a:r>
             <a:r>
               <a:rPr lang="en-MX" dirty="0"/>
-              <a:t> R2 = 53.80%</a:t>
+              <a:t> R</a:t>
+            </a:r>
+            <a:r>
+              <a:rPr lang="en-MX" baseline="30000" dirty="0"/>
+              <a:t>2</a:t>
+            </a:r>
+            <a:r>
+              <a:rPr lang="en-MX" dirty="0"/>
+              <a:t> = 53.80%</a:t>
             </a:r>
           </a:p>
           <a:p>
@@ -10078,7 +10512,15 @@
             </a:r>
             <a:r>
               <a:rPr lang="en-MX" dirty="0"/>
-              <a:t> R2 = 58.99%</a:t>
+              <a:t> R</a:t>
+            </a:r>
+            <a:r>
+              <a:rPr lang="en-MX" baseline="30000" dirty="0"/>
+              <a:t>2</a:t>
+            </a:r>
+            <a:r>
+              <a:rPr lang="en-MX" dirty="0"/>
+              <a:t> = 58.99%</a:t>
             </a:r>
           </a:p>
           <a:p>
@@ -10095,7 +10537,15 @@
             </a:r>
             <a:r>
               <a:rPr lang="en-MX" dirty="0"/>
-              <a:t> R2 = 62.20%</a:t>
+              <a:t> R</a:t>
+            </a:r>
+            <a:r>
+              <a:rPr lang="en-MX" baseline="30000" dirty="0"/>
+              <a:t>2</a:t>
+            </a:r>
+            <a:r>
+              <a:rPr lang="en-MX" dirty="0"/>
+              <a:t> = 62.20%</a:t>
             </a:r>
           </a:p>
         </p:txBody>
@@ -10728,7 +11178,15 @@
             </a:r>
             <a:r>
               <a:rPr lang="en-MX" dirty="0"/>
-              <a:t> R2 = 69.30%</a:t>
+              <a:t> R</a:t>
+            </a:r>
+            <a:r>
+              <a:rPr lang="en-MX" baseline="30000" dirty="0"/>
+              <a:t>2</a:t>
+            </a:r>
+            <a:r>
+              <a:rPr lang="en-MX" dirty="0"/>
+              <a:t> = 69.30%</a:t>
             </a:r>
           </a:p>
           <a:p>
@@ -10745,7 +11203,15 @@
             </a:r>
             <a:r>
               <a:rPr lang="en-MX" dirty="0"/>
-              <a:t> R2 = 73.29%</a:t>
+              <a:t> R</a:t>
+            </a:r>
+            <a:r>
+              <a:rPr lang="en-MX" baseline="30000" dirty="0"/>
+              <a:t>2</a:t>
+            </a:r>
+            <a:r>
+              <a:rPr lang="en-MX" dirty="0"/>
+              <a:t> = 73.29%</a:t>
             </a:r>
           </a:p>
         </p:txBody>

</xml_diff>